<commit_message>
multiple improvements to intro to R module and lecture
</commit_message>
<xml_diff>
--- a/lectures/GenViz_Module2_Lecture.pptx
+++ b/lectures/GenViz_Module2_Lecture.pptx
@@ -5,16 +5,40 @@
     <p:sldMasterId id="2147483648" r:id="rId1"/>
   </p:sldMasterIdLst>
   <p:notesMasterIdLst>
-    <p:notesMasterId r:id="rId6"/>
+    <p:notesMasterId r:id="rId30"/>
   </p:notesMasterIdLst>
   <p:handoutMasterIdLst>
-    <p:handoutMasterId r:id="rId7"/>
+    <p:handoutMasterId r:id="rId31"/>
   </p:handoutMasterIdLst>
   <p:sldIdLst>
     <p:sldId id="256" r:id="rId2"/>
     <p:sldId id="259" r:id="rId3"/>
     <p:sldId id="260" r:id="rId4"/>
     <p:sldId id="257" r:id="rId5"/>
+    <p:sldId id="261" r:id="rId6"/>
+    <p:sldId id="262" r:id="rId7"/>
+    <p:sldId id="263" r:id="rId8"/>
+    <p:sldId id="264" r:id="rId9"/>
+    <p:sldId id="266" r:id="rId10"/>
+    <p:sldId id="265" r:id="rId11"/>
+    <p:sldId id="267" r:id="rId12"/>
+    <p:sldId id="269" r:id="rId13"/>
+    <p:sldId id="268" r:id="rId14"/>
+    <p:sldId id="270" r:id="rId15"/>
+    <p:sldId id="273" r:id="rId16"/>
+    <p:sldId id="272" r:id="rId17"/>
+    <p:sldId id="271" r:id="rId18"/>
+    <p:sldId id="274" r:id="rId19"/>
+    <p:sldId id="275" r:id="rId20"/>
+    <p:sldId id="276" r:id="rId21"/>
+    <p:sldId id="277" r:id="rId22"/>
+    <p:sldId id="278" r:id="rId23"/>
+    <p:sldId id="279" r:id="rId24"/>
+    <p:sldId id="280" r:id="rId25"/>
+    <p:sldId id="281" r:id="rId26"/>
+    <p:sldId id="284" r:id="rId27"/>
+    <p:sldId id="282" r:id="rId28"/>
+    <p:sldId id="283" r:id="rId29"/>
   </p:sldIdLst>
   <p:sldSz cx="9144000" cy="6858000" type="screen4x3"/>
   <p:notesSz cx="6858000" cy="9144000"/>
@@ -115,7 +139,7 @@
   </p:defaultTextStyle>
   <p:extLst>
     <p:ext uri="{EFAFB233-063F-42B5-8137-9DF3F51BA10A}">
-      <p15:sldGuideLst xmlns="" xmlns:p15="http://schemas.microsoft.com/office/powerpoint/2012/main">
+      <p15:sldGuideLst xmlns:p15="http://schemas.microsoft.com/office/powerpoint/2012/main" xmlns="">
         <p15:guide id="1" orient="horz" pos="2160">
           <p15:clr>
             <a:srgbClr val="A4A3A4"/>
@@ -215,7 +239,7 @@
             <a:fld id="{03643E35-CD80-874A-A3D7-254E954BB753}" type="datetimeFigureOut">
               <a:rPr lang="en-US" smtClean="0"/>
               <a:pPr/>
-              <a:t>8/25/17</a:t>
+              <a:t>9/8/17</a:t>
             </a:fld>
             <a:endParaRPr lang="en-US"/>
           </a:p>
@@ -382,7 +406,7 @@
             <a:fld id="{5C416C15-7665-174C-99B8-5B237ACA6582}" type="datetimeFigureOut">
               <a:rPr lang="en-US" smtClean="0"/>
               <a:pPr/>
-              <a:t>8/25/17</a:t>
+              <a:t>9/8/17</a:t>
             </a:fld>
             <a:endParaRPr lang="en-US"/>
           </a:p>
@@ -3131,6 +3155,1471 @@
 </p:sld>
 </file>
 
+<file path=ppt/slides/slide10.xml><?xml version="1.0" encoding="utf-8"?>
+<p:sld xmlns:a="http://schemas.openxmlformats.org/drawingml/2006/main" xmlns:r="http://schemas.openxmlformats.org/officeDocument/2006/relationships" xmlns:p="http://schemas.openxmlformats.org/presentationml/2006/main">
+  <p:cSld>
+    <p:spTree>
+      <p:nvGrpSpPr>
+        <p:cNvPr id="1" name=""/>
+        <p:cNvGrpSpPr/>
+        <p:nvPr/>
+      </p:nvGrpSpPr>
+      <p:grpSpPr>
+        <a:xfrm>
+          <a:off x="0" y="0"/>
+          <a:ext cx="0" cy="0"/>
+          <a:chOff x="0" y="0"/>
+          <a:chExt cx="0" cy="0"/>
+        </a:xfrm>
+      </p:grpSpPr>
+      <p:sp>
+        <p:nvSpPr>
+          <p:cNvPr id="2" name="Title 1"/>
+          <p:cNvSpPr>
+            <a:spLocks noGrp="1"/>
+          </p:cNvSpPr>
+          <p:nvPr>
+            <p:ph type="title"/>
+          </p:nvPr>
+        </p:nvSpPr>
+        <p:spPr/>
+        <p:txBody>
+          <a:bodyPr/>
+          <a:lstStyle/>
+          <a:p>
+            <a:r>
+              <a:rPr lang="en-US" dirty="0" err="1" smtClean="0"/>
+              <a:t>BioConductor</a:t>
+            </a:r>
+            <a:endParaRPr lang="en-US" dirty="0"/>
+          </a:p>
+        </p:txBody>
+      </p:sp>
+      <p:sp>
+        <p:nvSpPr>
+          <p:cNvPr id="3" name="Content Placeholder 2"/>
+          <p:cNvSpPr>
+            <a:spLocks noGrp="1"/>
+          </p:cNvSpPr>
+          <p:nvPr>
+            <p:ph idx="1"/>
+          </p:nvPr>
+        </p:nvSpPr>
+        <p:spPr/>
+        <p:txBody>
+          <a:bodyPr/>
+          <a:lstStyle/>
+          <a:p>
+            <a:endParaRPr lang="en-US"/>
+          </a:p>
+        </p:txBody>
+      </p:sp>
+    </p:spTree>
+    <p:extLst>
+      <p:ext uri="{BB962C8B-B14F-4D97-AF65-F5344CB8AC3E}">
+        <p14:creationId xmlns:p14="http://schemas.microsoft.com/office/powerpoint/2010/main" val="550520497"/>
+      </p:ext>
+    </p:extLst>
+  </p:cSld>
+  <p:clrMapOvr>
+    <a:masterClrMapping/>
+  </p:clrMapOvr>
+</p:sld>
+</file>
+
+<file path=ppt/slides/slide11.xml><?xml version="1.0" encoding="utf-8"?>
+<p:sld xmlns:a="http://schemas.openxmlformats.org/drawingml/2006/main" xmlns:r="http://schemas.openxmlformats.org/officeDocument/2006/relationships" xmlns:p="http://schemas.openxmlformats.org/presentationml/2006/main">
+  <p:cSld>
+    <p:spTree>
+      <p:nvGrpSpPr>
+        <p:cNvPr id="1" name=""/>
+        <p:cNvGrpSpPr/>
+        <p:nvPr/>
+      </p:nvGrpSpPr>
+      <p:grpSpPr>
+        <a:xfrm>
+          <a:off x="0" y="0"/>
+          <a:ext cx="0" cy="0"/>
+          <a:chOff x="0" y="0"/>
+          <a:chExt cx="0" cy="0"/>
+        </a:xfrm>
+      </p:grpSpPr>
+      <p:sp>
+        <p:nvSpPr>
+          <p:cNvPr id="2" name="Title 1"/>
+          <p:cNvSpPr>
+            <a:spLocks noGrp="1"/>
+          </p:cNvSpPr>
+          <p:nvPr>
+            <p:ph type="title"/>
+          </p:nvPr>
+        </p:nvSpPr>
+        <p:spPr/>
+        <p:txBody>
+          <a:bodyPr/>
+          <a:lstStyle/>
+          <a:p>
+            <a:r>
+              <a:rPr lang="en-US" dirty="0" smtClean="0"/>
+              <a:t>Getting help: ?, vignettes(), and data()</a:t>
+            </a:r>
+            <a:endParaRPr lang="en-US" dirty="0"/>
+          </a:p>
+        </p:txBody>
+      </p:sp>
+      <p:sp>
+        <p:nvSpPr>
+          <p:cNvPr id="3" name="Content Placeholder 2"/>
+          <p:cNvSpPr>
+            <a:spLocks noGrp="1"/>
+          </p:cNvSpPr>
+          <p:nvPr>
+            <p:ph idx="1"/>
+          </p:nvPr>
+        </p:nvSpPr>
+        <p:spPr/>
+        <p:txBody>
+          <a:bodyPr/>
+          <a:lstStyle/>
+          <a:p>
+            <a:endParaRPr lang="en-US"/>
+          </a:p>
+        </p:txBody>
+      </p:sp>
+    </p:spTree>
+    <p:extLst>
+      <p:ext uri="{BB962C8B-B14F-4D97-AF65-F5344CB8AC3E}">
+        <p14:creationId xmlns:p14="http://schemas.microsoft.com/office/powerpoint/2010/main" val="2358374663"/>
+      </p:ext>
+    </p:extLst>
+  </p:cSld>
+  <p:clrMapOvr>
+    <a:masterClrMapping/>
+  </p:clrMapOvr>
+</p:sld>
+</file>
+
+<file path=ppt/slides/slide12.xml><?xml version="1.0" encoding="utf-8"?>
+<p:sld xmlns:a="http://schemas.openxmlformats.org/drawingml/2006/main" xmlns:r="http://schemas.openxmlformats.org/officeDocument/2006/relationships" xmlns:p="http://schemas.openxmlformats.org/presentationml/2006/main">
+  <p:cSld>
+    <p:spTree>
+      <p:nvGrpSpPr>
+        <p:cNvPr id="1" name=""/>
+        <p:cNvGrpSpPr/>
+        <p:nvPr/>
+      </p:nvGrpSpPr>
+      <p:grpSpPr>
+        <a:xfrm>
+          <a:off x="0" y="0"/>
+          <a:ext cx="0" cy="0"/>
+          <a:chOff x="0" y="0"/>
+          <a:chExt cx="0" cy="0"/>
+        </a:xfrm>
+      </p:grpSpPr>
+      <p:sp>
+        <p:nvSpPr>
+          <p:cNvPr id="2" name="Title 1"/>
+          <p:cNvSpPr>
+            <a:spLocks noGrp="1"/>
+          </p:cNvSpPr>
+          <p:nvPr>
+            <p:ph type="title"/>
+          </p:nvPr>
+        </p:nvSpPr>
+        <p:spPr/>
+        <p:txBody>
+          <a:bodyPr/>
+          <a:lstStyle/>
+          <a:p>
+            <a:r>
+              <a:rPr lang="en-US" dirty="0" smtClean="0"/>
+              <a:t>Variables and Data types</a:t>
+            </a:r>
+            <a:endParaRPr lang="en-US" dirty="0"/>
+          </a:p>
+        </p:txBody>
+      </p:sp>
+      <p:sp>
+        <p:nvSpPr>
+          <p:cNvPr id="3" name="Content Placeholder 2"/>
+          <p:cNvSpPr>
+            <a:spLocks noGrp="1"/>
+          </p:cNvSpPr>
+          <p:nvPr>
+            <p:ph idx="1"/>
+          </p:nvPr>
+        </p:nvSpPr>
+        <p:spPr/>
+        <p:txBody>
+          <a:bodyPr>
+            <a:normAutofit fontScale="85000" lnSpcReduction="20000"/>
+          </a:bodyPr>
+          <a:lstStyle/>
+          <a:p>
+            <a:r>
+              <a:rPr lang="en-US" dirty="0" smtClean="0"/>
+              <a:t>As with any </a:t>
+            </a:r>
+            <a:r>
+              <a:rPr lang="en-US" dirty="0"/>
+              <a:t>programming language, you need to use various variables to store various information. </a:t>
+            </a:r>
+            <a:r>
+              <a:rPr lang="en-US" dirty="0" smtClean="0"/>
+              <a:t>When </a:t>
+            </a:r>
+            <a:r>
+              <a:rPr lang="en-US" dirty="0"/>
+              <a:t>you create a variable you reserve some space in </a:t>
+            </a:r>
+            <a:r>
+              <a:rPr lang="en-US" dirty="0" smtClean="0"/>
+              <a:t>memory and keep a record of its location for later retrieval and use.</a:t>
+            </a:r>
+            <a:endParaRPr lang="en-US" dirty="0"/>
+          </a:p>
+          <a:p>
+            <a:r>
+              <a:rPr lang="en-US" dirty="0" smtClean="0"/>
+              <a:t>The information you wish to store might be characters (e.g., text), integers, </a:t>
+            </a:r>
+            <a:r>
+              <a:rPr lang="en-US" dirty="0" err="1" smtClean="0"/>
+              <a:t>boolean</a:t>
+            </a:r>
+            <a:r>
+              <a:rPr lang="en-US" dirty="0" smtClean="0"/>
+              <a:t> (e.g., True/False) </a:t>
+            </a:r>
+            <a:r>
+              <a:rPr lang="en-US" dirty="0"/>
+              <a:t>etc. </a:t>
+            </a:r>
+          </a:p>
+          <a:p>
+            <a:r>
+              <a:rPr lang="en-US" dirty="0"/>
+              <a:t>In contrast to other </a:t>
+            </a:r>
+            <a:r>
+              <a:rPr lang="en-US" dirty="0" smtClean="0"/>
+              <a:t>many programming languages (e.g., C, java, </a:t>
+            </a:r>
+            <a:r>
+              <a:rPr lang="en-US" dirty="0" err="1" smtClean="0"/>
+              <a:t>etc</a:t>
+            </a:r>
+            <a:r>
+              <a:rPr lang="en-US" dirty="0" smtClean="0"/>
+              <a:t>) </a:t>
+            </a:r>
+            <a:r>
+              <a:rPr lang="en-US" dirty="0"/>
+              <a:t>in R</a:t>
+            </a:r>
+            <a:r>
+              <a:rPr lang="en-US" dirty="0" smtClean="0"/>
+              <a:t>, </a:t>
+            </a:r>
+            <a:r>
+              <a:rPr lang="en-US" dirty="0"/>
+              <a:t>variables are not declared as </a:t>
+            </a:r>
+            <a:r>
+              <a:rPr lang="en-US" dirty="0" smtClean="0"/>
+              <a:t>a specific data </a:t>
+            </a:r>
+            <a:r>
+              <a:rPr lang="en-US" dirty="0"/>
+              <a:t>type. </a:t>
+            </a:r>
+            <a:endParaRPr lang="en-US" dirty="0" smtClean="0"/>
+          </a:p>
+          <a:p>
+            <a:pPr lvl="1"/>
+            <a:r>
+              <a:rPr lang="en-US" dirty="0" smtClean="0"/>
+              <a:t>The </a:t>
+            </a:r>
+            <a:r>
+              <a:rPr lang="en-US" dirty="0"/>
+              <a:t>variables are assigned with R-Objects and the data type of the R-object becomes the data type of the variable</a:t>
+            </a:r>
+            <a:r>
+              <a:rPr lang="en-US" dirty="0" smtClean="0"/>
+              <a:t>.</a:t>
+            </a:r>
+          </a:p>
+          <a:p>
+            <a:pPr lvl="1"/>
+            <a:r>
+              <a:rPr lang="en-US" dirty="0" smtClean="0"/>
+              <a:t>Frequently </a:t>
+            </a:r>
+            <a:r>
+              <a:rPr lang="en-US" dirty="0"/>
+              <a:t>used </a:t>
+            </a:r>
+            <a:r>
+              <a:rPr lang="en-US" dirty="0" smtClean="0"/>
+              <a:t>R-Objects include: Vectors, Lists, Matrices, Arrays, Factors, Data </a:t>
+            </a:r>
+            <a:r>
+              <a:rPr lang="en-US" dirty="0"/>
+              <a:t>Frames</a:t>
+            </a:r>
+          </a:p>
+          <a:p>
+            <a:r>
+              <a:rPr lang="en-US" dirty="0"/>
+              <a:t>The simplest </a:t>
+            </a:r>
+            <a:r>
+              <a:rPr lang="en-US" dirty="0" smtClean="0"/>
+              <a:t>R-object </a:t>
+            </a:r>
+            <a:r>
+              <a:rPr lang="en-US" dirty="0"/>
+              <a:t>is the </a:t>
+            </a:r>
+            <a:r>
+              <a:rPr lang="en-US" dirty="0" smtClean="0"/>
+              <a:t>atomic vector</a:t>
+            </a:r>
+          </a:p>
+          <a:p>
+            <a:pPr lvl="1"/>
+            <a:r>
+              <a:rPr lang="en-US" dirty="0" smtClean="0"/>
+              <a:t>There </a:t>
+            </a:r>
+            <a:r>
+              <a:rPr lang="en-US" dirty="0"/>
+              <a:t>are six data types </a:t>
+            </a:r>
+            <a:r>
+              <a:rPr lang="en-US" dirty="0" smtClean="0"/>
+              <a:t>for </a:t>
+            </a:r>
+            <a:r>
+              <a:rPr lang="en-US" dirty="0"/>
+              <a:t>atomic vectors, also termed as six classes of </a:t>
+            </a:r>
+            <a:r>
+              <a:rPr lang="en-US" dirty="0" smtClean="0"/>
+              <a:t>vectors: logical, numerical, integer, complex, character, and raw</a:t>
+            </a:r>
+          </a:p>
+          <a:p>
+            <a:r>
+              <a:rPr lang="en-US" dirty="0" smtClean="0"/>
+              <a:t>The </a:t>
+            </a:r>
+            <a:r>
+              <a:rPr lang="en-US" dirty="0"/>
+              <a:t>other R-Objects are built upon </a:t>
+            </a:r>
+            <a:r>
+              <a:rPr lang="en-US" dirty="0" smtClean="0"/>
+              <a:t>atomic vectors</a:t>
+            </a:r>
+          </a:p>
+          <a:p>
+            <a:r>
+              <a:rPr lang="en-US" dirty="0" smtClean="0"/>
+              <a:t>Lists are also vectors but are not atomic vectors, meaning that they can include multiple data types and can be recursive (contain lists of lists)</a:t>
+            </a:r>
+            <a:endParaRPr lang="en-US" dirty="0"/>
+          </a:p>
+          <a:p>
+            <a:endParaRPr lang="en-US" dirty="0"/>
+          </a:p>
+        </p:txBody>
+      </p:sp>
+    </p:spTree>
+    <p:extLst>
+      <p:ext uri="{BB962C8B-B14F-4D97-AF65-F5344CB8AC3E}">
+        <p14:creationId xmlns:p14="http://schemas.microsoft.com/office/powerpoint/2010/main" val="934674714"/>
+      </p:ext>
+    </p:extLst>
+  </p:cSld>
+  <p:clrMapOvr>
+    <a:masterClrMapping/>
+  </p:clrMapOvr>
+</p:sld>
+</file>
+
+<file path=ppt/slides/slide13.xml><?xml version="1.0" encoding="utf-8"?>
+<p:sld xmlns:a="http://schemas.openxmlformats.org/drawingml/2006/main" xmlns:r="http://schemas.openxmlformats.org/officeDocument/2006/relationships" xmlns:p="http://schemas.openxmlformats.org/presentationml/2006/main">
+  <p:cSld>
+    <p:spTree>
+      <p:nvGrpSpPr>
+        <p:cNvPr id="1" name=""/>
+        <p:cNvGrpSpPr/>
+        <p:nvPr/>
+      </p:nvGrpSpPr>
+      <p:grpSpPr>
+        <a:xfrm>
+          <a:off x="0" y="0"/>
+          <a:ext cx="0" cy="0"/>
+          <a:chOff x="0" y="0"/>
+          <a:chExt cx="0" cy="0"/>
+        </a:xfrm>
+      </p:grpSpPr>
+      <p:sp>
+        <p:nvSpPr>
+          <p:cNvPr id="2" name="Title 1"/>
+          <p:cNvSpPr>
+            <a:spLocks noGrp="1"/>
+          </p:cNvSpPr>
+          <p:nvPr>
+            <p:ph type="title"/>
+          </p:nvPr>
+        </p:nvSpPr>
+        <p:spPr/>
+        <p:txBody>
+          <a:bodyPr/>
+          <a:lstStyle/>
+          <a:p>
+            <a:r>
+              <a:rPr lang="en-US" dirty="0" smtClean="0"/>
+              <a:t>&lt;- </a:t>
+            </a:r>
+            <a:r>
+              <a:rPr lang="en-US" dirty="0" err="1" smtClean="0"/>
+              <a:t>vs</a:t>
+            </a:r>
+            <a:r>
+              <a:rPr lang="en-US" dirty="0" smtClean="0"/>
+              <a:t> =</a:t>
+            </a:r>
+            <a:endParaRPr lang="en-US" dirty="0"/>
+          </a:p>
+        </p:txBody>
+      </p:sp>
+      <p:sp>
+        <p:nvSpPr>
+          <p:cNvPr id="3" name="Content Placeholder 2"/>
+          <p:cNvSpPr>
+            <a:spLocks noGrp="1"/>
+          </p:cNvSpPr>
+          <p:nvPr>
+            <p:ph idx="1"/>
+          </p:nvPr>
+        </p:nvSpPr>
+        <p:spPr/>
+        <p:txBody>
+          <a:bodyPr/>
+          <a:lstStyle/>
+          <a:p>
+            <a:endParaRPr lang="en-US"/>
+          </a:p>
+        </p:txBody>
+      </p:sp>
+    </p:spTree>
+    <p:extLst>
+      <p:ext uri="{BB962C8B-B14F-4D97-AF65-F5344CB8AC3E}">
+        <p14:creationId xmlns:p14="http://schemas.microsoft.com/office/powerpoint/2010/main" val="2193166336"/>
+      </p:ext>
+    </p:extLst>
+  </p:cSld>
+  <p:clrMapOvr>
+    <a:masterClrMapping/>
+  </p:clrMapOvr>
+</p:sld>
+</file>
+
+<file path=ppt/slides/slide14.xml><?xml version="1.0" encoding="utf-8"?>
+<p:sld xmlns:a="http://schemas.openxmlformats.org/drawingml/2006/main" xmlns:r="http://schemas.openxmlformats.org/officeDocument/2006/relationships" xmlns:p="http://schemas.openxmlformats.org/presentationml/2006/main">
+  <p:cSld>
+    <p:spTree>
+      <p:nvGrpSpPr>
+        <p:cNvPr id="1" name=""/>
+        <p:cNvGrpSpPr/>
+        <p:nvPr/>
+      </p:nvGrpSpPr>
+      <p:grpSpPr>
+        <a:xfrm>
+          <a:off x="0" y="0"/>
+          <a:ext cx="0" cy="0"/>
+          <a:chOff x="0" y="0"/>
+          <a:chExt cx="0" cy="0"/>
+        </a:xfrm>
+      </p:grpSpPr>
+      <p:sp>
+        <p:nvSpPr>
+          <p:cNvPr id="2" name="Title 1"/>
+          <p:cNvSpPr>
+            <a:spLocks noGrp="1"/>
+          </p:cNvSpPr>
+          <p:nvPr>
+            <p:ph type="title"/>
+          </p:nvPr>
+        </p:nvSpPr>
+        <p:spPr/>
+        <p:txBody>
+          <a:bodyPr/>
+          <a:lstStyle/>
+          <a:p>
+            <a:r>
+              <a:rPr lang="en-US" dirty="0" smtClean="0"/>
+              <a:t>Data structures (R objects)</a:t>
+            </a:r>
+            <a:endParaRPr lang="en-US" dirty="0"/>
+          </a:p>
+        </p:txBody>
+      </p:sp>
+      <p:sp>
+        <p:nvSpPr>
+          <p:cNvPr id="3" name="Content Placeholder 2"/>
+          <p:cNvSpPr>
+            <a:spLocks noGrp="1"/>
+          </p:cNvSpPr>
+          <p:nvPr>
+            <p:ph idx="1"/>
+          </p:nvPr>
+        </p:nvSpPr>
+        <p:spPr/>
+        <p:txBody>
+          <a:bodyPr>
+            <a:normAutofit/>
+          </a:bodyPr>
+          <a:lstStyle/>
+          <a:p>
+            <a:endParaRPr lang="en-US" dirty="0"/>
+          </a:p>
+        </p:txBody>
+      </p:sp>
+    </p:spTree>
+    <p:extLst>
+      <p:ext uri="{BB962C8B-B14F-4D97-AF65-F5344CB8AC3E}">
+        <p14:creationId xmlns:p14="http://schemas.microsoft.com/office/powerpoint/2010/main" val="1387753060"/>
+      </p:ext>
+    </p:extLst>
+  </p:cSld>
+  <p:clrMapOvr>
+    <a:masterClrMapping/>
+  </p:clrMapOvr>
+</p:sld>
+</file>
+
+<file path=ppt/slides/slide15.xml><?xml version="1.0" encoding="utf-8"?>
+<p:sld xmlns:a="http://schemas.openxmlformats.org/drawingml/2006/main" xmlns:r="http://schemas.openxmlformats.org/officeDocument/2006/relationships" xmlns:p="http://schemas.openxmlformats.org/presentationml/2006/main">
+  <p:cSld>
+    <p:spTree>
+      <p:nvGrpSpPr>
+        <p:cNvPr id="1" name=""/>
+        <p:cNvGrpSpPr/>
+        <p:nvPr/>
+      </p:nvGrpSpPr>
+      <p:grpSpPr>
+        <a:xfrm>
+          <a:off x="0" y="0"/>
+          <a:ext cx="0" cy="0"/>
+          <a:chOff x="0" y="0"/>
+          <a:chExt cx="0" cy="0"/>
+        </a:xfrm>
+      </p:grpSpPr>
+      <p:sp>
+        <p:nvSpPr>
+          <p:cNvPr id="2" name="Title 1"/>
+          <p:cNvSpPr>
+            <a:spLocks noGrp="1"/>
+          </p:cNvSpPr>
+          <p:nvPr>
+            <p:ph type="title"/>
+          </p:nvPr>
+        </p:nvSpPr>
+        <p:spPr/>
+        <p:txBody>
+          <a:bodyPr>
+            <a:normAutofit fontScale="90000"/>
+          </a:bodyPr>
+          <a:lstStyle/>
+          <a:p>
+            <a:r>
+              <a:rPr lang="en-US" dirty="0" smtClean="0"/>
+              <a:t>Understanding data and object types with class(), </a:t>
+            </a:r>
+            <a:r>
+              <a:rPr lang="en-US" dirty="0" err="1" smtClean="0"/>
+              <a:t>typeof</a:t>
+            </a:r>
+            <a:r>
+              <a:rPr lang="en-US" dirty="0" smtClean="0"/>
+              <a:t>() and is.*()</a:t>
+            </a:r>
+            <a:endParaRPr lang="en-US" dirty="0"/>
+          </a:p>
+        </p:txBody>
+      </p:sp>
+      <p:graphicFrame>
+        <p:nvGraphicFramePr>
+          <p:cNvPr id="4" name="Content Placeholder 3"/>
+          <p:cNvGraphicFramePr>
+            <a:graphicFrameLocks noGrp="1"/>
+          </p:cNvGraphicFramePr>
+          <p:nvPr>
+            <p:ph idx="1"/>
+            <p:extLst>
+              <p:ext uri="{D42A27DB-BD31-4B8C-83A1-F6EECF244321}">
+                <p14:modId xmlns:p14="http://schemas.microsoft.com/office/powerpoint/2010/main" val="150658947"/>
+              </p:ext>
+            </p:extLst>
+          </p:nvPr>
+        </p:nvGraphicFramePr>
+        <p:xfrm>
+          <a:off x="260879" y="2980228"/>
+          <a:ext cx="8168703" cy="3235960"/>
+        </p:xfrm>
+        <a:graphic>
+          <a:graphicData uri="http://schemas.openxmlformats.org/drawingml/2006/table">
+            <a:tbl>
+              <a:tblPr firstRow="1" bandRow="1">
+                <a:tableStyleId>{5C22544A-7EE6-4342-B048-85BDC9FD1C3A}</a:tableStyleId>
+              </a:tblPr>
+              <a:tblGrid>
+                <a:gridCol w="2263944"/>
+                <a:gridCol w="1173480"/>
+                <a:gridCol w="2184400"/>
+                <a:gridCol w="2546879"/>
+              </a:tblGrid>
+              <a:tr h="370840">
+                <a:tc>
+                  <a:txBody>
+                    <a:bodyPr/>
+                    <a:lstStyle/>
+                    <a:p>
+                      <a:pPr algn="ctr"/>
+                      <a:r>
+                        <a:rPr lang="en-US" dirty="0" smtClean="0"/>
+                        <a:t>x</a:t>
+                      </a:r>
+                      <a:endParaRPr lang="en-US" dirty="0"/>
+                    </a:p>
+                  </a:txBody>
+                  <a:tcPr/>
+                </a:tc>
+                <a:tc>
+                  <a:txBody>
+                    <a:bodyPr/>
+                    <a:lstStyle/>
+                    <a:p>
+                      <a:pPr algn="ctr"/>
+                      <a:r>
+                        <a:rPr lang="en-US" dirty="0" smtClean="0"/>
+                        <a:t>class(x)</a:t>
+                      </a:r>
+                      <a:endParaRPr lang="en-US" dirty="0"/>
+                    </a:p>
+                  </a:txBody>
+                  <a:tcPr/>
+                </a:tc>
+                <a:tc>
+                  <a:txBody>
+                    <a:bodyPr/>
+                    <a:lstStyle/>
+                    <a:p>
+                      <a:pPr algn="ctr"/>
+                      <a:r>
+                        <a:rPr lang="en-US" dirty="0" err="1" smtClean="0"/>
+                        <a:t>typeof</a:t>
+                      </a:r>
+                      <a:r>
+                        <a:rPr lang="en-US" dirty="0" smtClean="0"/>
+                        <a:t>(x)</a:t>
+                      </a:r>
+                      <a:endParaRPr lang="en-US" dirty="0"/>
+                    </a:p>
+                  </a:txBody>
+                  <a:tcPr/>
+                </a:tc>
+                <a:tc>
+                  <a:txBody>
+                    <a:bodyPr/>
+                    <a:lstStyle/>
+                    <a:p>
+                      <a:pPr algn="ctr"/>
+                      <a:r>
+                        <a:rPr lang="en-US" dirty="0" smtClean="0"/>
+                        <a:t>is.*(x)</a:t>
+                      </a:r>
+                      <a:endParaRPr lang="en-US" dirty="0"/>
+                    </a:p>
+                  </a:txBody>
+                  <a:tcPr/>
+                </a:tc>
+              </a:tr>
+              <a:tr h="370840">
+                <a:tc>
+                  <a:txBody>
+                    <a:bodyPr/>
+                    <a:lstStyle/>
+                    <a:p>
+                      <a:pPr algn="ctr"/>
+                      <a:r>
+                        <a:rPr lang="en-US" dirty="0" smtClean="0"/>
+                        <a:t>x &lt;- 1.0</a:t>
+                      </a:r>
+                      <a:endParaRPr lang="en-US" dirty="0"/>
+                    </a:p>
+                  </a:txBody>
+                  <a:tcPr/>
+                </a:tc>
+                <a:tc>
+                  <a:txBody>
+                    <a:bodyPr/>
+                    <a:lstStyle/>
+                    <a:p>
+                      <a:pPr algn="ctr"/>
+                      <a:r>
+                        <a:rPr lang="en-US" dirty="0" smtClean="0"/>
+                        <a:t>numeric</a:t>
+                      </a:r>
+                      <a:endParaRPr lang="en-US" dirty="0"/>
+                    </a:p>
+                  </a:txBody>
+                  <a:tcPr/>
+                </a:tc>
+                <a:tc>
+                  <a:txBody>
+                    <a:bodyPr/>
+                    <a:lstStyle/>
+                    <a:p>
+                      <a:pPr algn="ctr"/>
+                      <a:r>
+                        <a:rPr lang="en-US" dirty="0" smtClean="0"/>
+                        <a:t>double</a:t>
+                      </a:r>
+                      <a:endParaRPr lang="en-US" dirty="0"/>
+                    </a:p>
+                  </a:txBody>
+                  <a:tcPr/>
+                </a:tc>
+                <a:tc>
+                  <a:txBody>
+                    <a:bodyPr/>
+                    <a:lstStyle/>
+                    <a:p>
+                      <a:pPr algn="ctr"/>
+                      <a:r>
+                        <a:rPr lang="en-US" dirty="0" err="1" smtClean="0"/>
+                        <a:t>is.numeric</a:t>
+                      </a:r>
+                      <a:r>
+                        <a:rPr lang="en-US" dirty="0" smtClean="0"/>
+                        <a:t>(x)=TRUE</a:t>
+                      </a:r>
+                      <a:br>
+                        <a:rPr lang="en-US" dirty="0" smtClean="0"/>
+                      </a:br>
+                      <a:r>
+                        <a:rPr lang="en-US" dirty="0" err="1" smtClean="0"/>
+                        <a:t>is.double</a:t>
+                      </a:r>
+                      <a:r>
+                        <a:rPr lang="en-US" dirty="0" smtClean="0"/>
+                        <a:t>(x)=TRUE</a:t>
+                      </a:r>
+                      <a:endParaRPr lang="en-US" dirty="0"/>
+                    </a:p>
+                  </a:txBody>
+                  <a:tcPr/>
+                </a:tc>
+              </a:tr>
+              <a:tr h="370840">
+                <a:tc>
+                  <a:txBody>
+                    <a:bodyPr/>
+                    <a:lstStyle/>
+                    <a:p>
+                      <a:pPr algn="ctr"/>
+                      <a:r>
+                        <a:rPr lang="en-US" dirty="0" smtClean="0"/>
+                        <a:t>x &lt;- 1L</a:t>
+                      </a:r>
+                      <a:endParaRPr lang="en-US" dirty="0"/>
+                    </a:p>
+                  </a:txBody>
+                  <a:tcPr/>
+                </a:tc>
+                <a:tc>
+                  <a:txBody>
+                    <a:bodyPr/>
+                    <a:lstStyle/>
+                    <a:p>
+                      <a:pPr algn="ctr"/>
+                      <a:r>
+                        <a:rPr lang="en-US" dirty="0" smtClean="0"/>
+                        <a:t>integer</a:t>
+                      </a:r>
+                      <a:endParaRPr lang="en-US" dirty="0"/>
+                    </a:p>
+                  </a:txBody>
+                  <a:tcPr/>
+                </a:tc>
+                <a:tc>
+                  <a:txBody>
+                    <a:bodyPr/>
+                    <a:lstStyle/>
+                    <a:p>
+                      <a:pPr algn="ctr"/>
+                      <a:r>
+                        <a:rPr lang="en-US" dirty="0" smtClean="0"/>
+                        <a:t>integer</a:t>
+                      </a:r>
+                      <a:endParaRPr lang="en-US" dirty="0"/>
+                    </a:p>
+                  </a:txBody>
+                  <a:tcPr/>
+                </a:tc>
+                <a:tc>
+                  <a:txBody>
+                    <a:bodyPr/>
+                    <a:lstStyle/>
+                    <a:p>
+                      <a:pPr algn="ctr"/>
+                      <a:r>
+                        <a:rPr lang="en-US" dirty="0" err="1" smtClean="0"/>
+                        <a:t>is.integer</a:t>
+                      </a:r>
+                      <a:r>
+                        <a:rPr lang="en-US" dirty="0" smtClean="0"/>
+                        <a:t>(x)=TRUE</a:t>
+                      </a:r>
+                      <a:endParaRPr lang="en-US" dirty="0"/>
+                    </a:p>
+                  </a:txBody>
+                  <a:tcPr/>
+                </a:tc>
+              </a:tr>
+              <a:tr h="370840">
+                <a:tc>
+                  <a:txBody>
+                    <a:bodyPr/>
+                    <a:lstStyle/>
+                    <a:p>
+                      <a:pPr algn="ctr"/>
+                      <a:r>
+                        <a:rPr lang="en-US" dirty="0" smtClean="0"/>
+                        <a:t>x &lt;- “a”</a:t>
+                      </a:r>
+                      <a:endParaRPr lang="en-US" dirty="0"/>
+                    </a:p>
+                  </a:txBody>
+                  <a:tcPr/>
+                </a:tc>
+                <a:tc>
+                  <a:txBody>
+                    <a:bodyPr/>
+                    <a:lstStyle/>
+                    <a:p>
+                      <a:pPr algn="ctr"/>
+                      <a:r>
+                        <a:rPr lang="en-US" dirty="0" smtClean="0"/>
+                        <a:t>character</a:t>
+                      </a:r>
+                      <a:endParaRPr lang="en-US" dirty="0"/>
+                    </a:p>
+                  </a:txBody>
+                  <a:tcPr/>
+                </a:tc>
+                <a:tc>
+                  <a:txBody>
+                    <a:bodyPr/>
+                    <a:lstStyle/>
+                    <a:p>
+                      <a:pPr algn="ctr"/>
+                      <a:r>
+                        <a:rPr lang="en-US" dirty="0" smtClean="0"/>
+                        <a:t>character</a:t>
+                      </a:r>
+                      <a:endParaRPr lang="en-US" dirty="0"/>
+                    </a:p>
+                  </a:txBody>
+                  <a:tcPr/>
+                </a:tc>
+                <a:tc>
+                  <a:txBody>
+                    <a:bodyPr/>
+                    <a:lstStyle/>
+                    <a:p>
+                      <a:pPr algn="ctr"/>
+                      <a:r>
+                        <a:rPr lang="en-US" dirty="0" err="1" smtClean="0"/>
+                        <a:t>is.character</a:t>
+                      </a:r>
+                      <a:r>
+                        <a:rPr lang="en-US" dirty="0" smtClean="0"/>
+                        <a:t>(x)=TRUE</a:t>
+                      </a:r>
+                      <a:endParaRPr lang="en-US" dirty="0"/>
+                    </a:p>
+                  </a:txBody>
+                  <a:tcPr/>
+                </a:tc>
+              </a:tr>
+              <a:tr h="370840">
+                <a:tc>
+                  <a:txBody>
+                    <a:bodyPr/>
+                    <a:lstStyle/>
+                    <a:p>
+                      <a:pPr algn="ctr"/>
+                      <a:r>
+                        <a:rPr lang="en-US" dirty="0" smtClean="0"/>
+                        <a:t>x &lt;- TRUE</a:t>
+                      </a:r>
+                      <a:endParaRPr lang="en-US" dirty="0"/>
+                    </a:p>
+                  </a:txBody>
+                  <a:tcPr/>
+                </a:tc>
+                <a:tc>
+                  <a:txBody>
+                    <a:bodyPr/>
+                    <a:lstStyle/>
+                    <a:p>
+                      <a:pPr algn="ctr"/>
+                      <a:r>
+                        <a:rPr lang="en-US" dirty="0" smtClean="0"/>
+                        <a:t>logical</a:t>
+                      </a:r>
+                      <a:endParaRPr lang="en-US" dirty="0"/>
+                    </a:p>
+                  </a:txBody>
+                  <a:tcPr/>
+                </a:tc>
+                <a:tc>
+                  <a:txBody>
+                    <a:bodyPr/>
+                    <a:lstStyle/>
+                    <a:p>
+                      <a:pPr algn="ctr"/>
+                      <a:r>
+                        <a:rPr lang="en-US" dirty="0" smtClean="0"/>
+                        <a:t>logical</a:t>
+                      </a:r>
+                      <a:endParaRPr lang="en-US" dirty="0"/>
+                    </a:p>
+                  </a:txBody>
+                  <a:tcPr/>
+                </a:tc>
+                <a:tc>
+                  <a:txBody>
+                    <a:bodyPr/>
+                    <a:lstStyle/>
+                    <a:p>
+                      <a:pPr algn="ctr"/>
+                      <a:r>
+                        <a:rPr lang="en-US" dirty="0" err="1" smtClean="0"/>
+                        <a:t>is.logical</a:t>
+                      </a:r>
+                      <a:r>
+                        <a:rPr lang="en-US" dirty="0" smtClean="0"/>
+                        <a:t>(x)=</a:t>
+                      </a:r>
+                      <a:r>
+                        <a:rPr lang="en-US" baseline="0" dirty="0" smtClean="0"/>
+                        <a:t>TRUE</a:t>
+                      </a:r>
+                      <a:endParaRPr lang="en-US" dirty="0"/>
+                    </a:p>
+                  </a:txBody>
+                  <a:tcPr/>
+                </a:tc>
+              </a:tr>
+              <a:tr h="370840">
+                <a:tc>
+                  <a:txBody>
+                    <a:bodyPr/>
+                    <a:lstStyle/>
+                    <a:p>
+                      <a:pPr algn="ctr"/>
+                      <a:r>
+                        <a:rPr lang="en-US" dirty="0" smtClean="0"/>
+                        <a:t>x &lt;- </a:t>
+                      </a:r>
+                      <a:r>
+                        <a:rPr lang="en-US" dirty="0" err="1" smtClean="0"/>
+                        <a:t>charToRaw</a:t>
+                      </a:r>
+                      <a:r>
+                        <a:rPr lang="en-US" dirty="0" smtClean="0"/>
+                        <a:t>(“a”)</a:t>
+                      </a:r>
+                      <a:endParaRPr lang="en-US" dirty="0"/>
+                    </a:p>
+                  </a:txBody>
+                  <a:tcPr/>
+                </a:tc>
+                <a:tc>
+                  <a:txBody>
+                    <a:bodyPr/>
+                    <a:lstStyle/>
+                    <a:p>
+                      <a:pPr algn="ctr"/>
+                      <a:r>
+                        <a:rPr lang="en-US" dirty="0" smtClean="0"/>
+                        <a:t>raw</a:t>
+                      </a:r>
+                      <a:endParaRPr lang="en-US" dirty="0"/>
+                    </a:p>
+                  </a:txBody>
+                  <a:tcPr/>
+                </a:tc>
+                <a:tc>
+                  <a:txBody>
+                    <a:bodyPr/>
+                    <a:lstStyle/>
+                    <a:p>
+                      <a:pPr algn="ctr"/>
+                      <a:r>
+                        <a:rPr lang="en-US" dirty="0" smtClean="0"/>
+                        <a:t>raw</a:t>
+                      </a:r>
+                      <a:endParaRPr lang="en-US" dirty="0"/>
+                    </a:p>
+                  </a:txBody>
+                  <a:tcPr/>
+                </a:tc>
+                <a:tc>
+                  <a:txBody>
+                    <a:bodyPr/>
+                    <a:lstStyle/>
+                    <a:p>
+                      <a:pPr algn="ctr"/>
+                      <a:r>
+                        <a:rPr lang="en-US" dirty="0" err="1" smtClean="0"/>
+                        <a:t>is.raw</a:t>
+                      </a:r>
+                      <a:r>
+                        <a:rPr lang="en-US" dirty="0" smtClean="0"/>
+                        <a:t>(x)=TRUE</a:t>
+                      </a:r>
+                      <a:endParaRPr lang="en-US" dirty="0"/>
+                    </a:p>
+                  </a:txBody>
+                  <a:tcPr/>
+                </a:tc>
+              </a:tr>
+              <a:tr h="370840">
+                <a:tc>
+                  <a:txBody>
+                    <a:bodyPr/>
+                    <a:lstStyle/>
+                    <a:p>
+                      <a:pPr algn="ctr"/>
+                      <a:r>
+                        <a:rPr lang="de-DE" dirty="0" smtClean="0"/>
+                        <a:t>x &lt;- 4 + 4i</a:t>
+                      </a:r>
+                      <a:endParaRPr lang="en-US" dirty="0"/>
+                    </a:p>
+                  </a:txBody>
+                  <a:tcPr/>
+                </a:tc>
+                <a:tc>
+                  <a:txBody>
+                    <a:bodyPr/>
+                    <a:lstStyle/>
+                    <a:p>
+                      <a:pPr algn="ctr"/>
+                      <a:r>
+                        <a:rPr lang="en-US" dirty="0" smtClean="0"/>
+                        <a:t>complex</a:t>
+                      </a:r>
+                      <a:endParaRPr lang="en-US" dirty="0"/>
+                    </a:p>
+                  </a:txBody>
+                  <a:tcPr/>
+                </a:tc>
+                <a:tc>
+                  <a:txBody>
+                    <a:bodyPr/>
+                    <a:lstStyle/>
+                    <a:p>
+                      <a:pPr algn="ctr"/>
+                      <a:r>
+                        <a:rPr lang="en-US" dirty="0" smtClean="0"/>
+                        <a:t>complex</a:t>
+                      </a:r>
+                      <a:endParaRPr lang="en-US" dirty="0"/>
+                    </a:p>
+                  </a:txBody>
+                  <a:tcPr/>
+                </a:tc>
+                <a:tc>
+                  <a:txBody>
+                    <a:bodyPr/>
+                    <a:lstStyle/>
+                    <a:p>
+                      <a:pPr algn="ctr"/>
+                      <a:r>
+                        <a:rPr lang="en-US" dirty="0" err="1" smtClean="0"/>
+                        <a:t>is.complex</a:t>
+                      </a:r>
+                      <a:r>
+                        <a:rPr lang="en-US" dirty="0" smtClean="0"/>
+                        <a:t>(x)=TRUE</a:t>
+                      </a:r>
+                      <a:endParaRPr lang="en-US" dirty="0"/>
+                    </a:p>
+                  </a:txBody>
+                  <a:tcPr/>
+                </a:tc>
+              </a:tr>
+              <a:tr h="370840">
+                <a:tc>
+                  <a:txBody>
+                    <a:bodyPr/>
+                    <a:lstStyle/>
+                    <a:p>
+                      <a:pPr algn="ctr"/>
+                      <a:endParaRPr lang="en-US" dirty="0"/>
+                    </a:p>
+                  </a:txBody>
+                  <a:tcPr/>
+                </a:tc>
+                <a:tc>
+                  <a:txBody>
+                    <a:bodyPr/>
+                    <a:lstStyle/>
+                    <a:p>
+                      <a:pPr algn="ctr"/>
+                      <a:endParaRPr lang="en-US" dirty="0"/>
+                    </a:p>
+                  </a:txBody>
+                  <a:tcPr/>
+                </a:tc>
+                <a:tc>
+                  <a:txBody>
+                    <a:bodyPr/>
+                    <a:lstStyle/>
+                    <a:p>
+                      <a:pPr algn="ctr"/>
+                      <a:endParaRPr lang="en-US" dirty="0"/>
+                    </a:p>
+                  </a:txBody>
+                  <a:tcPr/>
+                </a:tc>
+                <a:tc>
+                  <a:txBody>
+                    <a:bodyPr/>
+                    <a:lstStyle/>
+                    <a:p>
+                      <a:pPr algn="ctr"/>
+                      <a:endParaRPr lang="en-US" dirty="0"/>
+                    </a:p>
+                  </a:txBody>
+                  <a:tcPr/>
+                </a:tc>
+              </a:tr>
+            </a:tbl>
+          </a:graphicData>
+        </a:graphic>
+      </p:graphicFrame>
+    </p:spTree>
+    <p:extLst>
+      <p:ext uri="{BB962C8B-B14F-4D97-AF65-F5344CB8AC3E}">
+        <p14:creationId xmlns:p14="http://schemas.microsoft.com/office/powerpoint/2010/main" val="1042677293"/>
+      </p:ext>
+    </p:extLst>
+  </p:cSld>
+  <p:clrMapOvr>
+    <a:masterClrMapping/>
+  </p:clrMapOvr>
+</p:sld>
+</file>
+
+<file path=ppt/slides/slide16.xml><?xml version="1.0" encoding="utf-8"?>
+<p:sld xmlns:a="http://schemas.openxmlformats.org/drawingml/2006/main" xmlns:r="http://schemas.openxmlformats.org/officeDocument/2006/relationships" xmlns:p="http://schemas.openxmlformats.org/presentationml/2006/main">
+  <p:cSld>
+    <p:spTree>
+      <p:nvGrpSpPr>
+        <p:cNvPr id="1" name=""/>
+        <p:cNvGrpSpPr/>
+        <p:nvPr/>
+      </p:nvGrpSpPr>
+      <p:grpSpPr>
+        <a:xfrm>
+          <a:off x="0" y="0"/>
+          <a:ext cx="0" cy="0"/>
+          <a:chOff x="0" y="0"/>
+          <a:chExt cx="0" cy="0"/>
+        </a:xfrm>
+      </p:grpSpPr>
+      <p:sp>
+        <p:nvSpPr>
+          <p:cNvPr id="2" name="Title 1"/>
+          <p:cNvSpPr>
+            <a:spLocks noGrp="1"/>
+          </p:cNvSpPr>
+          <p:nvPr>
+            <p:ph type="title"/>
+          </p:nvPr>
+        </p:nvSpPr>
+        <p:spPr/>
+        <p:txBody>
+          <a:bodyPr/>
+          <a:lstStyle/>
+          <a:p>
+            <a:r>
+              <a:rPr lang="en-US" dirty="0" smtClean="0"/>
+              <a:t>Vectors</a:t>
+            </a:r>
+            <a:endParaRPr lang="en-US" dirty="0"/>
+          </a:p>
+        </p:txBody>
+      </p:sp>
+      <p:sp>
+        <p:nvSpPr>
+          <p:cNvPr id="3" name="Content Placeholder 2"/>
+          <p:cNvSpPr>
+            <a:spLocks noGrp="1"/>
+          </p:cNvSpPr>
+          <p:nvPr>
+            <p:ph idx="1"/>
+          </p:nvPr>
+        </p:nvSpPr>
+        <p:spPr/>
+        <p:txBody>
+          <a:bodyPr/>
+          <a:lstStyle/>
+          <a:p>
+            <a:endParaRPr lang="en-US"/>
+          </a:p>
+        </p:txBody>
+      </p:sp>
+    </p:spTree>
+    <p:extLst>
+      <p:ext uri="{BB962C8B-B14F-4D97-AF65-F5344CB8AC3E}">
+        <p14:creationId xmlns:p14="http://schemas.microsoft.com/office/powerpoint/2010/main" val="818804808"/>
+      </p:ext>
+    </p:extLst>
+  </p:cSld>
+  <p:clrMapOvr>
+    <a:masterClrMapping/>
+  </p:clrMapOvr>
+</p:sld>
+</file>
+
+<file path=ppt/slides/slide17.xml><?xml version="1.0" encoding="utf-8"?>
+<p:sld xmlns:a="http://schemas.openxmlformats.org/drawingml/2006/main" xmlns:r="http://schemas.openxmlformats.org/officeDocument/2006/relationships" xmlns:p="http://schemas.openxmlformats.org/presentationml/2006/main">
+  <p:cSld>
+    <p:spTree>
+      <p:nvGrpSpPr>
+        <p:cNvPr id="1" name=""/>
+        <p:cNvGrpSpPr/>
+        <p:nvPr/>
+      </p:nvGrpSpPr>
+      <p:grpSpPr>
+        <a:xfrm>
+          <a:off x="0" y="0"/>
+          <a:ext cx="0" cy="0"/>
+          <a:chOff x="0" y="0"/>
+          <a:chExt cx="0" cy="0"/>
+        </a:xfrm>
+      </p:grpSpPr>
+      <p:sp>
+        <p:nvSpPr>
+          <p:cNvPr id="2" name="Title 1"/>
+          <p:cNvSpPr>
+            <a:spLocks noGrp="1"/>
+          </p:cNvSpPr>
+          <p:nvPr>
+            <p:ph type="title"/>
+          </p:nvPr>
+        </p:nvSpPr>
+        <p:spPr/>
+        <p:txBody>
+          <a:bodyPr/>
+          <a:lstStyle/>
+          <a:p>
+            <a:r>
+              <a:rPr lang="en-US" dirty="0" smtClean="0"/>
+              <a:t>Factors</a:t>
+            </a:r>
+            <a:endParaRPr lang="en-US" dirty="0"/>
+          </a:p>
+        </p:txBody>
+      </p:sp>
+      <p:sp>
+        <p:nvSpPr>
+          <p:cNvPr id="3" name="Content Placeholder 2"/>
+          <p:cNvSpPr>
+            <a:spLocks noGrp="1"/>
+          </p:cNvSpPr>
+          <p:nvPr>
+            <p:ph idx="1"/>
+          </p:nvPr>
+        </p:nvSpPr>
+        <p:spPr/>
+        <p:txBody>
+          <a:bodyPr/>
+          <a:lstStyle/>
+          <a:p>
+            <a:endParaRPr lang="en-US"/>
+          </a:p>
+        </p:txBody>
+      </p:sp>
+    </p:spTree>
+    <p:extLst>
+      <p:ext uri="{BB962C8B-B14F-4D97-AF65-F5344CB8AC3E}">
+        <p14:creationId xmlns:p14="http://schemas.microsoft.com/office/powerpoint/2010/main" val="3172517770"/>
+      </p:ext>
+    </p:extLst>
+  </p:cSld>
+  <p:clrMapOvr>
+    <a:masterClrMapping/>
+  </p:clrMapOvr>
+</p:sld>
+</file>
+
+<file path=ppt/slides/slide18.xml><?xml version="1.0" encoding="utf-8"?>
+<p:sld xmlns:a="http://schemas.openxmlformats.org/drawingml/2006/main" xmlns:r="http://schemas.openxmlformats.org/officeDocument/2006/relationships" xmlns:p="http://schemas.openxmlformats.org/presentationml/2006/main">
+  <p:cSld>
+    <p:spTree>
+      <p:nvGrpSpPr>
+        <p:cNvPr id="1" name=""/>
+        <p:cNvGrpSpPr/>
+        <p:nvPr/>
+      </p:nvGrpSpPr>
+      <p:grpSpPr>
+        <a:xfrm>
+          <a:off x="0" y="0"/>
+          <a:ext cx="0" cy="0"/>
+          <a:chOff x="0" y="0"/>
+          <a:chExt cx="0" cy="0"/>
+        </a:xfrm>
+      </p:grpSpPr>
+      <p:sp>
+        <p:nvSpPr>
+          <p:cNvPr id="2" name="Title 1"/>
+          <p:cNvSpPr>
+            <a:spLocks noGrp="1"/>
+          </p:cNvSpPr>
+          <p:nvPr>
+            <p:ph type="title"/>
+          </p:nvPr>
+        </p:nvSpPr>
+        <p:spPr/>
+        <p:txBody>
+          <a:bodyPr/>
+          <a:lstStyle/>
+          <a:p>
+            <a:r>
+              <a:rPr lang="en-US" dirty="0" smtClean="0"/>
+              <a:t>Lists</a:t>
+            </a:r>
+            <a:endParaRPr lang="en-US" dirty="0"/>
+          </a:p>
+        </p:txBody>
+      </p:sp>
+      <p:sp>
+        <p:nvSpPr>
+          <p:cNvPr id="3" name="Content Placeholder 2"/>
+          <p:cNvSpPr>
+            <a:spLocks noGrp="1"/>
+          </p:cNvSpPr>
+          <p:nvPr>
+            <p:ph idx="1"/>
+          </p:nvPr>
+        </p:nvSpPr>
+        <p:spPr/>
+        <p:txBody>
+          <a:bodyPr/>
+          <a:lstStyle/>
+          <a:p>
+            <a:endParaRPr lang="en-US"/>
+          </a:p>
+        </p:txBody>
+      </p:sp>
+    </p:spTree>
+    <p:extLst>
+      <p:ext uri="{BB962C8B-B14F-4D97-AF65-F5344CB8AC3E}">
+        <p14:creationId xmlns:p14="http://schemas.microsoft.com/office/powerpoint/2010/main" val="2876099214"/>
+      </p:ext>
+    </p:extLst>
+  </p:cSld>
+  <p:clrMapOvr>
+    <a:masterClrMapping/>
+  </p:clrMapOvr>
+</p:sld>
+</file>
+
+<file path=ppt/slides/slide19.xml><?xml version="1.0" encoding="utf-8"?>
+<p:sld xmlns:a="http://schemas.openxmlformats.org/drawingml/2006/main" xmlns:r="http://schemas.openxmlformats.org/officeDocument/2006/relationships" xmlns:p="http://schemas.openxmlformats.org/presentationml/2006/main">
+  <p:cSld>
+    <p:spTree>
+      <p:nvGrpSpPr>
+        <p:cNvPr id="1" name=""/>
+        <p:cNvGrpSpPr/>
+        <p:nvPr/>
+      </p:nvGrpSpPr>
+      <p:grpSpPr>
+        <a:xfrm>
+          <a:off x="0" y="0"/>
+          <a:ext cx="0" cy="0"/>
+          <a:chOff x="0" y="0"/>
+          <a:chExt cx="0" cy="0"/>
+        </a:xfrm>
+      </p:grpSpPr>
+      <p:sp>
+        <p:nvSpPr>
+          <p:cNvPr id="2" name="Title 1"/>
+          <p:cNvSpPr>
+            <a:spLocks noGrp="1"/>
+          </p:cNvSpPr>
+          <p:nvPr>
+            <p:ph type="title"/>
+          </p:nvPr>
+        </p:nvSpPr>
+        <p:spPr/>
+        <p:txBody>
+          <a:bodyPr/>
+          <a:lstStyle/>
+          <a:p>
+            <a:r>
+              <a:rPr lang="en-US" dirty="0" smtClean="0"/>
+              <a:t>Attributes</a:t>
+            </a:r>
+            <a:endParaRPr lang="en-US" dirty="0"/>
+          </a:p>
+        </p:txBody>
+      </p:sp>
+      <p:sp>
+        <p:nvSpPr>
+          <p:cNvPr id="3" name="Content Placeholder 2"/>
+          <p:cNvSpPr>
+            <a:spLocks noGrp="1"/>
+          </p:cNvSpPr>
+          <p:nvPr>
+            <p:ph idx="1"/>
+          </p:nvPr>
+        </p:nvSpPr>
+        <p:spPr/>
+        <p:txBody>
+          <a:bodyPr/>
+          <a:lstStyle/>
+          <a:p>
+            <a:endParaRPr lang="en-US"/>
+          </a:p>
+        </p:txBody>
+      </p:sp>
+    </p:spTree>
+    <p:extLst>
+      <p:ext uri="{BB962C8B-B14F-4D97-AF65-F5344CB8AC3E}">
+        <p14:creationId xmlns:p14="http://schemas.microsoft.com/office/powerpoint/2010/main" val="593406324"/>
+      </p:ext>
+    </p:extLst>
+  </p:cSld>
+  <p:clrMapOvr>
+    <a:masterClrMapping/>
+  </p:clrMapOvr>
+</p:sld>
+</file>
+
 <file path=ppt/slides/slide2.xml><?xml version="1.0" encoding="utf-8"?>
 <p:sld xmlns:a="http://schemas.openxmlformats.org/drawingml/2006/main" xmlns:r="http://schemas.openxmlformats.org/officeDocument/2006/relationships" xmlns:p="http://schemas.openxmlformats.org/presentationml/2006/main">
   <p:cSld>
@@ -3245,6 +4734,950 @@
 </p:sld>
 </file>
 
+<file path=ppt/slides/slide20.xml><?xml version="1.0" encoding="utf-8"?>
+<p:sld xmlns:a="http://schemas.openxmlformats.org/drawingml/2006/main" xmlns:r="http://schemas.openxmlformats.org/officeDocument/2006/relationships" xmlns:p="http://schemas.openxmlformats.org/presentationml/2006/main">
+  <p:cSld>
+    <p:spTree>
+      <p:nvGrpSpPr>
+        <p:cNvPr id="1" name=""/>
+        <p:cNvGrpSpPr/>
+        <p:nvPr/>
+      </p:nvGrpSpPr>
+      <p:grpSpPr>
+        <a:xfrm>
+          <a:off x="0" y="0"/>
+          <a:ext cx="0" cy="0"/>
+          <a:chOff x="0" y="0"/>
+          <a:chExt cx="0" cy="0"/>
+        </a:xfrm>
+      </p:grpSpPr>
+      <p:sp>
+        <p:nvSpPr>
+          <p:cNvPr id="2" name="Title 1"/>
+          <p:cNvSpPr>
+            <a:spLocks noGrp="1"/>
+          </p:cNvSpPr>
+          <p:nvPr>
+            <p:ph type="title"/>
+          </p:nvPr>
+        </p:nvSpPr>
+        <p:spPr/>
+        <p:txBody>
+          <a:bodyPr/>
+          <a:lstStyle/>
+          <a:p>
+            <a:r>
+              <a:rPr lang="en-US" dirty="0" smtClean="0"/>
+              <a:t>Importing and Exporting Data</a:t>
+            </a:r>
+            <a:endParaRPr lang="en-US" dirty="0"/>
+          </a:p>
+        </p:txBody>
+      </p:sp>
+      <p:sp>
+        <p:nvSpPr>
+          <p:cNvPr id="3" name="Content Placeholder 2"/>
+          <p:cNvSpPr>
+            <a:spLocks noGrp="1"/>
+          </p:cNvSpPr>
+          <p:nvPr>
+            <p:ph idx="1"/>
+          </p:nvPr>
+        </p:nvSpPr>
+        <p:spPr/>
+        <p:txBody>
+          <a:bodyPr/>
+          <a:lstStyle/>
+          <a:p>
+            <a:endParaRPr lang="en-US"/>
+          </a:p>
+        </p:txBody>
+      </p:sp>
+    </p:spTree>
+    <p:extLst>
+      <p:ext uri="{BB962C8B-B14F-4D97-AF65-F5344CB8AC3E}">
+        <p14:creationId xmlns:p14="http://schemas.microsoft.com/office/powerpoint/2010/main" val="1068452290"/>
+      </p:ext>
+    </p:extLst>
+  </p:cSld>
+  <p:clrMapOvr>
+    <a:masterClrMapping/>
+  </p:clrMapOvr>
+</p:sld>
+</file>
+
+<file path=ppt/slides/slide21.xml><?xml version="1.0" encoding="utf-8"?>
+<p:sld xmlns:a="http://schemas.openxmlformats.org/drawingml/2006/main" xmlns:r="http://schemas.openxmlformats.org/officeDocument/2006/relationships" xmlns:p="http://schemas.openxmlformats.org/presentationml/2006/main">
+  <p:cSld>
+    <p:spTree>
+      <p:nvGrpSpPr>
+        <p:cNvPr id="1" name=""/>
+        <p:cNvGrpSpPr/>
+        <p:nvPr/>
+      </p:nvGrpSpPr>
+      <p:grpSpPr>
+        <a:xfrm>
+          <a:off x="0" y="0"/>
+          <a:ext cx="0" cy="0"/>
+          <a:chOff x="0" y="0"/>
+          <a:chExt cx="0" cy="0"/>
+        </a:xfrm>
+      </p:grpSpPr>
+      <p:sp>
+        <p:nvSpPr>
+          <p:cNvPr id="2" name="Title 1"/>
+          <p:cNvSpPr>
+            <a:spLocks noGrp="1"/>
+          </p:cNvSpPr>
+          <p:nvPr>
+            <p:ph type="title"/>
+          </p:nvPr>
+        </p:nvSpPr>
+        <p:spPr/>
+        <p:txBody>
+          <a:bodyPr/>
+          <a:lstStyle/>
+          <a:p>
+            <a:r>
+              <a:rPr lang="en-US" dirty="0" err="1" smtClean="0"/>
+              <a:t>Dataframes</a:t>
+            </a:r>
+            <a:endParaRPr lang="en-US" dirty="0"/>
+          </a:p>
+        </p:txBody>
+      </p:sp>
+      <p:sp>
+        <p:nvSpPr>
+          <p:cNvPr id="3" name="Content Placeholder 2"/>
+          <p:cNvSpPr>
+            <a:spLocks noGrp="1"/>
+          </p:cNvSpPr>
+          <p:nvPr>
+            <p:ph idx="1"/>
+          </p:nvPr>
+        </p:nvSpPr>
+        <p:spPr/>
+        <p:txBody>
+          <a:bodyPr/>
+          <a:lstStyle/>
+          <a:p>
+            <a:endParaRPr lang="en-US"/>
+          </a:p>
+        </p:txBody>
+      </p:sp>
+    </p:spTree>
+    <p:extLst>
+      <p:ext uri="{BB962C8B-B14F-4D97-AF65-F5344CB8AC3E}">
+        <p14:creationId xmlns:p14="http://schemas.microsoft.com/office/powerpoint/2010/main" val="2590858446"/>
+      </p:ext>
+    </p:extLst>
+  </p:cSld>
+  <p:clrMapOvr>
+    <a:masterClrMapping/>
+  </p:clrMapOvr>
+</p:sld>
+</file>
+
+<file path=ppt/slides/slide22.xml><?xml version="1.0" encoding="utf-8"?>
+<p:sld xmlns:a="http://schemas.openxmlformats.org/drawingml/2006/main" xmlns:r="http://schemas.openxmlformats.org/officeDocument/2006/relationships" xmlns:p="http://schemas.openxmlformats.org/presentationml/2006/main">
+  <p:cSld>
+    <p:spTree>
+      <p:nvGrpSpPr>
+        <p:cNvPr id="1" name=""/>
+        <p:cNvGrpSpPr/>
+        <p:nvPr/>
+      </p:nvGrpSpPr>
+      <p:grpSpPr>
+        <a:xfrm>
+          <a:off x="0" y="0"/>
+          <a:ext cx="0" cy="0"/>
+          <a:chOff x="0" y="0"/>
+          <a:chExt cx="0" cy="0"/>
+        </a:xfrm>
+      </p:grpSpPr>
+      <p:sp>
+        <p:nvSpPr>
+          <p:cNvPr id="2" name="Title 1"/>
+          <p:cNvSpPr>
+            <a:spLocks noGrp="1"/>
+          </p:cNvSpPr>
+          <p:nvPr>
+            <p:ph type="title"/>
+          </p:nvPr>
+        </p:nvSpPr>
+        <p:spPr/>
+        <p:txBody>
+          <a:bodyPr/>
+          <a:lstStyle/>
+          <a:p>
+            <a:r>
+              <a:rPr lang="en-US" dirty="0" smtClean="0"/>
+              <a:t>Apply functions</a:t>
+            </a:r>
+            <a:endParaRPr lang="en-US" dirty="0"/>
+          </a:p>
+        </p:txBody>
+      </p:sp>
+      <p:sp>
+        <p:nvSpPr>
+          <p:cNvPr id="3" name="Content Placeholder 2"/>
+          <p:cNvSpPr>
+            <a:spLocks noGrp="1"/>
+          </p:cNvSpPr>
+          <p:nvPr>
+            <p:ph idx="1"/>
+          </p:nvPr>
+        </p:nvSpPr>
+        <p:spPr/>
+        <p:txBody>
+          <a:bodyPr/>
+          <a:lstStyle/>
+          <a:p>
+            <a:endParaRPr lang="en-US"/>
+          </a:p>
+        </p:txBody>
+      </p:sp>
+    </p:spTree>
+    <p:extLst>
+      <p:ext uri="{BB962C8B-B14F-4D97-AF65-F5344CB8AC3E}">
+        <p14:creationId xmlns:p14="http://schemas.microsoft.com/office/powerpoint/2010/main" val="3251168646"/>
+      </p:ext>
+    </p:extLst>
+  </p:cSld>
+  <p:clrMapOvr>
+    <a:masterClrMapping/>
+  </p:clrMapOvr>
+</p:sld>
+</file>
+
+<file path=ppt/slides/slide23.xml><?xml version="1.0" encoding="utf-8"?>
+<p:sld xmlns:a="http://schemas.openxmlformats.org/drawingml/2006/main" xmlns:r="http://schemas.openxmlformats.org/officeDocument/2006/relationships" xmlns:p="http://schemas.openxmlformats.org/presentationml/2006/main">
+  <p:cSld>
+    <p:spTree>
+      <p:nvGrpSpPr>
+        <p:cNvPr id="1" name=""/>
+        <p:cNvGrpSpPr/>
+        <p:nvPr/>
+      </p:nvGrpSpPr>
+      <p:grpSpPr>
+        <a:xfrm>
+          <a:off x="0" y="0"/>
+          <a:ext cx="0" cy="0"/>
+          <a:chOff x="0" y="0"/>
+          <a:chExt cx="0" cy="0"/>
+        </a:xfrm>
+      </p:grpSpPr>
+      <p:sp>
+        <p:nvSpPr>
+          <p:cNvPr id="2" name="Title 1"/>
+          <p:cNvSpPr>
+            <a:spLocks noGrp="1"/>
+          </p:cNvSpPr>
+          <p:nvPr>
+            <p:ph type="title"/>
+          </p:nvPr>
+        </p:nvSpPr>
+        <p:spPr/>
+        <p:txBody>
+          <a:bodyPr/>
+          <a:lstStyle/>
+          <a:p>
+            <a:r>
+              <a:rPr lang="en-US" dirty="0" smtClean="0"/>
+              <a:t>Custom functions</a:t>
+            </a:r>
+            <a:endParaRPr lang="en-US" dirty="0"/>
+          </a:p>
+        </p:txBody>
+      </p:sp>
+      <p:sp>
+        <p:nvSpPr>
+          <p:cNvPr id="3" name="Content Placeholder 2"/>
+          <p:cNvSpPr>
+            <a:spLocks noGrp="1"/>
+          </p:cNvSpPr>
+          <p:nvPr>
+            <p:ph idx="1"/>
+          </p:nvPr>
+        </p:nvSpPr>
+        <p:spPr/>
+        <p:txBody>
+          <a:bodyPr/>
+          <a:lstStyle/>
+          <a:p>
+            <a:endParaRPr lang="en-US"/>
+          </a:p>
+        </p:txBody>
+      </p:sp>
+    </p:spTree>
+    <p:extLst>
+      <p:ext uri="{BB962C8B-B14F-4D97-AF65-F5344CB8AC3E}">
+        <p14:creationId xmlns:p14="http://schemas.microsoft.com/office/powerpoint/2010/main" val="3492191647"/>
+      </p:ext>
+    </p:extLst>
+  </p:cSld>
+  <p:clrMapOvr>
+    <a:masterClrMapping/>
+  </p:clrMapOvr>
+</p:sld>
+</file>
+
+<file path=ppt/slides/slide24.xml><?xml version="1.0" encoding="utf-8"?>
+<p:sld xmlns:a="http://schemas.openxmlformats.org/drawingml/2006/main" xmlns:r="http://schemas.openxmlformats.org/officeDocument/2006/relationships" xmlns:p="http://schemas.openxmlformats.org/presentationml/2006/main">
+  <p:cSld>
+    <p:spTree>
+      <p:nvGrpSpPr>
+        <p:cNvPr id="1" name=""/>
+        <p:cNvGrpSpPr/>
+        <p:nvPr/>
+      </p:nvGrpSpPr>
+      <p:grpSpPr>
+        <a:xfrm>
+          <a:off x="0" y="0"/>
+          <a:ext cx="0" cy="0"/>
+          <a:chOff x="0" y="0"/>
+          <a:chExt cx="0" cy="0"/>
+        </a:xfrm>
+      </p:grpSpPr>
+      <p:sp>
+        <p:nvSpPr>
+          <p:cNvPr id="2" name="Title 1"/>
+          <p:cNvSpPr>
+            <a:spLocks noGrp="1"/>
+          </p:cNvSpPr>
+          <p:nvPr>
+            <p:ph type="title"/>
+          </p:nvPr>
+        </p:nvSpPr>
+        <p:spPr/>
+        <p:txBody>
+          <a:bodyPr/>
+          <a:lstStyle/>
+          <a:p>
+            <a:r>
+              <a:rPr lang="en-US" dirty="0" smtClean="0"/>
+              <a:t>Introducing ggplot2</a:t>
+            </a:r>
+            <a:endParaRPr lang="en-US" dirty="0"/>
+          </a:p>
+        </p:txBody>
+      </p:sp>
+      <p:sp>
+        <p:nvSpPr>
+          <p:cNvPr id="3" name="Content Placeholder 2"/>
+          <p:cNvSpPr>
+            <a:spLocks noGrp="1"/>
+          </p:cNvSpPr>
+          <p:nvPr>
+            <p:ph idx="1"/>
+          </p:nvPr>
+        </p:nvSpPr>
+        <p:spPr/>
+        <p:txBody>
+          <a:bodyPr/>
+          <a:lstStyle/>
+          <a:p>
+            <a:endParaRPr lang="en-US"/>
+          </a:p>
+        </p:txBody>
+      </p:sp>
+    </p:spTree>
+    <p:extLst>
+      <p:ext uri="{BB962C8B-B14F-4D97-AF65-F5344CB8AC3E}">
+        <p14:creationId xmlns:p14="http://schemas.microsoft.com/office/powerpoint/2010/main" val="781685326"/>
+      </p:ext>
+    </p:extLst>
+  </p:cSld>
+  <p:clrMapOvr>
+    <a:masterClrMapping/>
+  </p:clrMapOvr>
+</p:sld>
+</file>
+
+<file path=ppt/slides/slide25.xml><?xml version="1.0" encoding="utf-8"?>
+<p:sld xmlns:a="http://schemas.openxmlformats.org/drawingml/2006/main" xmlns:r="http://schemas.openxmlformats.org/officeDocument/2006/relationships" xmlns:p="http://schemas.openxmlformats.org/presentationml/2006/main">
+  <p:cSld>
+    <p:spTree>
+      <p:nvGrpSpPr>
+        <p:cNvPr id="1" name=""/>
+        <p:cNvGrpSpPr/>
+        <p:nvPr/>
+      </p:nvGrpSpPr>
+      <p:grpSpPr>
+        <a:xfrm>
+          <a:off x="0" y="0"/>
+          <a:ext cx="0" cy="0"/>
+          <a:chOff x="0" y="0"/>
+          <a:chExt cx="0" cy="0"/>
+        </a:xfrm>
+      </p:grpSpPr>
+      <p:sp>
+        <p:nvSpPr>
+          <p:cNvPr id="2" name="Title 1"/>
+          <p:cNvSpPr>
+            <a:spLocks noGrp="1"/>
+          </p:cNvSpPr>
+          <p:nvPr>
+            <p:ph type="title"/>
+          </p:nvPr>
+        </p:nvSpPr>
+        <p:spPr/>
+        <p:txBody>
+          <a:bodyPr/>
+          <a:lstStyle/>
+          <a:p>
+            <a:r>
+              <a:rPr lang="en-US" dirty="0" smtClean="0"/>
+              <a:t>Wide </a:t>
+            </a:r>
+            <a:r>
+              <a:rPr lang="en-US" dirty="0" err="1" smtClean="0"/>
+              <a:t>vs</a:t>
+            </a:r>
+            <a:r>
+              <a:rPr lang="en-US" dirty="0" smtClean="0"/>
+              <a:t> long format</a:t>
+            </a:r>
+            <a:endParaRPr lang="en-US" dirty="0"/>
+          </a:p>
+        </p:txBody>
+      </p:sp>
+      <p:pic>
+        <p:nvPicPr>
+          <p:cNvPr id="4" name="Picture 3"/>
+          <p:cNvPicPr>
+            <a:picLocks noChangeAspect="1"/>
+          </p:cNvPicPr>
+          <p:nvPr/>
+        </p:nvPicPr>
+        <p:blipFill>
+          <a:blip r:embed="rId2"/>
+          <a:stretch>
+            <a:fillRect/>
+          </a:stretch>
+        </p:blipFill>
+        <p:spPr>
+          <a:xfrm>
+            <a:off x="0" y="1905000"/>
+            <a:ext cx="9144000" cy="3039299"/>
+          </a:xfrm>
+          <a:prstGeom prst="rect">
+            <a:avLst/>
+          </a:prstGeom>
+        </p:spPr>
+      </p:pic>
+    </p:spTree>
+    <p:extLst>
+      <p:ext uri="{BB962C8B-B14F-4D97-AF65-F5344CB8AC3E}">
+        <p14:creationId xmlns:p14="http://schemas.microsoft.com/office/powerpoint/2010/main" val="801179063"/>
+      </p:ext>
+    </p:extLst>
+  </p:cSld>
+  <p:clrMapOvr>
+    <a:masterClrMapping/>
+  </p:clrMapOvr>
+</p:sld>
+</file>
+
+<file path=ppt/slides/slide26.xml><?xml version="1.0" encoding="utf-8"?>
+<p:sld xmlns:a="http://schemas.openxmlformats.org/drawingml/2006/main" xmlns:r="http://schemas.openxmlformats.org/officeDocument/2006/relationships" xmlns:p="http://schemas.openxmlformats.org/presentationml/2006/main">
+  <p:cSld>
+    <p:spTree>
+      <p:nvGrpSpPr>
+        <p:cNvPr id="1" name=""/>
+        <p:cNvGrpSpPr/>
+        <p:nvPr/>
+      </p:nvGrpSpPr>
+      <p:grpSpPr>
+        <a:xfrm>
+          <a:off x="0" y="0"/>
+          <a:ext cx="0" cy="0"/>
+          <a:chOff x="0" y="0"/>
+          <a:chExt cx="0" cy="0"/>
+        </a:xfrm>
+      </p:grpSpPr>
+      <p:sp>
+        <p:nvSpPr>
+          <p:cNvPr id="2" name="Title 1"/>
+          <p:cNvSpPr>
+            <a:spLocks noGrp="1"/>
+          </p:cNvSpPr>
+          <p:nvPr>
+            <p:ph type="title"/>
+          </p:nvPr>
+        </p:nvSpPr>
+        <p:spPr/>
+        <p:txBody>
+          <a:bodyPr/>
+          <a:lstStyle/>
+          <a:p>
+            <a:endParaRPr lang="en-US"/>
+          </a:p>
+        </p:txBody>
+      </p:sp>
+      <p:sp>
+        <p:nvSpPr>
+          <p:cNvPr id="3" name="Content Placeholder 2"/>
+          <p:cNvSpPr>
+            <a:spLocks noGrp="1"/>
+          </p:cNvSpPr>
+          <p:nvPr>
+            <p:ph idx="1"/>
+          </p:nvPr>
+        </p:nvSpPr>
+        <p:spPr/>
+        <p:txBody>
+          <a:bodyPr/>
+          <a:lstStyle/>
+          <a:p>
+            <a:endParaRPr lang="en-US"/>
+          </a:p>
+        </p:txBody>
+      </p:sp>
+    </p:spTree>
+    <p:extLst>
+      <p:ext uri="{BB962C8B-B14F-4D97-AF65-F5344CB8AC3E}">
+        <p14:creationId xmlns:p14="http://schemas.microsoft.com/office/powerpoint/2010/main" val="1751816862"/>
+      </p:ext>
+    </p:extLst>
+  </p:cSld>
+  <p:clrMapOvr>
+    <a:masterClrMapping/>
+  </p:clrMapOvr>
+</p:sld>
+</file>
+
+<file path=ppt/slides/slide27.xml><?xml version="1.0" encoding="utf-8"?>
+<p:sld xmlns:a="http://schemas.openxmlformats.org/drawingml/2006/main" xmlns:r="http://schemas.openxmlformats.org/officeDocument/2006/relationships" xmlns:p="http://schemas.openxmlformats.org/presentationml/2006/main">
+  <p:cSld>
+    <p:spTree>
+      <p:nvGrpSpPr>
+        <p:cNvPr id="1" name=""/>
+        <p:cNvGrpSpPr/>
+        <p:nvPr/>
+      </p:nvGrpSpPr>
+      <p:grpSpPr>
+        <a:xfrm>
+          <a:off x="0" y="0"/>
+          <a:ext cx="0" cy="0"/>
+          <a:chOff x="0" y="0"/>
+          <a:chExt cx="0" cy="0"/>
+        </a:xfrm>
+      </p:grpSpPr>
+      <p:sp>
+        <p:nvSpPr>
+          <p:cNvPr id="2" name="Title 1"/>
+          <p:cNvSpPr>
+            <a:spLocks noGrp="1"/>
+          </p:cNvSpPr>
+          <p:nvPr>
+            <p:ph type="title"/>
+          </p:nvPr>
+        </p:nvSpPr>
+        <p:spPr/>
+        <p:txBody>
+          <a:bodyPr/>
+          <a:lstStyle/>
+          <a:p>
+            <a:r>
+              <a:rPr lang="en-US" dirty="0" smtClean="0"/>
+              <a:t>Interactive graphics with R shiny</a:t>
+            </a:r>
+            <a:endParaRPr lang="en-US" dirty="0"/>
+          </a:p>
+        </p:txBody>
+      </p:sp>
+      <p:sp>
+        <p:nvSpPr>
+          <p:cNvPr id="3" name="Content Placeholder 2"/>
+          <p:cNvSpPr>
+            <a:spLocks noGrp="1"/>
+          </p:cNvSpPr>
+          <p:nvPr>
+            <p:ph idx="1"/>
+          </p:nvPr>
+        </p:nvSpPr>
+        <p:spPr/>
+        <p:txBody>
+          <a:bodyPr>
+            <a:normAutofit/>
+          </a:bodyPr>
+          <a:lstStyle/>
+          <a:p>
+            <a:r>
+              <a:rPr lang="en-US" sz="2800" dirty="0" smtClean="0"/>
+              <a:t>Optimizing a graphic often requires multiple iterative alterations</a:t>
+            </a:r>
+          </a:p>
+          <a:p>
+            <a:r>
+              <a:rPr lang="en-US" sz="2800" dirty="0" smtClean="0"/>
+              <a:t>Analysis and interpretation often benefits from active filtering, variable selection, and parameterization</a:t>
+            </a:r>
+          </a:p>
+          <a:p>
+            <a:r>
+              <a:rPr lang="en-US" sz="2800" dirty="0" smtClean="0"/>
+              <a:t>Interactive graphics allow end-users, especially non-experts, to more effectively explore data</a:t>
+            </a:r>
+          </a:p>
+          <a:p>
+            <a:r>
+              <a:rPr lang="en-US" sz="2800" dirty="0" smtClean="0"/>
+              <a:t>The R shiny package allows you to quickly and easily create sophisticated web-accessible interactive graphics</a:t>
+            </a:r>
+            <a:endParaRPr lang="en-US" sz="2800" dirty="0"/>
+          </a:p>
+        </p:txBody>
+      </p:sp>
+    </p:spTree>
+    <p:extLst>
+      <p:ext uri="{BB962C8B-B14F-4D97-AF65-F5344CB8AC3E}">
+        <p14:creationId xmlns:p14="http://schemas.microsoft.com/office/powerpoint/2010/main" val="2141840622"/>
+      </p:ext>
+    </p:extLst>
+  </p:cSld>
+  <p:clrMapOvr>
+    <a:masterClrMapping/>
+  </p:clrMapOvr>
+</p:sld>
+</file>
+
+<file path=ppt/slides/slide28.xml><?xml version="1.0" encoding="utf-8"?>
+<p:sld xmlns:a="http://schemas.openxmlformats.org/drawingml/2006/main" xmlns:r="http://schemas.openxmlformats.org/officeDocument/2006/relationships" xmlns:p="http://schemas.openxmlformats.org/presentationml/2006/main">
+  <p:cSld>
+    <p:spTree>
+      <p:nvGrpSpPr>
+        <p:cNvPr id="1" name=""/>
+        <p:cNvGrpSpPr/>
+        <p:nvPr/>
+      </p:nvGrpSpPr>
+      <p:grpSpPr>
+        <a:xfrm>
+          <a:off x="0" y="0"/>
+          <a:ext cx="0" cy="0"/>
+          <a:chOff x="0" y="0"/>
+          <a:chExt cx="0" cy="0"/>
+        </a:xfrm>
+      </p:grpSpPr>
+      <p:sp>
+        <p:nvSpPr>
+          <p:cNvPr id="2" name="Title 1"/>
+          <p:cNvSpPr>
+            <a:spLocks noGrp="1"/>
+          </p:cNvSpPr>
+          <p:nvPr>
+            <p:ph type="title"/>
+          </p:nvPr>
+        </p:nvSpPr>
+        <p:spPr/>
+        <p:txBody>
+          <a:bodyPr/>
+          <a:lstStyle/>
+          <a:p>
+            <a:r>
+              <a:rPr lang="en-US" dirty="0" smtClean="0"/>
+              <a:t>Basic organization of a shiny application</a:t>
+            </a:r>
+            <a:endParaRPr lang="en-US" dirty="0"/>
+          </a:p>
+        </p:txBody>
+      </p:sp>
+      <p:sp>
+        <p:nvSpPr>
+          <p:cNvPr id="5" name="TextBox 4"/>
+          <p:cNvSpPr txBox="1"/>
+          <p:nvPr/>
+        </p:nvSpPr>
+        <p:spPr>
+          <a:xfrm>
+            <a:off x="3945463" y="2379940"/>
+            <a:ext cx="1170362" cy="830997"/>
+          </a:xfrm>
+          <a:prstGeom prst="rect">
+            <a:avLst/>
+          </a:prstGeom>
+          <a:noFill/>
+        </p:spPr>
+        <p:txBody>
+          <a:bodyPr wrap="none" rtlCol="0">
+            <a:spAutoFit/>
+          </a:bodyPr>
+          <a:lstStyle/>
+          <a:p>
+            <a:pPr algn="ctr"/>
+            <a:r>
+              <a:rPr lang="en-US" sz="2400" dirty="0" err="1" smtClean="0"/>
+              <a:t>shinyUI</a:t>
+            </a:r>
+            <a:endParaRPr lang="en-US" sz="2400" dirty="0" smtClean="0"/>
+          </a:p>
+          <a:p>
+            <a:pPr algn="ctr"/>
+            <a:r>
+              <a:rPr lang="en-US" sz="2400" dirty="0" err="1" smtClean="0"/>
+              <a:t>ui.R</a:t>
+            </a:r>
+            <a:endParaRPr lang="en-US" sz="2400" dirty="0"/>
+          </a:p>
+        </p:txBody>
+      </p:sp>
+      <p:sp>
+        <p:nvSpPr>
+          <p:cNvPr id="6" name="TextBox 5"/>
+          <p:cNvSpPr txBox="1"/>
+          <p:nvPr/>
+        </p:nvSpPr>
+        <p:spPr>
+          <a:xfrm>
+            <a:off x="3633276" y="1032941"/>
+            <a:ext cx="1758865" cy="830997"/>
+          </a:xfrm>
+          <a:prstGeom prst="rect">
+            <a:avLst/>
+          </a:prstGeom>
+          <a:noFill/>
+        </p:spPr>
+        <p:txBody>
+          <a:bodyPr wrap="none" rtlCol="0">
+            <a:spAutoFit/>
+          </a:bodyPr>
+          <a:lstStyle/>
+          <a:p>
+            <a:pPr algn="ctr"/>
+            <a:r>
+              <a:rPr lang="en-US" sz="2400" dirty="0" err="1" smtClean="0"/>
+              <a:t>shinyServer</a:t>
+            </a:r>
+            <a:endParaRPr lang="en-US" sz="2400" dirty="0" smtClean="0"/>
+          </a:p>
+          <a:p>
+            <a:pPr algn="ctr"/>
+            <a:r>
+              <a:rPr lang="en-US" sz="2400" dirty="0" err="1" smtClean="0"/>
+              <a:t>server.R</a:t>
+            </a:r>
+            <a:endParaRPr lang="en-US" sz="2400" dirty="0"/>
+          </a:p>
+        </p:txBody>
+      </p:sp>
+      <p:sp>
+        <p:nvSpPr>
+          <p:cNvPr id="9" name="Curved Left Arrow 8"/>
+          <p:cNvSpPr/>
+          <p:nvPr/>
+        </p:nvSpPr>
+        <p:spPr>
+          <a:xfrm>
+            <a:off x="5529772" y="1337735"/>
+            <a:ext cx="853657" cy="1659469"/>
+          </a:xfrm>
+          <a:prstGeom prst="curvedLeftArrow">
+            <a:avLst/>
+          </a:prstGeom>
+        </p:spPr>
+        <p:style>
+          <a:lnRef idx="1">
+            <a:schemeClr val="dk1"/>
+          </a:lnRef>
+          <a:fillRef idx="3">
+            <a:schemeClr val="dk1"/>
+          </a:fillRef>
+          <a:effectRef idx="2">
+            <a:schemeClr val="dk1"/>
+          </a:effectRef>
+          <a:fontRef idx="minor">
+            <a:schemeClr val="lt1"/>
+          </a:fontRef>
+        </p:style>
+        <p:txBody>
+          <a:bodyPr rtlCol="0" anchor="ctr"/>
+          <a:lstStyle/>
+          <a:p>
+            <a:pPr algn="ctr"/>
+            <a:endParaRPr lang="en-US">
+              <a:solidFill>
+                <a:schemeClr val="bg1">
+                  <a:lumMod val="65000"/>
+                </a:schemeClr>
+              </a:solidFill>
+            </a:endParaRPr>
+          </a:p>
+        </p:txBody>
+      </p:sp>
+      <p:pic>
+        <p:nvPicPr>
+          <p:cNvPr id="15" name="Picture 14"/>
+          <p:cNvPicPr>
+            <a:picLocks noChangeAspect="1"/>
+          </p:cNvPicPr>
+          <p:nvPr/>
+        </p:nvPicPr>
+        <p:blipFill>
+          <a:blip r:embed="rId2"/>
+          <a:stretch>
+            <a:fillRect/>
+          </a:stretch>
+        </p:blipFill>
+        <p:spPr>
+          <a:xfrm>
+            <a:off x="643466" y="3282658"/>
+            <a:ext cx="7772400" cy="2737104"/>
+          </a:xfrm>
+          <a:prstGeom prst="rect">
+            <a:avLst/>
+          </a:prstGeom>
+        </p:spPr>
+      </p:pic>
+      <p:sp>
+        <p:nvSpPr>
+          <p:cNvPr id="16" name="Curved Left Arrow 15"/>
+          <p:cNvSpPr/>
+          <p:nvPr/>
+        </p:nvSpPr>
+        <p:spPr>
+          <a:xfrm rot="10800000">
+            <a:off x="2685031" y="1236140"/>
+            <a:ext cx="853657" cy="1659469"/>
+          </a:xfrm>
+          <a:prstGeom prst="curvedLeftArrow">
+            <a:avLst/>
+          </a:prstGeom>
+        </p:spPr>
+        <p:style>
+          <a:lnRef idx="1">
+            <a:schemeClr val="dk1"/>
+          </a:lnRef>
+          <a:fillRef idx="3">
+            <a:schemeClr val="dk1"/>
+          </a:fillRef>
+          <a:effectRef idx="2">
+            <a:schemeClr val="dk1"/>
+          </a:effectRef>
+          <a:fontRef idx="minor">
+            <a:schemeClr val="lt1"/>
+          </a:fontRef>
+        </p:style>
+        <p:txBody>
+          <a:bodyPr rtlCol="0" anchor="ctr"/>
+          <a:lstStyle/>
+          <a:p>
+            <a:pPr algn="ctr"/>
+            <a:endParaRPr lang="en-US">
+              <a:solidFill>
+                <a:schemeClr val="bg1">
+                  <a:lumMod val="65000"/>
+                </a:schemeClr>
+              </a:solidFill>
+            </a:endParaRPr>
+          </a:p>
+        </p:txBody>
+      </p:sp>
+      <p:sp>
+        <p:nvSpPr>
+          <p:cNvPr id="17" name="TextBox 16"/>
+          <p:cNvSpPr txBox="1"/>
+          <p:nvPr/>
+        </p:nvSpPr>
+        <p:spPr>
+          <a:xfrm>
+            <a:off x="1337728" y="1630070"/>
+            <a:ext cx="1117600" cy="954107"/>
+          </a:xfrm>
+          <a:prstGeom prst="rect">
+            <a:avLst/>
+          </a:prstGeom>
+          <a:noFill/>
+        </p:spPr>
+        <p:txBody>
+          <a:bodyPr wrap="square" rtlCol="0">
+            <a:spAutoFit/>
+          </a:bodyPr>
+          <a:lstStyle/>
+          <a:p>
+            <a:pPr algn="ctr"/>
+            <a:r>
+              <a:rPr lang="en-US" sz="2800" dirty="0" smtClean="0"/>
+              <a:t>User input</a:t>
+            </a:r>
+            <a:endParaRPr lang="en-US" sz="2800" dirty="0"/>
+          </a:p>
+        </p:txBody>
+      </p:sp>
+      <p:sp>
+        <p:nvSpPr>
+          <p:cNvPr id="18" name="TextBox 17"/>
+          <p:cNvSpPr txBox="1"/>
+          <p:nvPr/>
+        </p:nvSpPr>
+        <p:spPr>
+          <a:xfrm>
+            <a:off x="6570127" y="1647003"/>
+            <a:ext cx="1524008" cy="954107"/>
+          </a:xfrm>
+          <a:prstGeom prst="rect">
+            <a:avLst/>
+          </a:prstGeom>
+          <a:noFill/>
+        </p:spPr>
+        <p:txBody>
+          <a:bodyPr wrap="square" rtlCol="0">
+            <a:spAutoFit/>
+          </a:bodyPr>
+          <a:lstStyle/>
+          <a:p>
+            <a:pPr algn="ctr"/>
+            <a:r>
+              <a:rPr lang="en-US" sz="2800" dirty="0" smtClean="0"/>
+              <a:t>R output</a:t>
+            </a:r>
+            <a:endParaRPr lang="en-US" sz="2800" dirty="0"/>
+          </a:p>
+        </p:txBody>
+      </p:sp>
+      <p:sp>
+        <p:nvSpPr>
+          <p:cNvPr id="19" name="TextBox 18"/>
+          <p:cNvSpPr txBox="1"/>
+          <p:nvPr/>
+        </p:nvSpPr>
+        <p:spPr>
+          <a:xfrm>
+            <a:off x="1202962" y="6144335"/>
+            <a:ext cx="6806821" cy="523220"/>
+          </a:xfrm>
+          <a:prstGeom prst="rect">
+            <a:avLst/>
+          </a:prstGeom>
+          <a:noFill/>
+        </p:spPr>
+        <p:txBody>
+          <a:bodyPr wrap="none" rtlCol="0">
+            <a:spAutoFit/>
+          </a:bodyPr>
+          <a:lstStyle/>
+          <a:p>
+            <a:r>
+              <a:rPr lang="en-US" sz="2800" dirty="0" smtClean="0"/>
+              <a:t>Interactive User Interface (UI) = website</a:t>
+            </a:r>
+            <a:endParaRPr lang="en-US" sz="2800" dirty="0"/>
+          </a:p>
+        </p:txBody>
+      </p:sp>
+    </p:spTree>
+    <p:extLst>
+      <p:ext uri="{BB962C8B-B14F-4D97-AF65-F5344CB8AC3E}">
+        <p14:creationId xmlns:p14="http://schemas.microsoft.com/office/powerpoint/2010/main" val="2373662838"/>
+      </p:ext>
+    </p:extLst>
+  </p:cSld>
+  <p:clrMapOvr>
+    <a:masterClrMapping/>
+  </p:clrMapOvr>
+</p:sld>
+</file>
+
 <file path=ppt/slides/slide3.xml><?xml version="1.0" encoding="utf-8"?>
 <p:sld xmlns:a="http://schemas.openxmlformats.org/drawingml/2006/main" xmlns:r="http://schemas.openxmlformats.org/officeDocument/2006/relationships" xmlns:p="http://schemas.openxmlformats.org/presentationml/2006/main">
   <p:cSld>
@@ -3329,11 +5762,7 @@
           <a:p>
             <a:r>
               <a:rPr lang="en-US" dirty="0" smtClean="0"/>
-              <a:t>Module </a:t>
-            </a:r>
-            <a:r>
-              <a:rPr lang="en-US" dirty="0" smtClean="0"/>
-              <a:t>3: </a:t>
+              <a:t>Module 3: </a:t>
             </a:r>
             <a:r>
               <a:rPr lang="en-US" dirty="0"/>
@@ -3355,11 +5784,7 @@
           <a:p>
             <a:r>
               <a:rPr lang="en-US" dirty="0" smtClean="0"/>
-              <a:t>Module </a:t>
-            </a:r>
-            <a:r>
-              <a:rPr lang="en-US" dirty="0" smtClean="0"/>
-              <a:t>5</a:t>
+              <a:t>Module 5</a:t>
             </a:r>
             <a:r>
               <a:rPr lang="en-US" dirty="0"/>
@@ -3370,11 +5795,7 @@
           <a:p>
             <a:r>
               <a:rPr lang="en-US" dirty="0" smtClean="0"/>
-              <a:t>Module </a:t>
-            </a:r>
-            <a:r>
-              <a:rPr lang="en-US" dirty="0" smtClean="0"/>
-              <a:t>6</a:t>
+              <a:t>Module 6</a:t>
             </a:r>
             <a:r>
               <a:rPr lang="en-US" dirty="0"/>
@@ -3487,19 +5908,38 @@
           <a:lstStyle/>
           <a:p>
             <a:r>
+              <a:rPr lang="en-US" dirty="0" smtClean="0"/>
+              <a:t>Review basic R usage</a:t>
+            </a:r>
+          </a:p>
+          <a:p>
+            <a:r>
+              <a:rPr lang="en-US" dirty="0" smtClean="0"/>
+              <a:t>Learn </a:t>
+            </a:r>
+            <a:r>
               <a:rPr lang="en-US" dirty="0"/>
-              <a:t>Using R for genomic data visualization and </a:t>
-            </a:r>
-            <a:r>
-              <a:rPr lang="en-US" dirty="0" smtClean="0"/>
-              <a:t>interpretation</a:t>
-            </a:r>
-          </a:p>
-          <a:p>
-            <a:pPr lvl="1"/>
-            <a:r>
-              <a:rPr lang="mr-IN" smtClean="0"/>
-              <a:t>…</a:t>
+              <a:t>to use R for basic data manipulation</a:t>
+            </a:r>
+          </a:p>
+          <a:p>
+            <a:r>
+              <a:rPr lang="en-US" dirty="0" smtClean="0"/>
+              <a:t>Learn </a:t>
+            </a:r>
+            <a:r>
+              <a:rPr lang="en-US" dirty="0"/>
+              <a:t>to create publication quality graphs to display data</a:t>
+            </a:r>
+          </a:p>
+          <a:p>
+            <a:r>
+              <a:rPr lang="en-US" dirty="0" smtClean="0"/>
+              <a:t>Learn </a:t>
+            </a:r>
+            <a:r>
+              <a:rPr lang="en-US" dirty="0"/>
+              <a:t>to create interactive graphics</a:t>
             </a:r>
             <a:endParaRPr lang="en-US" dirty="0"/>
           </a:p>
@@ -3522,6 +5962,781 @@
       </p:par>
     </p:tnLst>
   </p:timing>
+</p:sld>
+</file>
+
+<file path=ppt/slides/slide5.xml><?xml version="1.0" encoding="utf-8"?>
+<p:sld xmlns:a="http://schemas.openxmlformats.org/drawingml/2006/main" xmlns:r="http://schemas.openxmlformats.org/officeDocument/2006/relationships" xmlns:p="http://schemas.openxmlformats.org/presentationml/2006/main">
+  <p:cSld>
+    <p:spTree>
+      <p:nvGrpSpPr>
+        <p:cNvPr id="1" name=""/>
+        <p:cNvGrpSpPr/>
+        <p:nvPr/>
+      </p:nvGrpSpPr>
+      <p:grpSpPr>
+        <a:xfrm>
+          <a:off x="0" y="0"/>
+          <a:ext cx="0" cy="0"/>
+          <a:chOff x="0" y="0"/>
+          <a:chExt cx="0" cy="0"/>
+        </a:xfrm>
+      </p:grpSpPr>
+      <p:sp>
+        <p:nvSpPr>
+          <p:cNvPr id="2" name="Title 1"/>
+          <p:cNvSpPr>
+            <a:spLocks noGrp="1"/>
+          </p:cNvSpPr>
+          <p:nvPr>
+            <p:ph type="title"/>
+          </p:nvPr>
+        </p:nvSpPr>
+        <p:spPr/>
+        <p:txBody>
+          <a:bodyPr/>
+          <a:lstStyle/>
+          <a:p>
+            <a:r>
+              <a:rPr lang="en-US" dirty="0" smtClean="0"/>
+              <a:t>A brief history of R</a:t>
+            </a:r>
+            <a:endParaRPr lang="en-US" dirty="0"/>
+          </a:p>
+        </p:txBody>
+      </p:sp>
+      <p:sp>
+        <p:nvSpPr>
+          <p:cNvPr id="3" name="Content Placeholder 2"/>
+          <p:cNvSpPr>
+            <a:spLocks noGrp="1"/>
+          </p:cNvSpPr>
+          <p:nvPr>
+            <p:ph idx="1"/>
+          </p:nvPr>
+        </p:nvSpPr>
+        <p:spPr/>
+        <p:txBody>
+          <a:bodyPr>
+            <a:normAutofit/>
+          </a:bodyPr>
+          <a:lstStyle/>
+          <a:p>
+            <a:r>
+              <a:rPr lang="en-US" dirty="0"/>
+              <a:t>R is an implementation of the S programming language combined with lexical scoping semantics inspired by Scheme</a:t>
+            </a:r>
+            <a:r>
+              <a:rPr lang="en-US" dirty="0" smtClean="0"/>
+              <a:t>.</a:t>
+            </a:r>
+          </a:p>
+          <a:p>
+            <a:r>
+              <a:rPr lang="en-US" dirty="0" smtClean="0"/>
+              <a:t>S </a:t>
+            </a:r>
+            <a:r>
+              <a:rPr lang="en-US" dirty="0"/>
+              <a:t>was created by John Chambers while at Bell </a:t>
+            </a:r>
+            <a:r>
+              <a:rPr lang="en-US" dirty="0" smtClean="0"/>
+              <a:t>Labs</a:t>
+            </a:r>
+          </a:p>
+          <a:p>
+            <a:r>
+              <a:rPr lang="en-US" dirty="0" smtClean="0"/>
+              <a:t>There </a:t>
+            </a:r>
+            <a:r>
+              <a:rPr lang="en-US" dirty="0"/>
+              <a:t>are some important differences, but much of the code written for S runs unaltered</a:t>
+            </a:r>
+            <a:r>
+              <a:rPr lang="en-US" dirty="0" smtClean="0"/>
+              <a:t>.</a:t>
+            </a:r>
+            <a:endParaRPr lang="en-US" dirty="0"/>
+          </a:p>
+          <a:p>
+            <a:r>
+              <a:rPr lang="en-US" dirty="0"/>
+              <a:t>R was created by Ross </a:t>
+            </a:r>
+            <a:r>
+              <a:rPr lang="en-US" dirty="0" err="1"/>
+              <a:t>Ihaka</a:t>
+            </a:r>
+            <a:r>
+              <a:rPr lang="en-US" dirty="0"/>
+              <a:t> and Robert </a:t>
+            </a:r>
+            <a:r>
+              <a:rPr lang="en-US" dirty="0" smtClean="0"/>
+              <a:t>Gentleman at </a:t>
+            </a:r>
+            <a:r>
+              <a:rPr lang="en-US" dirty="0"/>
+              <a:t>the University of Auckland, New </a:t>
+            </a:r>
+            <a:r>
+              <a:rPr lang="en-US" dirty="0" smtClean="0"/>
+              <a:t>Zealand</a:t>
+            </a:r>
+          </a:p>
+          <a:p>
+            <a:r>
+              <a:rPr lang="en-US" dirty="0" smtClean="0"/>
+              <a:t>Currently </a:t>
+            </a:r>
+            <a:r>
+              <a:rPr lang="en-US" dirty="0"/>
+              <a:t>developed by the R Development Core Team, of which Chambers is a member</a:t>
+            </a:r>
+            <a:r>
+              <a:rPr lang="en-US" dirty="0" smtClean="0"/>
+              <a:t>.</a:t>
+            </a:r>
+          </a:p>
+          <a:p>
+            <a:r>
+              <a:rPr lang="en-US" dirty="0" smtClean="0"/>
+              <a:t>The R project </a:t>
+            </a:r>
+            <a:r>
+              <a:rPr lang="en-US" dirty="0"/>
+              <a:t>was conceived in 1992, with an initial version released in 1995 and a stable beta version in </a:t>
+            </a:r>
+            <a:r>
+              <a:rPr lang="en-US" dirty="0" smtClean="0"/>
+              <a:t>2000</a:t>
+            </a:r>
+            <a:endParaRPr lang="en-US" dirty="0"/>
+          </a:p>
+        </p:txBody>
+      </p:sp>
+      <p:sp>
+        <p:nvSpPr>
+          <p:cNvPr id="4" name="Rectangle 3"/>
+          <p:cNvSpPr/>
+          <p:nvPr/>
+        </p:nvSpPr>
+        <p:spPr>
+          <a:xfrm>
+            <a:off x="771087" y="6268682"/>
+            <a:ext cx="6568846" cy="369332"/>
+          </a:xfrm>
+          <a:prstGeom prst="rect">
+            <a:avLst/>
+          </a:prstGeom>
+        </p:spPr>
+        <p:txBody>
+          <a:bodyPr wrap="square">
+            <a:spAutoFit/>
+          </a:bodyPr>
+          <a:lstStyle/>
+          <a:p>
+            <a:r>
+              <a:rPr lang="en-US" dirty="0">
+                <a:hlinkClick r:id="rId2"/>
+              </a:rPr>
+              <a:t>https://en.wikipedia.org/wiki/R_(programming_language</a:t>
+            </a:r>
+            <a:r>
+              <a:rPr lang="en-US" dirty="0" smtClean="0"/>
+              <a:t>) </a:t>
+            </a:r>
+            <a:endParaRPr lang="en-US" dirty="0"/>
+          </a:p>
+        </p:txBody>
+      </p:sp>
+    </p:spTree>
+    <p:extLst>
+      <p:ext uri="{BB962C8B-B14F-4D97-AF65-F5344CB8AC3E}">
+        <p14:creationId xmlns:p14="http://schemas.microsoft.com/office/powerpoint/2010/main" val="2736151479"/>
+      </p:ext>
+    </p:extLst>
+  </p:cSld>
+  <p:clrMapOvr>
+    <a:masterClrMapping/>
+  </p:clrMapOvr>
+</p:sld>
+</file>
+
+<file path=ppt/slides/slide6.xml><?xml version="1.0" encoding="utf-8"?>
+<p:sld xmlns:a="http://schemas.openxmlformats.org/drawingml/2006/main" xmlns:r="http://schemas.openxmlformats.org/officeDocument/2006/relationships" xmlns:p="http://schemas.openxmlformats.org/presentationml/2006/main">
+  <p:cSld>
+    <p:spTree>
+      <p:nvGrpSpPr>
+        <p:cNvPr id="1" name=""/>
+        <p:cNvGrpSpPr/>
+        <p:nvPr/>
+      </p:nvGrpSpPr>
+      <p:grpSpPr>
+        <a:xfrm>
+          <a:off x="0" y="0"/>
+          <a:ext cx="0" cy="0"/>
+          <a:chOff x="0" y="0"/>
+          <a:chExt cx="0" cy="0"/>
+        </a:xfrm>
+      </p:grpSpPr>
+      <p:sp>
+        <p:nvSpPr>
+          <p:cNvPr id="7" name="Title 6"/>
+          <p:cNvSpPr>
+            <a:spLocks noGrp="1"/>
+          </p:cNvSpPr>
+          <p:nvPr>
+            <p:ph type="title"/>
+          </p:nvPr>
+        </p:nvSpPr>
+        <p:spPr/>
+        <p:txBody>
+          <a:bodyPr>
+            <a:normAutofit fontScale="90000"/>
+          </a:bodyPr>
+          <a:lstStyle/>
+          <a:p>
+            <a:r>
+              <a:rPr lang="en-US" dirty="0" smtClean="0"/>
+              <a:t>R is available via command-line or a number of integrated development environments (IDE)</a:t>
+            </a:r>
+            <a:endParaRPr lang="en-US" dirty="0"/>
+          </a:p>
+        </p:txBody>
+      </p:sp>
+      <p:pic>
+        <p:nvPicPr>
+          <p:cNvPr id="6" name="Content Placeholder 5" descr="Screenshot 2017-09-08 09.15.26.png"/>
+          <p:cNvPicPr>
+            <a:picLocks noGrp="1" noChangeAspect="1"/>
+          </p:cNvPicPr>
+          <p:nvPr>
+            <p:ph sz="half" idx="1"/>
+          </p:nvPr>
+        </p:nvPicPr>
+        <p:blipFill>
+          <a:blip r:embed="rId2">
+            <a:extLst>
+              <a:ext uri="{28A0092B-C50C-407E-A947-70E740481C1C}">
+                <a14:useLocalDpi xmlns:a14="http://schemas.microsoft.com/office/drawing/2010/main" val="0"/>
+              </a:ext>
+            </a:extLst>
+          </a:blip>
+          <a:srcRect t="-37294" b="-37294"/>
+          <a:stretch>
+            <a:fillRect/>
+          </a:stretch>
+        </p:blipFill>
+        <p:spPr>
+          <a:xfrm>
+            <a:off x="226786" y="1565718"/>
+            <a:ext cx="4197112" cy="5119235"/>
+          </a:xfrm>
+        </p:spPr>
+      </p:pic>
+      <p:pic>
+        <p:nvPicPr>
+          <p:cNvPr id="9" name="Content Placeholder 8" descr="Screenshot 2017-09-08 09.16.35.png"/>
+          <p:cNvPicPr>
+            <a:picLocks noGrp="1" noChangeAspect="1"/>
+          </p:cNvPicPr>
+          <p:nvPr>
+            <p:ph sz="half" idx="2"/>
+          </p:nvPr>
+        </p:nvPicPr>
+        <p:blipFill>
+          <a:blip r:embed="rId3">
+            <a:extLst>
+              <a:ext uri="{28A0092B-C50C-407E-A947-70E740481C1C}">
+                <a14:useLocalDpi xmlns:a14="http://schemas.microsoft.com/office/drawing/2010/main" val="0"/>
+              </a:ext>
+            </a:extLst>
+          </a:blip>
+          <a:srcRect t="-45202" b="-45202"/>
+          <a:stretch>
+            <a:fillRect/>
+          </a:stretch>
+        </p:blipFill>
+        <p:spPr>
+          <a:xfrm>
+            <a:off x="4648200" y="1565718"/>
+            <a:ext cx="4214586" cy="5119235"/>
+          </a:xfrm>
+        </p:spPr>
+      </p:pic>
+      <p:pic>
+        <p:nvPicPr>
+          <p:cNvPr id="10" name="Picture 9"/>
+          <p:cNvPicPr>
+            <a:picLocks noChangeAspect="1"/>
+          </p:cNvPicPr>
+          <p:nvPr/>
+        </p:nvPicPr>
+        <p:blipFill>
+          <a:blip r:embed="rId4"/>
+          <a:stretch>
+            <a:fillRect/>
+          </a:stretch>
+        </p:blipFill>
+        <p:spPr>
+          <a:xfrm>
+            <a:off x="226785" y="914404"/>
+            <a:ext cx="1791975" cy="1388533"/>
+          </a:xfrm>
+          <a:prstGeom prst="rect">
+            <a:avLst/>
+          </a:prstGeom>
+        </p:spPr>
+      </p:pic>
+      <p:pic>
+        <p:nvPicPr>
+          <p:cNvPr id="11" name="Picture 10"/>
+          <p:cNvPicPr>
+            <a:picLocks noChangeAspect="1"/>
+          </p:cNvPicPr>
+          <p:nvPr/>
+        </p:nvPicPr>
+        <p:blipFill>
+          <a:blip r:embed="rId5"/>
+          <a:stretch>
+            <a:fillRect/>
+          </a:stretch>
+        </p:blipFill>
+        <p:spPr>
+          <a:xfrm>
+            <a:off x="4715933" y="914404"/>
+            <a:ext cx="1388533" cy="1388533"/>
+          </a:xfrm>
+          <a:prstGeom prst="rect">
+            <a:avLst/>
+          </a:prstGeom>
+        </p:spPr>
+      </p:pic>
+      <p:sp>
+        <p:nvSpPr>
+          <p:cNvPr id="13" name="Rectangle 12"/>
+          <p:cNvSpPr/>
+          <p:nvPr/>
+        </p:nvSpPr>
+        <p:spPr>
+          <a:xfrm>
+            <a:off x="226786" y="5784339"/>
+            <a:ext cx="4001366" cy="461665"/>
+          </a:xfrm>
+          <a:prstGeom prst="rect">
+            <a:avLst/>
+          </a:prstGeom>
+        </p:spPr>
+        <p:txBody>
+          <a:bodyPr wrap="none">
+            <a:spAutoFit/>
+          </a:bodyPr>
+          <a:lstStyle/>
+          <a:p>
+            <a:r>
+              <a:rPr lang="en-US" sz="2400" dirty="0" smtClean="0">
+                <a:hlinkClick r:id="rId6"/>
+              </a:rPr>
+              <a:t>https://cran.r-project.org/</a:t>
+            </a:r>
+            <a:r>
+              <a:rPr lang="en-US" sz="2400" dirty="0" smtClean="0"/>
+              <a:t> </a:t>
+            </a:r>
+            <a:endParaRPr lang="en-US" sz="2400" dirty="0"/>
+          </a:p>
+        </p:txBody>
+      </p:sp>
+      <p:sp>
+        <p:nvSpPr>
+          <p:cNvPr id="14" name="Rectangle 13"/>
+          <p:cNvSpPr/>
+          <p:nvPr/>
+        </p:nvSpPr>
+        <p:spPr>
+          <a:xfrm>
+            <a:off x="4648200" y="5784339"/>
+            <a:ext cx="3902481" cy="461665"/>
+          </a:xfrm>
+          <a:prstGeom prst="rect">
+            <a:avLst/>
+          </a:prstGeom>
+        </p:spPr>
+        <p:txBody>
+          <a:bodyPr wrap="none">
+            <a:spAutoFit/>
+          </a:bodyPr>
+          <a:lstStyle/>
+          <a:p>
+            <a:r>
+              <a:rPr lang="en-US" sz="2400" dirty="0">
+                <a:hlinkClick r:id="rId7"/>
+              </a:rPr>
+              <a:t>https://www.rstudio.com</a:t>
+            </a:r>
+            <a:r>
+              <a:rPr lang="en-US" sz="2400" dirty="0" smtClean="0">
+                <a:hlinkClick r:id="rId7"/>
+              </a:rPr>
+              <a:t>/</a:t>
+            </a:r>
+            <a:r>
+              <a:rPr lang="en-US" sz="2400" dirty="0" smtClean="0"/>
+              <a:t> </a:t>
+            </a:r>
+            <a:endParaRPr lang="en-US" sz="2400" dirty="0"/>
+          </a:p>
+        </p:txBody>
+      </p:sp>
+      <p:sp>
+        <p:nvSpPr>
+          <p:cNvPr id="15" name="TextBox 14"/>
+          <p:cNvSpPr txBox="1"/>
+          <p:nvPr/>
+        </p:nvSpPr>
+        <p:spPr>
+          <a:xfrm>
+            <a:off x="6180671" y="1785850"/>
+            <a:ext cx="1377300" cy="523220"/>
+          </a:xfrm>
+          <a:prstGeom prst="rect">
+            <a:avLst/>
+          </a:prstGeom>
+          <a:noFill/>
+        </p:spPr>
+        <p:txBody>
+          <a:bodyPr wrap="none" rtlCol="0">
+            <a:spAutoFit/>
+          </a:bodyPr>
+          <a:lstStyle/>
+          <a:p>
+            <a:r>
+              <a:rPr lang="en-US" sz="2800" dirty="0" err="1" smtClean="0"/>
+              <a:t>Rstudio</a:t>
+            </a:r>
+            <a:endParaRPr lang="en-US" sz="2800" dirty="0"/>
+          </a:p>
+        </p:txBody>
+      </p:sp>
+      <p:sp>
+        <p:nvSpPr>
+          <p:cNvPr id="16" name="TextBox 15"/>
+          <p:cNvSpPr txBox="1"/>
+          <p:nvPr/>
+        </p:nvSpPr>
+        <p:spPr>
+          <a:xfrm>
+            <a:off x="2018760" y="1779717"/>
+            <a:ext cx="1665139" cy="523220"/>
+          </a:xfrm>
+          <a:prstGeom prst="rect">
+            <a:avLst/>
+          </a:prstGeom>
+          <a:noFill/>
+        </p:spPr>
+        <p:txBody>
+          <a:bodyPr wrap="none" rtlCol="0">
+            <a:spAutoFit/>
+          </a:bodyPr>
+          <a:lstStyle/>
+          <a:p>
+            <a:r>
+              <a:rPr lang="en-US" sz="2800" dirty="0" smtClean="0"/>
+              <a:t>R Project</a:t>
+            </a:r>
+            <a:endParaRPr lang="en-US" sz="2800" dirty="0"/>
+          </a:p>
+        </p:txBody>
+      </p:sp>
+      <p:sp>
+        <p:nvSpPr>
+          <p:cNvPr id="17" name="TextBox 16"/>
+          <p:cNvSpPr txBox="1"/>
+          <p:nvPr/>
+        </p:nvSpPr>
+        <p:spPr>
+          <a:xfrm>
+            <a:off x="226786" y="6366940"/>
+            <a:ext cx="2678963" cy="369332"/>
+          </a:xfrm>
+          <a:prstGeom prst="rect">
+            <a:avLst/>
+          </a:prstGeom>
+          <a:noFill/>
+        </p:spPr>
+        <p:txBody>
+          <a:bodyPr wrap="none" rtlCol="0">
+            <a:spAutoFit/>
+          </a:bodyPr>
+          <a:lstStyle/>
+          <a:p>
+            <a:r>
+              <a:rPr lang="en-US" dirty="0" smtClean="0"/>
+              <a:t>Open-source, non-profit</a:t>
+            </a:r>
+            <a:endParaRPr lang="en-US" dirty="0"/>
+          </a:p>
+        </p:txBody>
+      </p:sp>
+      <p:sp>
+        <p:nvSpPr>
+          <p:cNvPr id="18" name="TextBox 17"/>
+          <p:cNvSpPr txBox="1"/>
+          <p:nvPr/>
+        </p:nvSpPr>
+        <p:spPr>
+          <a:xfrm>
+            <a:off x="4715933" y="6366940"/>
+            <a:ext cx="3526664" cy="369332"/>
+          </a:xfrm>
+          <a:prstGeom prst="rect">
+            <a:avLst/>
+          </a:prstGeom>
+          <a:noFill/>
+        </p:spPr>
+        <p:txBody>
+          <a:bodyPr wrap="none" rtlCol="0">
+            <a:spAutoFit/>
+          </a:bodyPr>
+          <a:lstStyle/>
+          <a:p>
+            <a:r>
+              <a:rPr lang="en-US" dirty="0" smtClean="0"/>
+              <a:t>Open-source, free + commercial</a:t>
+            </a:r>
+            <a:endParaRPr lang="en-US" dirty="0"/>
+          </a:p>
+        </p:txBody>
+      </p:sp>
+    </p:spTree>
+    <p:extLst>
+      <p:ext uri="{BB962C8B-B14F-4D97-AF65-F5344CB8AC3E}">
+        <p14:creationId xmlns:p14="http://schemas.microsoft.com/office/powerpoint/2010/main" val="2087737777"/>
+      </p:ext>
+    </p:extLst>
+  </p:cSld>
+  <p:clrMapOvr>
+    <a:masterClrMapping/>
+  </p:clrMapOvr>
+</p:sld>
+</file>
+
+<file path=ppt/slides/slide7.xml><?xml version="1.0" encoding="utf-8"?>
+<p:sld xmlns:a="http://schemas.openxmlformats.org/drawingml/2006/main" xmlns:r="http://schemas.openxmlformats.org/officeDocument/2006/relationships" xmlns:p="http://schemas.openxmlformats.org/presentationml/2006/main">
+  <p:cSld>
+    <p:spTree>
+      <p:nvGrpSpPr>
+        <p:cNvPr id="1" name=""/>
+        <p:cNvGrpSpPr/>
+        <p:nvPr/>
+      </p:nvGrpSpPr>
+      <p:grpSpPr>
+        <a:xfrm>
+          <a:off x="0" y="0"/>
+          <a:ext cx="0" cy="0"/>
+          <a:chOff x="0" y="0"/>
+          <a:chExt cx="0" cy="0"/>
+        </a:xfrm>
+      </p:grpSpPr>
+      <p:sp>
+        <p:nvSpPr>
+          <p:cNvPr id="5" name="Title 4"/>
+          <p:cNvSpPr>
+            <a:spLocks noGrp="1"/>
+          </p:cNvSpPr>
+          <p:nvPr>
+            <p:ph type="title"/>
+          </p:nvPr>
+        </p:nvSpPr>
+        <p:spPr/>
+        <p:txBody>
+          <a:bodyPr/>
+          <a:lstStyle/>
+          <a:p>
+            <a:r>
+              <a:rPr lang="en-US" dirty="0" smtClean="0"/>
+              <a:t>Installation</a:t>
+            </a:r>
+            <a:endParaRPr lang="en-US" dirty="0"/>
+          </a:p>
+        </p:txBody>
+      </p:sp>
+      <p:sp>
+        <p:nvSpPr>
+          <p:cNvPr id="6" name="Content Placeholder 5"/>
+          <p:cNvSpPr>
+            <a:spLocks noGrp="1"/>
+          </p:cNvSpPr>
+          <p:nvPr>
+            <p:ph idx="1"/>
+          </p:nvPr>
+        </p:nvSpPr>
+        <p:spPr/>
+        <p:txBody>
+          <a:bodyPr/>
+          <a:lstStyle/>
+          <a:p>
+            <a:endParaRPr lang="en-US"/>
+          </a:p>
+        </p:txBody>
+      </p:sp>
+    </p:spTree>
+    <p:extLst>
+      <p:ext uri="{BB962C8B-B14F-4D97-AF65-F5344CB8AC3E}">
+        <p14:creationId xmlns:p14="http://schemas.microsoft.com/office/powerpoint/2010/main" val="2682240434"/>
+      </p:ext>
+    </p:extLst>
+  </p:cSld>
+  <p:clrMapOvr>
+    <a:masterClrMapping/>
+  </p:clrMapOvr>
+</p:sld>
+</file>
+
+<file path=ppt/slides/slide8.xml><?xml version="1.0" encoding="utf-8"?>
+<p:sld xmlns:a="http://schemas.openxmlformats.org/drawingml/2006/main" xmlns:r="http://schemas.openxmlformats.org/officeDocument/2006/relationships" xmlns:p="http://schemas.openxmlformats.org/presentationml/2006/main">
+  <p:cSld>
+    <p:spTree>
+      <p:nvGrpSpPr>
+        <p:cNvPr id="1" name=""/>
+        <p:cNvGrpSpPr/>
+        <p:nvPr/>
+      </p:nvGrpSpPr>
+      <p:grpSpPr>
+        <a:xfrm>
+          <a:off x="0" y="0"/>
+          <a:ext cx="0" cy="0"/>
+          <a:chOff x="0" y="0"/>
+          <a:chExt cx="0" cy="0"/>
+        </a:xfrm>
+      </p:grpSpPr>
+      <p:sp>
+        <p:nvSpPr>
+          <p:cNvPr id="2" name="Title 1"/>
+          <p:cNvSpPr>
+            <a:spLocks noGrp="1"/>
+          </p:cNvSpPr>
+          <p:nvPr>
+            <p:ph type="title"/>
+          </p:nvPr>
+        </p:nvSpPr>
+        <p:spPr/>
+        <p:txBody>
+          <a:bodyPr/>
+          <a:lstStyle/>
+          <a:p>
+            <a:r>
+              <a:rPr lang="en-US" dirty="0" smtClean="0"/>
+              <a:t>Version issues?</a:t>
+            </a:r>
+            <a:endParaRPr lang="en-US" dirty="0"/>
+          </a:p>
+        </p:txBody>
+      </p:sp>
+      <p:sp>
+        <p:nvSpPr>
+          <p:cNvPr id="3" name="Content Placeholder 2"/>
+          <p:cNvSpPr>
+            <a:spLocks noGrp="1"/>
+          </p:cNvSpPr>
+          <p:nvPr>
+            <p:ph idx="1"/>
+          </p:nvPr>
+        </p:nvSpPr>
+        <p:spPr/>
+        <p:txBody>
+          <a:bodyPr/>
+          <a:lstStyle/>
+          <a:p>
+            <a:endParaRPr lang="en-US"/>
+          </a:p>
+        </p:txBody>
+      </p:sp>
+    </p:spTree>
+    <p:extLst>
+      <p:ext uri="{BB962C8B-B14F-4D97-AF65-F5344CB8AC3E}">
+        <p14:creationId xmlns:p14="http://schemas.microsoft.com/office/powerpoint/2010/main" val="2954453610"/>
+      </p:ext>
+    </p:extLst>
+  </p:cSld>
+  <p:clrMapOvr>
+    <a:masterClrMapping/>
+  </p:clrMapOvr>
+</p:sld>
+</file>
+
+<file path=ppt/slides/slide9.xml><?xml version="1.0" encoding="utf-8"?>
+<p:sld xmlns:a="http://schemas.openxmlformats.org/drawingml/2006/main" xmlns:r="http://schemas.openxmlformats.org/officeDocument/2006/relationships" xmlns:p="http://schemas.openxmlformats.org/presentationml/2006/main">
+  <p:cSld>
+    <p:spTree>
+      <p:nvGrpSpPr>
+        <p:cNvPr id="1" name=""/>
+        <p:cNvGrpSpPr/>
+        <p:nvPr/>
+      </p:nvGrpSpPr>
+      <p:grpSpPr>
+        <a:xfrm>
+          <a:off x="0" y="0"/>
+          <a:ext cx="0" cy="0"/>
+          <a:chOff x="0" y="0"/>
+          <a:chExt cx="0" cy="0"/>
+        </a:xfrm>
+      </p:grpSpPr>
+      <p:sp>
+        <p:nvSpPr>
+          <p:cNvPr id="2" name="Title 1"/>
+          <p:cNvSpPr>
+            <a:spLocks noGrp="1"/>
+          </p:cNvSpPr>
+          <p:nvPr>
+            <p:ph type="title"/>
+          </p:nvPr>
+        </p:nvSpPr>
+        <p:spPr/>
+        <p:txBody>
+          <a:bodyPr/>
+          <a:lstStyle/>
+          <a:p>
+            <a:r>
+              <a:rPr lang="en-US" dirty="0" smtClean="0"/>
+              <a:t>CRAN</a:t>
+            </a:r>
+            <a:endParaRPr lang="en-US" dirty="0"/>
+          </a:p>
+        </p:txBody>
+      </p:sp>
+      <p:sp>
+        <p:nvSpPr>
+          <p:cNvPr id="3" name="Content Placeholder 2"/>
+          <p:cNvSpPr>
+            <a:spLocks noGrp="1"/>
+          </p:cNvSpPr>
+          <p:nvPr>
+            <p:ph idx="1"/>
+          </p:nvPr>
+        </p:nvSpPr>
+        <p:spPr/>
+        <p:txBody>
+          <a:bodyPr/>
+          <a:lstStyle/>
+          <a:p>
+            <a:endParaRPr lang="en-US"/>
+          </a:p>
+        </p:txBody>
+      </p:sp>
+    </p:spTree>
+    <p:extLst>
+      <p:ext uri="{BB962C8B-B14F-4D97-AF65-F5344CB8AC3E}">
+        <p14:creationId xmlns:p14="http://schemas.microsoft.com/office/powerpoint/2010/main" val="2849299754"/>
+      </p:ext>
+    </p:extLst>
+  </p:cSld>
+  <p:clrMapOvr>
+    <a:masterClrMapping/>
+  </p:clrMapOvr>
 </p:sld>
 </file>
 
@@ -3786,7 +7001,7 @@
   <a:extraClrSchemeLst/>
   <a:extLst>
     <a:ext uri="{05A4C25C-085E-4340-85A3-A5531E510DB2}">
-      <thm15:themeFamily xmlns="" xmlns:thm15="http://schemas.microsoft.com/office/thememl/2012/main" name="MGI_4-3_ratio_v1a" id="{9A0171FA-20F4-F840-B1C8-29D686AB0540}" vid="{60506783-C923-7847-B1CA-7C860CC95497}"/>
+      <thm15:themeFamily xmlns:thm15="http://schemas.microsoft.com/office/thememl/2012/main" xmlns="" name="MGI_4-3_ratio_v1a" id="{9A0171FA-20F4-F840-B1C8-29D686AB0540}" vid="{60506783-C923-7847-B1CA-7C860CC95497}"/>
     </a:ext>
   </a:extLst>
 </a:theme>

</xml_diff>

<commit_message>
adding images and more content to intro R lecture
</commit_message>
<xml_diff>
--- a/lectures/GenViz_Module2_Lecture.pptx
+++ b/lectures/GenViz_Module2_Lecture.pptx
@@ -5,10 +5,10 @@
     <p:sldMasterId id="2147483648" r:id="rId1"/>
   </p:sldMasterIdLst>
   <p:notesMasterIdLst>
-    <p:notesMasterId r:id="rId30"/>
+    <p:notesMasterId r:id="rId34"/>
   </p:notesMasterIdLst>
   <p:handoutMasterIdLst>
-    <p:handoutMasterId r:id="rId31"/>
+    <p:handoutMasterId r:id="rId35"/>
   </p:handoutMasterIdLst>
   <p:sldIdLst>
     <p:sldId id="256" r:id="rId2"/>
@@ -20,25 +20,29 @@
     <p:sldId id="263" r:id="rId8"/>
     <p:sldId id="264" r:id="rId9"/>
     <p:sldId id="266" r:id="rId10"/>
-    <p:sldId id="265" r:id="rId11"/>
-    <p:sldId id="267" r:id="rId12"/>
-    <p:sldId id="269" r:id="rId13"/>
-    <p:sldId id="268" r:id="rId14"/>
-    <p:sldId id="270" r:id="rId15"/>
-    <p:sldId id="273" r:id="rId16"/>
-    <p:sldId id="272" r:id="rId17"/>
-    <p:sldId id="271" r:id="rId18"/>
-    <p:sldId id="274" r:id="rId19"/>
-    <p:sldId id="275" r:id="rId20"/>
-    <p:sldId id="276" r:id="rId21"/>
-    <p:sldId id="277" r:id="rId22"/>
-    <p:sldId id="278" r:id="rId23"/>
-    <p:sldId id="279" r:id="rId24"/>
-    <p:sldId id="280" r:id="rId25"/>
-    <p:sldId id="281" r:id="rId26"/>
-    <p:sldId id="284" r:id="rId27"/>
-    <p:sldId id="282" r:id="rId28"/>
-    <p:sldId id="283" r:id="rId29"/>
+    <p:sldId id="267" r:id="rId11"/>
+    <p:sldId id="269" r:id="rId12"/>
+    <p:sldId id="268" r:id="rId13"/>
+    <p:sldId id="270" r:id="rId14"/>
+    <p:sldId id="273" r:id="rId15"/>
+    <p:sldId id="272" r:id="rId16"/>
+    <p:sldId id="271" r:id="rId17"/>
+    <p:sldId id="274" r:id="rId18"/>
+    <p:sldId id="275" r:id="rId19"/>
+    <p:sldId id="276" r:id="rId20"/>
+    <p:sldId id="277" r:id="rId21"/>
+    <p:sldId id="278" r:id="rId22"/>
+    <p:sldId id="279" r:id="rId23"/>
+    <p:sldId id="280" r:id="rId24"/>
+    <p:sldId id="281" r:id="rId25"/>
+    <p:sldId id="284" r:id="rId26"/>
+    <p:sldId id="286" r:id="rId27"/>
+    <p:sldId id="287" r:id="rId28"/>
+    <p:sldId id="288" r:id="rId29"/>
+    <p:sldId id="289" r:id="rId30"/>
+    <p:sldId id="282" r:id="rId31"/>
+    <p:sldId id="283" r:id="rId32"/>
+    <p:sldId id="285" r:id="rId33"/>
   </p:sldIdLst>
   <p:sldSz cx="9144000" cy="6858000" type="screen4x3"/>
   <p:notesSz cx="6858000" cy="9144000"/>
@@ -3188,8 +3192,8 @@
           <a:lstStyle/>
           <a:p>
             <a:r>
-              <a:rPr lang="en-US" dirty="0" err="1" smtClean="0"/>
-              <a:t>BioConductor</a:t>
+              <a:rPr lang="en-US" dirty="0" smtClean="0"/>
+              <a:t>Getting help: ?, vignettes(), and data()</a:t>
             </a:r>
             <a:endParaRPr lang="en-US" dirty="0"/>
           </a:p>
@@ -3217,7 +3221,7 @@
     </p:spTree>
     <p:extLst>
       <p:ext uri="{BB962C8B-B14F-4D97-AF65-F5344CB8AC3E}">
-        <p14:creationId xmlns:p14="http://schemas.microsoft.com/office/powerpoint/2010/main" val="550520497"/>
+        <p14:creationId xmlns:p14="http://schemas.microsoft.com/office/powerpoint/2010/main" val="2358374663"/>
       </p:ext>
     </p:extLst>
   </p:cSld>
@@ -3261,7 +3265,7 @@
           <a:p>
             <a:r>
               <a:rPr lang="en-US" dirty="0" smtClean="0"/>
-              <a:t>Getting help: ?, vignettes(), and data()</a:t>
+              <a:t>Variables and Data types</a:t>
             </a:r>
             <a:endParaRPr lang="en-US" dirty="0"/>
           </a:p>
@@ -3279,17 +3283,195 @@
         </p:nvSpPr>
         <p:spPr/>
         <p:txBody>
-          <a:bodyPr/>
-          <a:lstStyle/>
-          <a:p>
-            <a:endParaRPr lang="en-US"/>
+          <a:bodyPr>
+            <a:normAutofit fontScale="85000" lnSpcReduction="20000"/>
+          </a:bodyPr>
+          <a:lstStyle/>
+          <a:p>
+            <a:r>
+              <a:rPr lang="en-US" dirty="0" smtClean="0"/>
+              <a:t>As with any </a:t>
+            </a:r>
+            <a:r>
+              <a:rPr lang="en-US" dirty="0"/>
+              <a:t>programming language, you need to use various variables to store various information. </a:t>
+            </a:r>
+            <a:r>
+              <a:rPr lang="en-US" dirty="0" smtClean="0"/>
+              <a:t>When </a:t>
+            </a:r>
+            <a:r>
+              <a:rPr lang="en-US" dirty="0"/>
+              <a:t>you create a variable you reserve some space in </a:t>
+            </a:r>
+            <a:r>
+              <a:rPr lang="en-US" dirty="0" smtClean="0"/>
+              <a:t>memory and keep a record of its location for later retrieval and use.</a:t>
+            </a:r>
+            <a:endParaRPr lang="en-US" dirty="0"/>
+          </a:p>
+          <a:p>
+            <a:r>
+              <a:rPr lang="en-US" dirty="0" smtClean="0"/>
+              <a:t>The information you wish to store might be characters (e.g., text), integers, </a:t>
+            </a:r>
+            <a:r>
+              <a:rPr lang="en-US" dirty="0" err="1" smtClean="0"/>
+              <a:t>boolean</a:t>
+            </a:r>
+            <a:r>
+              <a:rPr lang="en-US" dirty="0" smtClean="0"/>
+              <a:t> (e.g., True/False) </a:t>
+            </a:r>
+            <a:r>
+              <a:rPr lang="en-US" dirty="0"/>
+              <a:t>etc. </a:t>
+            </a:r>
+          </a:p>
+          <a:p>
+            <a:r>
+              <a:rPr lang="en-US" dirty="0"/>
+              <a:t>In contrast to other </a:t>
+            </a:r>
+            <a:r>
+              <a:rPr lang="en-US" dirty="0" smtClean="0"/>
+              <a:t>many programming languages (e.g., C, java, </a:t>
+            </a:r>
+            <a:r>
+              <a:rPr lang="en-US" dirty="0" err="1" smtClean="0"/>
+              <a:t>etc</a:t>
+            </a:r>
+            <a:r>
+              <a:rPr lang="en-US" dirty="0" smtClean="0"/>
+              <a:t>) </a:t>
+            </a:r>
+            <a:r>
+              <a:rPr lang="en-US" dirty="0"/>
+              <a:t>in R</a:t>
+            </a:r>
+            <a:r>
+              <a:rPr lang="en-US" dirty="0" smtClean="0"/>
+              <a:t>, </a:t>
+            </a:r>
+            <a:r>
+              <a:rPr lang="en-US" dirty="0"/>
+              <a:t>variables are not declared as </a:t>
+            </a:r>
+            <a:r>
+              <a:rPr lang="en-US" dirty="0" smtClean="0"/>
+              <a:t>a specific data </a:t>
+            </a:r>
+            <a:r>
+              <a:rPr lang="en-US" dirty="0"/>
+              <a:t>type. </a:t>
+            </a:r>
+            <a:endParaRPr lang="en-US" dirty="0" smtClean="0"/>
+          </a:p>
+          <a:p>
+            <a:pPr lvl="1"/>
+            <a:r>
+              <a:rPr lang="en-US" dirty="0" smtClean="0"/>
+              <a:t>The </a:t>
+            </a:r>
+            <a:r>
+              <a:rPr lang="en-US" dirty="0"/>
+              <a:t>variables are assigned with R-Objects and the data type of the R-object becomes the data type of the variable</a:t>
+            </a:r>
+            <a:r>
+              <a:rPr lang="en-US" dirty="0" smtClean="0"/>
+              <a:t>.</a:t>
+            </a:r>
+          </a:p>
+          <a:p>
+            <a:pPr lvl="1"/>
+            <a:r>
+              <a:rPr lang="en-US" dirty="0" smtClean="0"/>
+              <a:t>Frequently </a:t>
+            </a:r>
+            <a:r>
+              <a:rPr lang="en-US" dirty="0"/>
+              <a:t>used </a:t>
+            </a:r>
+            <a:r>
+              <a:rPr lang="en-US" dirty="0" smtClean="0"/>
+              <a:t>R-Objects include: Vectors, Lists, Matrices, Arrays, Factors, Data </a:t>
+            </a:r>
+            <a:r>
+              <a:rPr lang="en-US" dirty="0"/>
+              <a:t>Frames</a:t>
+            </a:r>
+          </a:p>
+          <a:p>
+            <a:r>
+              <a:rPr lang="en-US" dirty="0"/>
+              <a:t>The simplest </a:t>
+            </a:r>
+            <a:r>
+              <a:rPr lang="en-US" dirty="0" smtClean="0"/>
+              <a:t>R-object </a:t>
+            </a:r>
+            <a:r>
+              <a:rPr lang="en-US" dirty="0"/>
+              <a:t>is the </a:t>
+            </a:r>
+            <a:r>
+              <a:rPr lang="en-US" dirty="0" smtClean="0"/>
+              <a:t>atomic vector</a:t>
+            </a:r>
+          </a:p>
+          <a:p>
+            <a:pPr lvl="1"/>
+            <a:r>
+              <a:rPr lang="en-US" dirty="0" smtClean="0"/>
+              <a:t>There </a:t>
+            </a:r>
+            <a:r>
+              <a:rPr lang="en-US" dirty="0"/>
+              <a:t>are six data types </a:t>
+            </a:r>
+            <a:r>
+              <a:rPr lang="en-US" dirty="0" smtClean="0"/>
+              <a:t>for </a:t>
+            </a:r>
+            <a:r>
+              <a:rPr lang="en-US" dirty="0"/>
+              <a:t>atomic vectors, also termed as six classes of </a:t>
+            </a:r>
+            <a:r>
+              <a:rPr lang="en-US" dirty="0" smtClean="0"/>
+              <a:t>vectors: logical, numerical, integer, complex, character, and raw</a:t>
+            </a:r>
+          </a:p>
+          <a:p>
+            <a:r>
+              <a:rPr lang="en-US" dirty="0" smtClean="0"/>
+              <a:t>The </a:t>
+            </a:r>
+            <a:r>
+              <a:rPr lang="en-US" dirty="0"/>
+              <a:t>other R-Objects are built upon </a:t>
+            </a:r>
+            <a:r>
+              <a:rPr lang="en-US" dirty="0" smtClean="0"/>
+              <a:t>atomic vectors</a:t>
+            </a:r>
+          </a:p>
+          <a:p>
+            <a:r>
+              <a:rPr lang="en-US" dirty="0" smtClean="0"/>
+              <a:t>Lists are also vectors but are not atomic vectors, meaning that they can include multiple data types and can be recursive (contain lists of lists)</a:t>
+            </a:r>
+            <a:endParaRPr lang="en-US" dirty="0"/>
+          </a:p>
+          <a:p>
+            <a:endParaRPr lang="en-US" dirty="0"/>
           </a:p>
         </p:txBody>
       </p:sp>
     </p:spTree>
     <p:extLst>
       <p:ext uri="{BB962C8B-B14F-4D97-AF65-F5344CB8AC3E}">
-        <p14:creationId xmlns:p14="http://schemas.microsoft.com/office/powerpoint/2010/main" val="2358374663"/>
+        <p14:creationId xmlns:p14="http://schemas.microsoft.com/office/powerpoint/2010/main" val="934674714"/>
       </p:ext>
     </p:extLst>
   </p:cSld>
@@ -3333,7 +3515,15 @@
           <a:p>
             <a:r>
               <a:rPr lang="en-US" dirty="0" smtClean="0"/>
-              <a:t>Variables and Data types</a:t>
+              <a:t>&lt;- </a:t>
+            </a:r>
+            <a:r>
+              <a:rPr lang="en-US" dirty="0" err="1" smtClean="0"/>
+              <a:t>vs</a:t>
+            </a:r>
+            <a:r>
+              <a:rPr lang="en-US" dirty="0" smtClean="0"/>
+              <a:t> =</a:t>
             </a:r>
             <a:endParaRPr lang="en-US" dirty="0"/>
           </a:p>
@@ -3351,195 +3541,17 @@
         </p:nvSpPr>
         <p:spPr/>
         <p:txBody>
-          <a:bodyPr>
-            <a:normAutofit fontScale="85000" lnSpcReduction="20000"/>
-          </a:bodyPr>
-          <a:lstStyle/>
-          <a:p>
-            <a:r>
-              <a:rPr lang="en-US" dirty="0" smtClean="0"/>
-              <a:t>As with any </a:t>
-            </a:r>
-            <a:r>
-              <a:rPr lang="en-US" dirty="0"/>
-              <a:t>programming language, you need to use various variables to store various information. </a:t>
-            </a:r>
-            <a:r>
-              <a:rPr lang="en-US" dirty="0" smtClean="0"/>
-              <a:t>When </a:t>
-            </a:r>
-            <a:r>
-              <a:rPr lang="en-US" dirty="0"/>
-              <a:t>you create a variable you reserve some space in </a:t>
-            </a:r>
-            <a:r>
-              <a:rPr lang="en-US" dirty="0" smtClean="0"/>
-              <a:t>memory and keep a record of its location for later retrieval and use.</a:t>
-            </a:r>
-            <a:endParaRPr lang="en-US" dirty="0"/>
-          </a:p>
-          <a:p>
-            <a:r>
-              <a:rPr lang="en-US" dirty="0" smtClean="0"/>
-              <a:t>The information you wish to store might be characters (e.g., text), integers, </a:t>
-            </a:r>
-            <a:r>
-              <a:rPr lang="en-US" dirty="0" err="1" smtClean="0"/>
-              <a:t>boolean</a:t>
-            </a:r>
-            <a:r>
-              <a:rPr lang="en-US" dirty="0" smtClean="0"/>
-              <a:t> (e.g., True/False) </a:t>
-            </a:r>
-            <a:r>
-              <a:rPr lang="en-US" dirty="0"/>
-              <a:t>etc. </a:t>
-            </a:r>
-          </a:p>
-          <a:p>
-            <a:r>
-              <a:rPr lang="en-US" dirty="0"/>
-              <a:t>In contrast to other </a:t>
-            </a:r>
-            <a:r>
-              <a:rPr lang="en-US" dirty="0" smtClean="0"/>
-              <a:t>many programming languages (e.g., C, java, </a:t>
-            </a:r>
-            <a:r>
-              <a:rPr lang="en-US" dirty="0" err="1" smtClean="0"/>
-              <a:t>etc</a:t>
-            </a:r>
-            <a:r>
-              <a:rPr lang="en-US" dirty="0" smtClean="0"/>
-              <a:t>) </a:t>
-            </a:r>
-            <a:r>
-              <a:rPr lang="en-US" dirty="0"/>
-              <a:t>in R</a:t>
-            </a:r>
-            <a:r>
-              <a:rPr lang="en-US" dirty="0" smtClean="0"/>
-              <a:t>, </a:t>
-            </a:r>
-            <a:r>
-              <a:rPr lang="en-US" dirty="0"/>
-              <a:t>variables are not declared as </a:t>
-            </a:r>
-            <a:r>
-              <a:rPr lang="en-US" dirty="0" smtClean="0"/>
-              <a:t>a specific data </a:t>
-            </a:r>
-            <a:r>
-              <a:rPr lang="en-US" dirty="0"/>
-              <a:t>type. </a:t>
-            </a:r>
-            <a:endParaRPr lang="en-US" dirty="0" smtClean="0"/>
-          </a:p>
-          <a:p>
-            <a:pPr lvl="1"/>
-            <a:r>
-              <a:rPr lang="en-US" dirty="0" smtClean="0"/>
-              <a:t>The </a:t>
-            </a:r>
-            <a:r>
-              <a:rPr lang="en-US" dirty="0"/>
-              <a:t>variables are assigned with R-Objects and the data type of the R-object becomes the data type of the variable</a:t>
-            </a:r>
-            <a:r>
-              <a:rPr lang="en-US" dirty="0" smtClean="0"/>
-              <a:t>.</a:t>
-            </a:r>
-          </a:p>
-          <a:p>
-            <a:pPr lvl="1"/>
-            <a:r>
-              <a:rPr lang="en-US" dirty="0" smtClean="0"/>
-              <a:t>Frequently </a:t>
-            </a:r>
-            <a:r>
-              <a:rPr lang="en-US" dirty="0"/>
-              <a:t>used </a:t>
-            </a:r>
-            <a:r>
-              <a:rPr lang="en-US" dirty="0" smtClean="0"/>
-              <a:t>R-Objects include: Vectors, Lists, Matrices, Arrays, Factors, Data </a:t>
-            </a:r>
-            <a:r>
-              <a:rPr lang="en-US" dirty="0"/>
-              <a:t>Frames</a:t>
-            </a:r>
-          </a:p>
-          <a:p>
-            <a:r>
-              <a:rPr lang="en-US" dirty="0"/>
-              <a:t>The simplest </a:t>
-            </a:r>
-            <a:r>
-              <a:rPr lang="en-US" dirty="0" smtClean="0"/>
-              <a:t>R-object </a:t>
-            </a:r>
-            <a:r>
-              <a:rPr lang="en-US" dirty="0"/>
-              <a:t>is the </a:t>
-            </a:r>
-            <a:r>
-              <a:rPr lang="en-US" dirty="0" smtClean="0"/>
-              <a:t>atomic vector</a:t>
-            </a:r>
-          </a:p>
-          <a:p>
-            <a:pPr lvl="1"/>
-            <a:r>
-              <a:rPr lang="en-US" dirty="0" smtClean="0"/>
-              <a:t>There </a:t>
-            </a:r>
-            <a:r>
-              <a:rPr lang="en-US" dirty="0"/>
-              <a:t>are six data types </a:t>
-            </a:r>
-            <a:r>
-              <a:rPr lang="en-US" dirty="0" smtClean="0"/>
-              <a:t>for </a:t>
-            </a:r>
-            <a:r>
-              <a:rPr lang="en-US" dirty="0"/>
-              <a:t>atomic vectors, also termed as six classes of </a:t>
-            </a:r>
-            <a:r>
-              <a:rPr lang="en-US" dirty="0" smtClean="0"/>
-              <a:t>vectors: logical, numerical, integer, complex, character, and raw</a:t>
-            </a:r>
-          </a:p>
-          <a:p>
-            <a:r>
-              <a:rPr lang="en-US" dirty="0" smtClean="0"/>
-              <a:t>The </a:t>
-            </a:r>
-            <a:r>
-              <a:rPr lang="en-US" dirty="0"/>
-              <a:t>other R-Objects are built upon </a:t>
-            </a:r>
-            <a:r>
-              <a:rPr lang="en-US" dirty="0" smtClean="0"/>
-              <a:t>atomic vectors</a:t>
-            </a:r>
-          </a:p>
-          <a:p>
-            <a:r>
-              <a:rPr lang="en-US" dirty="0" smtClean="0"/>
-              <a:t>Lists are also vectors but are not atomic vectors, meaning that they can include multiple data types and can be recursive (contain lists of lists)</a:t>
-            </a:r>
-            <a:endParaRPr lang="en-US" dirty="0"/>
-          </a:p>
-          <a:p>
-            <a:endParaRPr lang="en-US" dirty="0"/>
+          <a:bodyPr/>
+          <a:lstStyle/>
+          <a:p>
+            <a:endParaRPr lang="en-US"/>
           </a:p>
         </p:txBody>
       </p:sp>
     </p:spTree>
     <p:extLst>
       <p:ext uri="{BB962C8B-B14F-4D97-AF65-F5344CB8AC3E}">
-        <p14:creationId xmlns:p14="http://schemas.microsoft.com/office/powerpoint/2010/main" val="934674714"/>
+        <p14:creationId xmlns:p14="http://schemas.microsoft.com/office/powerpoint/2010/main" val="2193166336"/>
       </p:ext>
     </p:extLst>
   </p:cSld>
@@ -3583,15 +3595,7 @@
           <a:p>
             <a:r>
               <a:rPr lang="en-US" dirty="0" smtClean="0"/>
-              <a:t>&lt;- </a:t>
-            </a:r>
-            <a:r>
-              <a:rPr lang="en-US" dirty="0" err="1" smtClean="0"/>
-              <a:t>vs</a:t>
-            </a:r>
-            <a:r>
-              <a:rPr lang="en-US" dirty="0" smtClean="0"/>
-              <a:t> =</a:t>
+              <a:t>Data structures (R objects)</a:t>
             </a:r>
             <a:endParaRPr lang="en-US" dirty="0"/>
           </a:p>
@@ -3609,17 +3613,19 @@
         </p:nvSpPr>
         <p:spPr/>
         <p:txBody>
-          <a:bodyPr/>
-          <a:lstStyle/>
-          <a:p>
-            <a:endParaRPr lang="en-US"/>
+          <a:bodyPr>
+            <a:normAutofit/>
+          </a:bodyPr>
+          <a:lstStyle/>
+          <a:p>
+            <a:endParaRPr lang="en-US" dirty="0"/>
           </a:p>
         </p:txBody>
       </p:sp>
     </p:spTree>
     <p:extLst>
       <p:ext uri="{BB962C8B-B14F-4D97-AF65-F5344CB8AC3E}">
-        <p14:creationId xmlns:p14="http://schemas.microsoft.com/office/powerpoint/2010/main" val="2193166336"/>
+        <p14:creationId xmlns:p14="http://schemas.microsoft.com/office/powerpoint/2010/main" val="1387753060"/>
       </p:ext>
     </p:extLst>
   </p:cSld>
@@ -3658,80 +3664,6 @@
         </p:nvSpPr>
         <p:spPr/>
         <p:txBody>
-          <a:bodyPr/>
-          <a:lstStyle/>
-          <a:p>
-            <a:r>
-              <a:rPr lang="en-US" dirty="0" smtClean="0"/>
-              <a:t>Data structures (R objects)</a:t>
-            </a:r>
-            <a:endParaRPr lang="en-US" dirty="0"/>
-          </a:p>
-        </p:txBody>
-      </p:sp>
-      <p:sp>
-        <p:nvSpPr>
-          <p:cNvPr id="3" name="Content Placeholder 2"/>
-          <p:cNvSpPr>
-            <a:spLocks noGrp="1"/>
-          </p:cNvSpPr>
-          <p:nvPr>
-            <p:ph idx="1"/>
-          </p:nvPr>
-        </p:nvSpPr>
-        <p:spPr/>
-        <p:txBody>
-          <a:bodyPr>
-            <a:normAutofit/>
-          </a:bodyPr>
-          <a:lstStyle/>
-          <a:p>
-            <a:endParaRPr lang="en-US" dirty="0"/>
-          </a:p>
-        </p:txBody>
-      </p:sp>
-    </p:spTree>
-    <p:extLst>
-      <p:ext uri="{BB962C8B-B14F-4D97-AF65-F5344CB8AC3E}">
-        <p14:creationId xmlns:p14="http://schemas.microsoft.com/office/powerpoint/2010/main" val="1387753060"/>
-      </p:ext>
-    </p:extLst>
-  </p:cSld>
-  <p:clrMapOvr>
-    <a:masterClrMapping/>
-  </p:clrMapOvr>
-</p:sld>
-</file>
-
-<file path=ppt/slides/slide15.xml><?xml version="1.0" encoding="utf-8"?>
-<p:sld xmlns:a="http://schemas.openxmlformats.org/drawingml/2006/main" xmlns:r="http://schemas.openxmlformats.org/officeDocument/2006/relationships" xmlns:p="http://schemas.openxmlformats.org/presentationml/2006/main">
-  <p:cSld>
-    <p:spTree>
-      <p:nvGrpSpPr>
-        <p:cNvPr id="1" name=""/>
-        <p:cNvGrpSpPr/>
-        <p:nvPr/>
-      </p:nvGrpSpPr>
-      <p:grpSpPr>
-        <a:xfrm>
-          <a:off x="0" y="0"/>
-          <a:ext cx="0" cy="0"/>
-          <a:chOff x="0" y="0"/>
-          <a:chExt cx="0" cy="0"/>
-        </a:xfrm>
-      </p:grpSpPr>
-      <p:sp>
-        <p:nvSpPr>
-          <p:cNvPr id="2" name="Title 1"/>
-          <p:cNvSpPr>
-            <a:spLocks noGrp="1"/>
-          </p:cNvSpPr>
-          <p:nvPr>
-            <p:ph type="title"/>
-          </p:nvPr>
-        </p:nvSpPr>
-        <p:spPr/>
-        <p:txBody>
           <a:bodyPr>
             <a:normAutofit fontScale="90000"/>
           </a:bodyPr>
@@ -3763,14 +3695,14 @@
             <p:ph idx="1"/>
             <p:extLst>
               <p:ext uri="{D42A27DB-BD31-4B8C-83A1-F6EECF244321}">
-                <p14:modId xmlns:p14="http://schemas.microsoft.com/office/powerpoint/2010/main" val="150658947"/>
+                <p14:modId xmlns:p14="http://schemas.microsoft.com/office/powerpoint/2010/main" val="232311003"/>
               </p:ext>
             </p:extLst>
           </p:nvPr>
         </p:nvGraphicFramePr>
         <p:xfrm>
-          <a:off x="260879" y="2980228"/>
-          <a:ext cx="8168703" cy="3235960"/>
+          <a:off x="379415" y="1269960"/>
+          <a:ext cx="8552861" cy="4145280"/>
         </p:xfrm>
         <a:graphic>
           <a:graphicData uri="http://schemas.openxmlformats.org/drawingml/2006/table">
@@ -3779,9 +3711,9 @@
                 <a:tableStyleId>{5C22544A-7EE6-4342-B048-85BDC9FD1C3A}</a:tableStyleId>
               </a:tblPr>
               <a:tblGrid>
-                <a:gridCol w="2263944"/>
+                <a:gridCol w="3074985"/>
+                <a:gridCol w="1757517"/>
                 <a:gridCol w="1173480"/>
-                <a:gridCol w="2184400"/>
                 <a:gridCol w="2546879"/>
               </a:tblGrid>
               <a:tr h="370840">
@@ -3864,7 +3796,7 @@
                       <a:endParaRPr lang="en-US" dirty="0"/>
                     </a:p>
                   </a:txBody>
-                  <a:tcPr/>
+                  <a:tcPr anchor="ctr"/>
                 </a:tc>
                 <a:tc>
                   <a:txBody>
@@ -3879,7 +3811,7 @@
                       <a:endParaRPr lang="en-US" dirty="0"/>
                     </a:p>
                   </a:txBody>
-                  <a:tcPr/>
+                  <a:tcPr anchor="ctr"/>
                 </a:tc>
                 <a:tc>
                   <a:txBody>
@@ -3894,7 +3826,7 @@
                       <a:endParaRPr lang="en-US" dirty="0"/>
                     </a:p>
                   </a:txBody>
-                  <a:tcPr/>
+                  <a:tcPr anchor="ctr"/>
                 </a:tc>
                 <a:tc>
                   <a:txBody>
@@ -3924,7 +3856,7 @@
                       <a:endParaRPr lang="en-US" dirty="0"/>
                     </a:p>
                   </a:txBody>
-                  <a:tcPr/>
+                  <a:tcPr anchor="ctr"/>
                 </a:tc>
               </a:tr>
               <a:tr h="370840">
@@ -3941,7 +3873,7 @@
                       <a:endParaRPr lang="en-US" dirty="0"/>
                     </a:p>
                   </a:txBody>
-                  <a:tcPr/>
+                  <a:tcPr anchor="ctr"/>
                 </a:tc>
                 <a:tc>
                   <a:txBody>
@@ -3956,7 +3888,7 @@
                       <a:endParaRPr lang="en-US" dirty="0"/>
                     </a:p>
                   </a:txBody>
-                  <a:tcPr/>
+                  <a:tcPr anchor="ctr"/>
                 </a:tc>
                 <a:tc>
                   <a:txBody>
@@ -3971,7 +3903,7 @@
                       <a:endParaRPr lang="en-US" dirty="0"/>
                     </a:p>
                   </a:txBody>
-                  <a:tcPr/>
+                  <a:tcPr anchor="ctr"/>
                 </a:tc>
                 <a:tc>
                   <a:txBody>
@@ -3990,7 +3922,7 @@
                       <a:endParaRPr lang="en-US" dirty="0"/>
                     </a:p>
                   </a:txBody>
-                  <a:tcPr/>
+                  <a:tcPr anchor="ctr"/>
                 </a:tc>
               </a:tr>
               <a:tr h="370840">
@@ -4007,7 +3939,7 @@
                       <a:endParaRPr lang="en-US" dirty="0"/>
                     </a:p>
                   </a:txBody>
-                  <a:tcPr/>
+                  <a:tcPr anchor="ctr"/>
                 </a:tc>
                 <a:tc>
                   <a:txBody>
@@ -4022,7 +3954,7 @@
                       <a:endParaRPr lang="en-US" dirty="0"/>
                     </a:p>
                   </a:txBody>
-                  <a:tcPr/>
+                  <a:tcPr anchor="ctr"/>
                 </a:tc>
                 <a:tc>
                   <a:txBody>
@@ -4037,7 +3969,7 @@
                       <a:endParaRPr lang="en-US" dirty="0"/>
                     </a:p>
                   </a:txBody>
-                  <a:tcPr/>
+                  <a:tcPr anchor="ctr"/>
                 </a:tc>
                 <a:tc>
                   <a:txBody>
@@ -4056,7 +3988,7 @@
                       <a:endParaRPr lang="en-US" dirty="0"/>
                     </a:p>
                   </a:txBody>
-                  <a:tcPr/>
+                  <a:tcPr anchor="ctr"/>
                 </a:tc>
               </a:tr>
               <a:tr h="370840">
@@ -4073,7 +4005,7 @@
                       <a:endParaRPr lang="en-US" dirty="0"/>
                     </a:p>
                   </a:txBody>
-                  <a:tcPr/>
+                  <a:tcPr anchor="ctr"/>
                 </a:tc>
                 <a:tc>
                   <a:txBody>
@@ -4088,7 +4020,7 @@
                       <a:endParaRPr lang="en-US" dirty="0"/>
                     </a:p>
                   </a:txBody>
-                  <a:tcPr/>
+                  <a:tcPr anchor="ctr"/>
                 </a:tc>
                 <a:tc>
                   <a:txBody>
@@ -4103,7 +4035,7 @@
                       <a:endParaRPr lang="en-US" dirty="0"/>
                     </a:p>
                   </a:txBody>
-                  <a:tcPr/>
+                  <a:tcPr anchor="ctr"/>
                 </a:tc>
                 <a:tc>
                   <a:txBody>
@@ -4126,7 +4058,7 @@
                       <a:endParaRPr lang="en-US" dirty="0"/>
                     </a:p>
                   </a:txBody>
-                  <a:tcPr/>
+                  <a:tcPr anchor="ctr"/>
                 </a:tc>
               </a:tr>
               <a:tr h="370840">
@@ -4151,7 +4083,7 @@
                       <a:endParaRPr lang="en-US" dirty="0"/>
                     </a:p>
                   </a:txBody>
-                  <a:tcPr/>
+                  <a:tcPr anchor="ctr"/>
                 </a:tc>
                 <a:tc>
                   <a:txBody>
@@ -4166,7 +4098,7 @@
                       <a:endParaRPr lang="en-US" dirty="0"/>
                     </a:p>
                   </a:txBody>
-                  <a:tcPr/>
+                  <a:tcPr anchor="ctr"/>
                 </a:tc>
                 <a:tc>
                   <a:txBody>
@@ -4181,7 +4113,7 @@
                       <a:endParaRPr lang="en-US" dirty="0"/>
                     </a:p>
                   </a:txBody>
-                  <a:tcPr/>
+                  <a:tcPr anchor="ctr"/>
                 </a:tc>
                 <a:tc>
                   <a:txBody>
@@ -4200,7 +4132,7 @@
                       <a:endParaRPr lang="en-US" dirty="0"/>
                     </a:p>
                   </a:txBody>
-                  <a:tcPr/>
+                  <a:tcPr anchor="ctr"/>
                 </a:tc>
               </a:tr>
               <a:tr h="370840">
@@ -4217,7 +4149,7 @@
                       <a:endParaRPr lang="en-US" dirty="0"/>
                     </a:p>
                   </a:txBody>
-                  <a:tcPr/>
+                  <a:tcPr anchor="ctr"/>
                 </a:tc>
                 <a:tc>
                   <a:txBody>
@@ -4232,7 +4164,7 @@
                       <a:endParaRPr lang="en-US" dirty="0"/>
                     </a:p>
                   </a:txBody>
-                  <a:tcPr/>
+                  <a:tcPr anchor="ctr"/>
                 </a:tc>
                 <a:tc>
                   <a:txBody>
@@ -4247,7 +4179,7 @@
                       <a:endParaRPr lang="en-US" dirty="0"/>
                     </a:p>
                   </a:txBody>
-                  <a:tcPr/>
+                  <a:tcPr anchor="ctr"/>
                 </a:tc>
                 <a:tc>
                   <a:txBody>
@@ -4266,7 +4198,7 @@
                       <a:endParaRPr lang="en-US" dirty="0"/>
                     </a:p>
                   </a:txBody>
-                  <a:tcPr/>
+                  <a:tcPr anchor="ctr"/>
                 </a:tc>
               </a:tr>
               <a:tr h="370840">
@@ -4276,10 +4208,30 @@
                     <a:lstStyle/>
                     <a:p>
                       <a:pPr algn="ctr"/>
+                      <a:r>
+                        <a:rPr lang="it-IT" dirty="0" smtClean="0"/>
+                        <a:t>x &lt;- </a:t>
+                      </a:r>
+                      <a:r>
+                        <a:rPr lang="it-IT" dirty="0" err="1" smtClean="0"/>
+                        <a:t>matrix</a:t>
+                      </a:r>
+                      <a:r>
+                        <a:rPr lang="it-IT" dirty="0" smtClean="0"/>
+                        <a:t>(1:4, </a:t>
+                      </a:r>
+                      <a:r>
+                        <a:rPr lang="it-IT" dirty="0" err="1" smtClean="0"/>
+                        <a:t>nrow</a:t>
+                      </a:r>
+                      <a:r>
+                        <a:rPr lang="it-IT" dirty="0" smtClean="0"/>
+                        <a:t>=2)</a:t>
+                      </a:r>
                       <a:endParaRPr lang="en-US" dirty="0"/>
                     </a:p>
                   </a:txBody>
-                  <a:tcPr/>
+                  <a:tcPr anchor="ctr"/>
                 </a:tc>
                 <a:tc>
                   <a:txBody>
@@ -4287,10 +4239,14 @@
                     <a:lstStyle/>
                     <a:p>
                       <a:pPr algn="ctr"/>
+                      <a:r>
+                        <a:rPr lang="en-US" dirty="0" smtClean="0"/>
+                        <a:t>matrix</a:t>
+                      </a:r>
                       <a:endParaRPr lang="en-US" dirty="0"/>
                     </a:p>
                   </a:txBody>
-                  <a:tcPr/>
+                  <a:tcPr anchor="ctr"/>
                 </a:tc>
                 <a:tc>
                   <a:txBody>
@@ -4298,10 +4254,14 @@
                     <a:lstStyle/>
                     <a:p>
                       <a:pPr algn="ctr"/>
+                      <a:r>
+                        <a:rPr lang="en-US" dirty="0" smtClean="0"/>
+                        <a:t>integer</a:t>
+                      </a:r>
                       <a:endParaRPr lang="en-US" dirty="0"/>
                     </a:p>
                   </a:txBody>
-                  <a:tcPr/>
+                  <a:tcPr anchor="ctr"/>
                 </a:tc>
                 <a:tc>
                   <a:txBody>
@@ -4309,10 +4269,114 @@
                     <a:lstStyle/>
                     <a:p>
                       <a:pPr algn="ctr"/>
+                      <a:r>
+                        <a:rPr lang="en-US" dirty="0" err="1" smtClean="0"/>
+                        <a:t>is.matrix</a:t>
+                      </a:r>
+                      <a:r>
+                        <a:rPr lang="en-US" dirty="0" smtClean="0"/>
+                        <a:t>(x)=TRUE</a:t>
+                      </a:r>
+                    </a:p>
+                    <a:p>
+                      <a:pPr algn="ctr"/>
+                      <a:r>
+                        <a:rPr lang="en-US" dirty="0" err="1" smtClean="0"/>
+                        <a:t>Is.integer</a:t>
+                      </a:r>
+                      <a:r>
+                        <a:rPr lang="en-US" dirty="0" smtClean="0"/>
+                        <a:t>(x)=TRUE</a:t>
+                      </a:r>
                       <a:endParaRPr lang="en-US" dirty="0"/>
                     </a:p>
                   </a:txBody>
-                  <a:tcPr/>
+                  <a:tcPr anchor="ctr"/>
+                </a:tc>
+              </a:tr>
+              <a:tr h="370840">
+                <a:tc>
+                  <a:txBody>
+                    <a:bodyPr/>
+                    <a:lstStyle/>
+                    <a:p>
+                      <a:pPr algn="ctr"/>
+                      <a:r>
+                        <a:rPr lang="es-ES_tradnl" dirty="0" smtClean="0"/>
+                        <a:t>x &lt;- </a:t>
+                      </a:r>
+                      <a:r>
+                        <a:rPr lang="es-ES_tradnl" dirty="0" err="1" smtClean="0"/>
+                        <a:t>data.frame</a:t>
+                      </a:r>
+                      <a:r>
+                        <a:rPr lang="es-ES_tradnl" dirty="0" smtClean="0"/>
+                        <a:t>(x=1:2, y=c(“a”, “b”))</a:t>
+                      </a:r>
+                      <a:endParaRPr lang="en-US" dirty="0"/>
+                    </a:p>
+                  </a:txBody>
+                  <a:tcPr anchor="ctr"/>
+                </a:tc>
+                <a:tc>
+                  <a:txBody>
+                    <a:bodyPr/>
+                    <a:lstStyle/>
+                    <a:p>
+                      <a:pPr algn="ctr"/>
+                      <a:r>
+                        <a:rPr lang="en-US" dirty="0" err="1" smtClean="0"/>
+                        <a:t>data.frame</a:t>
+                      </a:r>
+                      <a:endParaRPr lang="en-US" dirty="0"/>
+                    </a:p>
+                  </a:txBody>
+                  <a:tcPr anchor="ctr"/>
+                </a:tc>
+                <a:tc>
+                  <a:txBody>
+                    <a:bodyPr/>
+                    <a:lstStyle/>
+                    <a:p>
+                      <a:pPr algn="ctr"/>
+                      <a:r>
+                        <a:rPr lang="en-US" dirty="0" smtClean="0"/>
+                        <a:t>list</a:t>
+                      </a:r>
+                      <a:endParaRPr lang="en-US" dirty="0"/>
+                    </a:p>
+                  </a:txBody>
+                  <a:tcPr anchor="ctr"/>
+                </a:tc>
+                <a:tc>
+                  <a:txBody>
+                    <a:bodyPr/>
+                    <a:lstStyle/>
+                    <a:p>
+                      <a:pPr algn="ctr"/>
+                      <a:r>
+                        <a:rPr lang="en-US" dirty="0" err="1" smtClean="0"/>
+                        <a:t>is.data.frame</a:t>
+                      </a:r>
+                      <a:r>
+                        <a:rPr lang="en-US" dirty="0" smtClean="0"/>
+                        <a:t>(x)=TRUE</a:t>
+                      </a:r>
+                    </a:p>
+                    <a:p>
+                      <a:pPr algn="ctr"/>
+                      <a:r>
+                        <a:rPr lang="en-US" dirty="0" err="1" smtClean="0"/>
+                        <a:t>is.list</a:t>
+                      </a:r>
+                      <a:r>
+                        <a:rPr lang="en-US" dirty="0" smtClean="0"/>
+                        <a:t>(x)=TRUE</a:t>
+                      </a:r>
+                      <a:endParaRPr lang="en-US" dirty="0"/>
+                    </a:p>
+                  </a:txBody>
+                  <a:tcPr anchor="ctr"/>
                 </a:tc>
               </a:tr>
             </a:tbl>
@@ -4323,6 +4387,78 @@
     <p:extLst>
       <p:ext uri="{BB962C8B-B14F-4D97-AF65-F5344CB8AC3E}">
         <p14:creationId xmlns:p14="http://schemas.microsoft.com/office/powerpoint/2010/main" val="1042677293"/>
+      </p:ext>
+    </p:extLst>
+  </p:cSld>
+  <p:clrMapOvr>
+    <a:masterClrMapping/>
+  </p:clrMapOvr>
+</p:sld>
+</file>
+
+<file path=ppt/slides/slide15.xml><?xml version="1.0" encoding="utf-8"?>
+<p:sld xmlns:a="http://schemas.openxmlformats.org/drawingml/2006/main" xmlns:r="http://schemas.openxmlformats.org/officeDocument/2006/relationships" xmlns:p="http://schemas.openxmlformats.org/presentationml/2006/main">
+  <p:cSld>
+    <p:spTree>
+      <p:nvGrpSpPr>
+        <p:cNvPr id="1" name=""/>
+        <p:cNvGrpSpPr/>
+        <p:nvPr/>
+      </p:nvGrpSpPr>
+      <p:grpSpPr>
+        <a:xfrm>
+          <a:off x="0" y="0"/>
+          <a:ext cx="0" cy="0"/>
+          <a:chOff x="0" y="0"/>
+          <a:chExt cx="0" cy="0"/>
+        </a:xfrm>
+      </p:grpSpPr>
+      <p:sp>
+        <p:nvSpPr>
+          <p:cNvPr id="2" name="Title 1"/>
+          <p:cNvSpPr>
+            <a:spLocks noGrp="1"/>
+          </p:cNvSpPr>
+          <p:nvPr>
+            <p:ph type="title"/>
+          </p:nvPr>
+        </p:nvSpPr>
+        <p:spPr/>
+        <p:txBody>
+          <a:bodyPr/>
+          <a:lstStyle/>
+          <a:p>
+            <a:r>
+              <a:rPr lang="en-US" dirty="0" smtClean="0"/>
+              <a:t>Vectors</a:t>
+            </a:r>
+            <a:endParaRPr lang="en-US" dirty="0"/>
+          </a:p>
+        </p:txBody>
+      </p:sp>
+      <p:sp>
+        <p:nvSpPr>
+          <p:cNvPr id="3" name="Content Placeholder 2"/>
+          <p:cNvSpPr>
+            <a:spLocks noGrp="1"/>
+          </p:cNvSpPr>
+          <p:nvPr>
+            <p:ph idx="1"/>
+          </p:nvPr>
+        </p:nvSpPr>
+        <p:spPr/>
+        <p:txBody>
+          <a:bodyPr/>
+          <a:lstStyle/>
+          <a:p>
+            <a:endParaRPr lang="en-US"/>
+          </a:p>
+        </p:txBody>
+      </p:sp>
+    </p:spTree>
+    <p:extLst>
+      <p:ext uri="{BB962C8B-B14F-4D97-AF65-F5344CB8AC3E}">
+        <p14:creationId xmlns:p14="http://schemas.microsoft.com/office/powerpoint/2010/main" val="818804808"/>
       </p:ext>
     </p:extLst>
   </p:cSld>
@@ -4366,7 +4502,7 @@
           <a:p>
             <a:r>
               <a:rPr lang="en-US" dirty="0" smtClean="0"/>
-              <a:t>Vectors</a:t>
+              <a:t>Factors</a:t>
             </a:r>
             <a:endParaRPr lang="en-US" dirty="0"/>
           </a:p>
@@ -4394,7 +4530,7 @@
     </p:spTree>
     <p:extLst>
       <p:ext uri="{BB962C8B-B14F-4D97-AF65-F5344CB8AC3E}">
-        <p14:creationId xmlns:p14="http://schemas.microsoft.com/office/powerpoint/2010/main" val="818804808"/>
+        <p14:creationId xmlns:p14="http://schemas.microsoft.com/office/powerpoint/2010/main" val="3172517770"/>
       </p:ext>
     </p:extLst>
   </p:cSld>
@@ -4438,7 +4574,7 @@
           <a:p>
             <a:r>
               <a:rPr lang="en-US" dirty="0" smtClean="0"/>
-              <a:t>Factors</a:t>
+              <a:t>Lists</a:t>
             </a:r>
             <a:endParaRPr lang="en-US" dirty="0"/>
           </a:p>
@@ -4466,7 +4602,7 @@
     </p:spTree>
     <p:extLst>
       <p:ext uri="{BB962C8B-B14F-4D97-AF65-F5344CB8AC3E}">
-        <p14:creationId xmlns:p14="http://schemas.microsoft.com/office/powerpoint/2010/main" val="3172517770"/>
+        <p14:creationId xmlns:p14="http://schemas.microsoft.com/office/powerpoint/2010/main" val="2876099214"/>
       </p:ext>
     </p:extLst>
   </p:cSld>
@@ -4510,7 +4646,7 @@
           <a:p>
             <a:r>
               <a:rPr lang="en-US" dirty="0" smtClean="0"/>
-              <a:t>Lists</a:t>
+              <a:t>Attributes</a:t>
             </a:r>
             <a:endParaRPr lang="en-US" dirty="0"/>
           </a:p>
@@ -4538,7 +4674,7 @@
     </p:spTree>
     <p:extLst>
       <p:ext uri="{BB962C8B-B14F-4D97-AF65-F5344CB8AC3E}">
-        <p14:creationId xmlns:p14="http://schemas.microsoft.com/office/powerpoint/2010/main" val="2876099214"/>
+        <p14:creationId xmlns:p14="http://schemas.microsoft.com/office/powerpoint/2010/main" val="593406324"/>
       </p:ext>
     </p:extLst>
   </p:cSld>
@@ -4582,7 +4718,7 @@
           <a:p>
             <a:r>
               <a:rPr lang="en-US" dirty="0" smtClean="0"/>
-              <a:t>Attributes</a:t>
+              <a:t>Importing and Exporting Data</a:t>
             </a:r>
             <a:endParaRPr lang="en-US" dirty="0"/>
           </a:p>
@@ -4610,7 +4746,7 @@
     </p:spTree>
     <p:extLst>
       <p:ext uri="{BB962C8B-B14F-4D97-AF65-F5344CB8AC3E}">
-        <p14:creationId xmlns:p14="http://schemas.microsoft.com/office/powerpoint/2010/main" val="593406324"/>
+        <p14:creationId xmlns:p14="http://schemas.microsoft.com/office/powerpoint/2010/main" val="1068452290"/>
       </p:ext>
     </p:extLst>
   </p:cSld>
@@ -4767,8 +4903,8 @@
           <a:lstStyle/>
           <a:p>
             <a:r>
-              <a:rPr lang="en-US" dirty="0" smtClean="0"/>
-              <a:t>Importing and Exporting Data</a:t>
+              <a:rPr lang="en-US" dirty="0" err="1" smtClean="0"/>
+              <a:t>Dataframes</a:t>
             </a:r>
             <a:endParaRPr lang="en-US" dirty="0"/>
           </a:p>
@@ -4796,7 +4932,7 @@
     </p:spTree>
     <p:extLst>
       <p:ext uri="{BB962C8B-B14F-4D97-AF65-F5344CB8AC3E}">
-        <p14:creationId xmlns:p14="http://schemas.microsoft.com/office/powerpoint/2010/main" val="1068452290"/>
+        <p14:creationId xmlns:p14="http://schemas.microsoft.com/office/powerpoint/2010/main" val="2590858446"/>
       </p:ext>
     </p:extLst>
   </p:cSld>
@@ -4839,8 +4975,8 @@
           <a:lstStyle/>
           <a:p>
             <a:r>
-              <a:rPr lang="en-US" dirty="0" err="1" smtClean="0"/>
-              <a:t>Dataframes</a:t>
+              <a:rPr lang="en-US" dirty="0" smtClean="0"/>
+              <a:t>Apply functions</a:t>
             </a:r>
             <a:endParaRPr lang="en-US" dirty="0"/>
           </a:p>
@@ -4868,7 +5004,7 @@
     </p:spTree>
     <p:extLst>
       <p:ext uri="{BB962C8B-B14F-4D97-AF65-F5344CB8AC3E}">
-        <p14:creationId xmlns:p14="http://schemas.microsoft.com/office/powerpoint/2010/main" val="2590858446"/>
+        <p14:creationId xmlns:p14="http://schemas.microsoft.com/office/powerpoint/2010/main" val="3251168646"/>
       </p:ext>
     </p:extLst>
   </p:cSld>
@@ -4912,7 +5048,7 @@
           <a:p>
             <a:r>
               <a:rPr lang="en-US" dirty="0" smtClean="0"/>
-              <a:t>Apply functions</a:t>
+              <a:t>Custom functions</a:t>
             </a:r>
             <a:endParaRPr lang="en-US" dirty="0"/>
           </a:p>
@@ -4940,7 +5076,7 @@
     </p:spTree>
     <p:extLst>
       <p:ext uri="{BB962C8B-B14F-4D97-AF65-F5344CB8AC3E}">
-        <p14:creationId xmlns:p14="http://schemas.microsoft.com/office/powerpoint/2010/main" val="3251168646"/>
+        <p14:creationId xmlns:p14="http://schemas.microsoft.com/office/powerpoint/2010/main" val="3492191647"/>
       </p:ext>
     </p:extLst>
   </p:cSld>
@@ -4984,78 +5120,6 @@
           <a:p>
             <a:r>
               <a:rPr lang="en-US" dirty="0" smtClean="0"/>
-              <a:t>Custom functions</a:t>
-            </a:r>
-            <a:endParaRPr lang="en-US" dirty="0"/>
-          </a:p>
-        </p:txBody>
-      </p:sp>
-      <p:sp>
-        <p:nvSpPr>
-          <p:cNvPr id="3" name="Content Placeholder 2"/>
-          <p:cNvSpPr>
-            <a:spLocks noGrp="1"/>
-          </p:cNvSpPr>
-          <p:nvPr>
-            <p:ph idx="1"/>
-          </p:nvPr>
-        </p:nvSpPr>
-        <p:spPr/>
-        <p:txBody>
-          <a:bodyPr/>
-          <a:lstStyle/>
-          <a:p>
-            <a:endParaRPr lang="en-US"/>
-          </a:p>
-        </p:txBody>
-      </p:sp>
-    </p:spTree>
-    <p:extLst>
-      <p:ext uri="{BB962C8B-B14F-4D97-AF65-F5344CB8AC3E}">
-        <p14:creationId xmlns:p14="http://schemas.microsoft.com/office/powerpoint/2010/main" val="3492191647"/>
-      </p:ext>
-    </p:extLst>
-  </p:cSld>
-  <p:clrMapOvr>
-    <a:masterClrMapping/>
-  </p:clrMapOvr>
-</p:sld>
-</file>
-
-<file path=ppt/slides/slide24.xml><?xml version="1.0" encoding="utf-8"?>
-<p:sld xmlns:a="http://schemas.openxmlformats.org/drawingml/2006/main" xmlns:r="http://schemas.openxmlformats.org/officeDocument/2006/relationships" xmlns:p="http://schemas.openxmlformats.org/presentationml/2006/main">
-  <p:cSld>
-    <p:spTree>
-      <p:nvGrpSpPr>
-        <p:cNvPr id="1" name=""/>
-        <p:cNvGrpSpPr/>
-        <p:nvPr/>
-      </p:nvGrpSpPr>
-      <p:grpSpPr>
-        <a:xfrm>
-          <a:off x="0" y="0"/>
-          <a:ext cx="0" cy="0"/>
-          <a:chOff x="0" y="0"/>
-          <a:chExt cx="0" cy="0"/>
-        </a:xfrm>
-      </p:grpSpPr>
-      <p:sp>
-        <p:nvSpPr>
-          <p:cNvPr id="2" name="Title 1"/>
-          <p:cNvSpPr>
-            <a:spLocks noGrp="1"/>
-          </p:cNvSpPr>
-          <p:nvPr>
-            <p:ph type="title"/>
-          </p:nvPr>
-        </p:nvSpPr>
-        <p:spPr/>
-        <p:txBody>
-          <a:bodyPr/>
-          <a:lstStyle/>
-          <a:p>
-            <a:r>
-              <a:rPr lang="en-US" dirty="0" smtClean="0"/>
               <a:t>Introducing ggplot2</a:t>
             </a:r>
             <a:endParaRPr lang="en-US" dirty="0"/>
@@ -5094,7 +5158,7 @@
 </p:sld>
 </file>
 
-<file path=ppt/slides/slide25.xml><?xml version="1.0" encoding="utf-8"?>
+<file path=ppt/slides/slide24.xml><?xml version="1.0" encoding="utf-8"?>
 <p:sld xmlns:a="http://schemas.openxmlformats.org/drawingml/2006/main" xmlns:r="http://schemas.openxmlformats.org/officeDocument/2006/relationships" xmlns:p="http://schemas.openxmlformats.org/presentationml/2006/main">
   <p:cSld>
     <p:spTree>
@@ -5179,6 +5243,117 @@
 </p:sld>
 </file>
 
+<file path=ppt/slides/slide25.xml><?xml version="1.0" encoding="utf-8"?>
+<p:sld xmlns:a="http://schemas.openxmlformats.org/drawingml/2006/main" xmlns:r="http://schemas.openxmlformats.org/officeDocument/2006/relationships" xmlns:p="http://schemas.openxmlformats.org/presentationml/2006/main">
+  <p:cSld>
+    <p:spTree>
+      <p:nvGrpSpPr>
+        <p:cNvPr id="1" name=""/>
+        <p:cNvGrpSpPr/>
+        <p:nvPr/>
+      </p:nvGrpSpPr>
+      <p:grpSpPr>
+        <a:xfrm>
+          <a:off x="0" y="0"/>
+          <a:ext cx="0" cy="0"/>
+          <a:chOff x="0" y="0"/>
+          <a:chExt cx="0" cy="0"/>
+        </a:xfrm>
+      </p:grpSpPr>
+      <p:sp>
+        <p:nvSpPr>
+          <p:cNvPr id="2" name="Title 1"/>
+          <p:cNvSpPr>
+            <a:spLocks noGrp="1"/>
+          </p:cNvSpPr>
+          <p:nvPr>
+            <p:ph type="title"/>
+          </p:nvPr>
+        </p:nvSpPr>
+        <p:spPr/>
+        <p:txBody>
+          <a:bodyPr/>
+          <a:lstStyle/>
+          <a:p>
+            <a:r>
+              <a:rPr lang="en-US" dirty="0" smtClean="0"/>
+              <a:t>Graphics options in R</a:t>
+            </a:r>
+            <a:endParaRPr lang="en-US" dirty="0"/>
+          </a:p>
+        </p:txBody>
+      </p:sp>
+      <p:sp>
+        <p:nvSpPr>
+          <p:cNvPr id="3" name="Content Placeholder 2"/>
+          <p:cNvSpPr>
+            <a:spLocks noGrp="1"/>
+          </p:cNvSpPr>
+          <p:nvPr>
+            <p:ph idx="1"/>
+          </p:nvPr>
+        </p:nvSpPr>
+        <p:spPr/>
+        <p:txBody>
+          <a:bodyPr/>
+          <a:lstStyle/>
+          <a:p>
+            <a:r>
+              <a:rPr lang="en-US" dirty="0" smtClean="0"/>
+              <a:t>At least 3 primary graphics options in R</a:t>
+            </a:r>
+          </a:p>
+          <a:p>
+            <a:pPr lvl="1"/>
+            <a:r>
+              <a:rPr lang="en-US" dirty="0" smtClean="0"/>
+              <a:t>base R graphics</a:t>
+            </a:r>
+          </a:p>
+          <a:p>
+            <a:pPr lvl="2"/>
+            <a:r>
+              <a:rPr lang="en-US" dirty="0" smtClean="0"/>
+              <a:t>plot(), par(), </a:t>
+            </a:r>
+            <a:r>
+              <a:rPr lang="en-US" dirty="0" err="1" smtClean="0"/>
+              <a:t>etc</a:t>
+            </a:r>
+            <a:endParaRPr lang="en-US" dirty="0" smtClean="0"/>
+          </a:p>
+          <a:p>
+            <a:pPr lvl="1"/>
+            <a:r>
+              <a:rPr lang="en-US" dirty="0" smtClean="0"/>
+              <a:t>lattice</a:t>
+            </a:r>
+          </a:p>
+          <a:p>
+            <a:pPr lvl="1"/>
+            <a:r>
+              <a:rPr lang="en-US" dirty="0" smtClean="0"/>
+              <a:t>ggplot2</a:t>
+            </a:r>
+          </a:p>
+          <a:p>
+            <a:endParaRPr lang="en-US" dirty="0" smtClean="0"/>
+          </a:p>
+        </p:txBody>
+      </p:sp>
+    </p:spTree>
+    <p:extLst>
+      <p:ext uri="{BB962C8B-B14F-4D97-AF65-F5344CB8AC3E}">
+        <p14:creationId xmlns:p14="http://schemas.microsoft.com/office/powerpoint/2010/main" val="1751816862"/>
+      </p:ext>
+    </p:extLst>
+  </p:cSld>
+  <p:clrMapOvr>
+    <a:masterClrMapping/>
+  </p:clrMapOvr>
+</p:sld>
+</file>
+
 <file path=ppt/slides/slide26.xml><?xml version="1.0" encoding="utf-8"?>
 <p:sld xmlns:a="http://schemas.openxmlformats.org/drawingml/2006/main" xmlns:r="http://schemas.openxmlformats.org/officeDocument/2006/relationships" xmlns:p="http://schemas.openxmlformats.org/presentationml/2006/main">
   <p:cSld>
@@ -5211,18 +5386,41 @@
           <a:bodyPr/>
           <a:lstStyle/>
           <a:p>
+            <a:r>
+              <a:rPr lang="en-US" dirty="0" smtClean="0"/>
+              <a:t>Why use ggplot2?</a:t>
+            </a:r>
+            <a:endParaRPr lang="en-US" dirty="0"/>
+          </a:p>
+        </p:txBody>
+      </p:sp>
+      <p:sp>
+        <p:nvSpPr>
+          <p:cNvPr id="4" name="Content Placeholder 3"/>
+          <p:cNvSpPr>
+            <a:spLocks noGrp="1"/>
+          </p:cNvSpPr>
+          <p:nvPr>
+            <p:ph sz="half" idx="1"/>
+          </p:nvPr>
+        </p:nvSpPr>
+        <p:spPr/>
+        <p:txBody>
+          <a:bodyPr/>
+          <a:lstStyle/>
+          <a:p>
             <a:endParaRPr lang="en-US"/>
           </a:p>
         </p:txBody>
       </p:sp>
       <p:sp>
         <p:nvSpPr>
-          <p:cNvPr id="3" name="Content Placeholder 2"/>
-          <p:cNvSpPr>
-            <a:spLocks noGrp="1"/>
-          </p:cNvSpPr>
-          <p:nvPr>
-            <p:ph idx="1"/>
+          <p:cNvPr id="5" name="Content Placeholder 4"/>
+          <p:cNvSpPr>
+            <a:spLocks noGrp="1"/>
+          </p:cNvSpPr>
+          <p:nvPr>
+            <p:ph sz="half" idx="2"/>
           </p:nvPr>
         </p:nvSpPr>
         <p:spPr/>
@@ -5231,13 +5429,73 @@
           <a:lstStyle/>
           <a:p>
             <a:endParaRPr lang="en-US"/>
+          </a:p>
+        </p:txBody>
+      </p:sp>
+      <p:sp>
+        <p:nvSpPr>
+          <p:cNvPr id="6" name="TextBox 5"/>
+          <p:cNvSpPr txBox="1"/>
+          <p:nvPr/>
+        </p:nvSpPr>
+        <p:spPr>
+          <a:xfrm>
+            <a:off x="1710267" y="6220861"/>
+            <a:ext cx="1082348" cy="461665"/>
+          </a:xfrm>
+          <a:prstGeom prst="rect">
+            <a:avLst/>
+          </a:prstGeom>
+          <a:noFill/>
+        </p:spPr>
+        <p:txBody>
+          <a:bodyPr wrap="none" rtlCol="0">
+            <a:spAutoFit/>
+          </a:bodyPr>
+          <a:lstStyle/>
+          <a:p>
+            <a:r>
+              <a:rPr lang="en-US" sz="2400" dirty="0" smtClean="0"/>
+              <a:t>base R</a:t>
+            </a:r>
+            <a:endParaRPr lang="en-US" sz="2400" dirty="0"/>
+          </a:p>
+        </p:txBody>
+      </p:sp>
+      <p:sp>
+        <p:nvSpPr>
+          <p:cNvPr id="7" name="TextBox 6"/>
+          <p:cNvSpPr txBox="1"/>
+          <p:nvPr/>
+        </p:nvSpPr>
+        <p:spPr>
+          <a:xfrm>
+            <a:off x="6282267" y="6220861"/>
+            <a:ext cx="1204476" cy="461665"/>
+          </a:xfrm>
+          <a:prstGeom prst="rect">
+            <a:avLst/>
+          </a:prstGeom>
+          <a:noFill/>
+        </p:spPr>
+        <p:txBody>
+          <a:bodyPr wrap="none" rtlCol="0">
+            <a:spAutoFit/>
+          </a:bodyPr>
+          <a:lstStyle/>
+          <a:p>
+            <a:r>
+              <a:rPr lang="en-US" sz="2400" dirty="0" smtClean="0"/>
+              <a:t>ggplot2</a:t>
+            </a:r>
+            <a:endParaRPr lang="en-US" sz="2400" dirty="0"/>
           </a:p>
         </p:txBody>
       </p:sp>
     </p:spTree>
     <p:extLst>
       <p:ext uri="{BB962C8B-B14F-4D97-AF65-F5344CB8AC3E}">
-        <p14:creationId xmlns:p14="http://schemas.microsoft.com/office/powerpoint/2010/main" val="1751816862"/>
+        <p14:creationId xmlns:p14="http://schemas.microsoft.com/office/powerpoint/2010/main" val="1347912468"/>
       </p:ext>
     </p:extLst>
   </p:cSld>
@@ -5266,7 +5524,7 @@
       </p:grpSpPr>
       <p:sp>
         <p:nvSpPr>
-          <p:cNvPr id="2" name="Title 1"/>
+          <p:cNvPr id="5" name="Title 4"/>
           <p:cNvSpPr>
             <a:spLocks noGrp="1"/>
           </p:cNvSpPr>
@@ -5281,7 +5539,7 @@
           <a:p>
             <a:r>
               <a:rPr lang="en-US" dirty="0" smtClean="0"/>
-              <a:t>Interactive graphics with R shiny</a:t>
+              <a:t>ggplot2 syntax</a:t>
             </a:r>
             <a:endParaRPr lang="en-US" dirty="0"/>
           </a:p>
@@ -5289,51 +5547,408 @@
       </p:sp>
       <p:sp>
         <p:nvSpPr>
-          <p:cNvPr id="3" name="Content Placeholder 2"/>
-          <p:cNvSpPr>
-            <a:spLocks noGrp="1"/>
-          </p:cNvSpPr>
-          <p:nvPr>
-            <p:ph idx="1"/>
-          </p:nvPr>
-        </p:nvSpPr>
-        <p:spPr/>
-        <p:txBody>
-          <a:bodyPr>
-            <a:normAutofit/>
+          <p:cNvPr id="7" name="Rectangle 6"/>
+          <p:cNvSpPr/>
+          <p:nvPr/>
+        </p:nvSpPr>
+        <p:spPr>
+          <a:xfrm>
+            <a:off x="226785" y="887582"/>
+            <a:ext cx="8771465" cy="400110"/>
+          </a:xfrm>
+          <a:prstGeom prst="rect">
+            <a:avLst/>
+          </a:prstGeom>
+        </p:spPr>
+        <p:txBody>
+          <a:bodyPr wrap="square">
+            <a:spAutoFit/>
           </a:bodyPr>
           <a:lstStyle/>
           <a:p>
             <a:r>
-              <a:rPr lang="en-US" sz="2800" dirty="0" smtClean="0"/>
-              <a:t>Optimizing a graphic often requires multiple iterative alterations</a:t>
-            </a:r>
-          </a:p>
-          <a:p>
-            <a:r>
-              <a:rPr lang="en-US" sz="2800" dirty="0" smtClean="0"/>
-              <a:t>Analysis and interpretation often benefits from active filtering, variable selection, and parameterization</a:t>
-            </a:r>
-          </a:p>
-          <a:p>
-            <a:r>
-              <a:rPr lang="en-US" sz="2800" dirty="0" smtClean="0"/>
-              <a:t>Interactive graphics allow end-users, especially non-experts, to more effectively explore data</a:t>
-            </a:r>
-          </a:p>
-          <a:p>
-            <a:r>
-              <a:rPr lang="en-US" sz="2800" dirty="0" smtClean="0"/>
-              <a:t>The R shiny package allows you to quickly and easily create sophisticated web-accessible interactive graphics</a:t>
-            </a:r>
-            <a:endParaRPr lang="en-US" sz="2800" dirty="0"/>
-          </a:p>
-        </p:txBody>
-      </p:sp>
+              <a:rPr lang="en-US" sz="2000" dirty="0" err="1"/>
+              <a:t>ggplot</a:t>
+            </a:r>
+            <a:r>
+              <a:rPr lang="en-US" sz="2000" dirty="0"/>
+              <a:t>(data=</a:t>
+            </a:r>
+            <a:r>
+              <a:rPr lang="en-US" sz="2000" dirty="0" err="1"/>
+              <a:t>variantData</a:t>
+            </a:r>
+            <a:r>
+              <a:rPr lang="en-US" sz="2000" dirty="0"/>
+              <a:t>, </a:t>
+            </a:r>
+            <a:r>
+              <a:rPr lang="en-US" sz="2000" dirty="0" err="1"/>
+              <a:t>aes</a:t>
+            </a:r>
+            <a:r>
+              <a:rPr lang="en-US" sz="2000" dirty="0"/>
+              <a:t>(x=</a:t>
+            </a:r>
+            <a:r>
+              <a:rPr lang="en-US" sz="2000" dirty="0" err="1"/>
+              <a:t>tumor_VAF</a:t>
+            </a:r>
+            <a:r>
+              <a:rPr lang="en-US" sz="2000" dirty="0"/>
+              <a:t>, y=</a:t>
+            </a:r>
+            <a:r>
+              <a:rPr lang="en-US" sz="2000" dirty="0" err="1"/>
+              <a:t>tumor_COV</a:t>
+            </a:r>
+            <a:r>
+              <a:rPr lang="en-US" sz="2000" dirty="0"/>
+              <a:t>)) + </a:t>
+            </a:r>
+            <a:r>
+              <a:rPr lang="en-US" sz="2000" dirty="0" err="1"/>
+              <a:t>geom_point</a:t>
+            </a:r>
+            <a:r>
+              <a:rPr lang="en-US" sz="2000" dirty="0"/>
+              <a:t>()</a:t>
+            </a:r>
+          </a:p>
+        </p:txBody>
+      </p:sp>
+      <p:sp>
+        <p:nvSpPr>
+          <p:cNvPr id="8" name="Rectangle 7"/>
+          <p:cNvSpPr/>
+          <p:nvPr/>
+        </p:nvSpPr>
+        <p:spPr>
+          <a:xfrm>
+            <a:off x="2421468" y="2476293"/>
+            <a:ext cx="4047072" cy="1200329"/>
+          </a:xfrm>
+          <a:prstGeom prst="rect">
+            <a:avLst/>
+          </a:prstGeom>
+        </p:spPr>
+        <p:txBody>
+          <a:bodyPr wrap="square">
+            <a:spAutoFit/>
+          </a:bodyPr>
+          <a:lstStyle/>
+          <a:p>
+            <a:pPr algn="ctr"/>
+            <a:r>
+              <a:rPr lang="en-US" dirty="0"/>
+              <a:t>Aesthetic mappings describe how variables in the data are mapped to visual properties (aesthetics) of </a:t>
+            </a:r>
+            <a:r>
+              <a:rPr lang="en-US" dirty="0" smtClean="0"/>
+              <a:t>geometric objects (</a:t>
+            </a:r>
+            <a:r>
+              <a:rPr lang="en-US" dirty="0" err="1" smtClean="0"/>
+              <a:t>geoms</a:t>
+            </a:r>
+            <a:r>
+              <a:rPr lang="en-US" dirty="0" smtClean="0"/>
+              <a:t>)</a:t>
+            </a:r>
+            <a:endParaRPr lang="en-US" dirty="0"/>
+          </a:p>
+        </p:txBody>
+      </p:sp>
+      <p:cxnSp>
+        <p:nvCxnSpPr>
+          <p:cNvPr id="10" name="Straight Connector 9"/>
+          <p:cNvCxnSpPr/>
+          <p:nvPr/>
+        </p:nvCxnSpPr>
+        <p:spPr>
+          <a:xfrm>
+            <a:off x="7366000" y="1355424"/>
+            <a:ext cx="1479853" cy="0"/>
+          </a:xfrm>
+          <a:prstGeom prst="line">
+            <a:avLst/>
+          </a:prstGeom>
+          <a:ln w="57150" cmpd="sng"/>
+        </p:spPr>
+        <p:style>
+          <a:lnRef idx="2">
+            <a:schemeClr val="accent1"/>
+          </a:lnRef>
+          <a:fillRef idx="0">
+            <a:schemeClr val="accent1"/>
+          </a:fillRef>
+          <a:effectRef idx="1">
+            <a:schemeClr val="accent1"/>
+          </a:effectRef>
+          <a:fontRef idx="minor">
+            <a:schemeClr val="tx1"/>
+          </a:fontRef>
+        </p:style>
+      </p:cxnSp>
+      <p:cxnSp>
+        <p:nvCxnSpPr>
+          <p:cNvPr id="11" name="Straight Connector 10"/>
+          <p:cNvCxnSpPr/>
+          <p:nvPr/>
+        </p:nvCxnSpPr>
+        <p:spPr>
+          <a:xfrm>
+            <a:off x="3268132" y="1355424"/>
+            <a:ext cx="3742268" cy="0"/>
+          </a:xfrm>
+          <a:prstGeom prst="line">
+            <a:avLst/>
+          </a:prstGeom>
+          <a:ln w="57150" cmpd="sng"/>
+        </p:spPr>
+        <p:style>
+          <a:lnRef idx="2">
+            <a:schemeClr val="accent1"/>
+          </a:lnRef>
+          <a:fillRef idx="0">
+            <a:schemeClr val="accent1"/>
+          </a:fillRef>
+          <a:effectRef idx="1">
+            <a:schemeClr val="accent1"/>
+          </a:effectRef>
+          <a:fontRef idx="minor">
+            <a:schemeClr val="tx1"/>
+          </a:fontRef>
+        </p:style>
+      </p:cxnSp>
+      <p:cxnSp>
+        <p:nvCxnSpPr>
+          <p:cNvPr id="13" name="Straight Connector 12"/>
+          <p:cNvCxnSpPr/>
+          <p:nvPr/>
+        </p:nvCxnSpPr>
+        <p:spPr>
+          <a:xfrm>
+            <a:off x="1202266" y="1355424"/>
+            <a:ext cx="1828800" cy="0"/>
+          </a:xfrm>
+          <a:prstGeom prst="line">
+            <a:avLst/>
+          </a:prstGeom>
+          <a:ln w="57150" cmpd="sng"/>
+        </p:spPr>
+        <p:style>
+          <a:lnRef idx="2">
+            <a:schemeClr val="accent1"/>
+          </a:lnRef>
+          <a:fillRef idx="0">
+            <a:schemeClr val="accent1"/>
+          </a:fillRef>
+          <a:effectRef idx="1">
+            <a:schemeClr val="accent1"/>
+          </a:effectRef>
+          <a:fontRef idx="minor">
+            <a:schemeClr val="tx1"/>
+          </a:fontRef>
+        </p:style>
+      </p:cxnSp>
+      <p:cxnSp>
+        <p:nvCxnSpPr>
+          <p:cNvPr id="17" name="Straight Connector 16"/>
+          <p:cNvCxnSpPr>
+            <a:endCxn id="21" idx="0"/>
+          </p:cNvCxnSpPr>
+          <p:nvPr/>
+        </p:nvCxnSpPr>
+        <p:spPr>
+          <a:xfrm flipH="1">
+            <a:off x="1205594" y="1355424"/>
+            <a:ext cx="928007" cy="541124"/>
+          </a:xfrm>
+          <a:prstGeom prst="line">
+            <a:avLst/>
+          </a:prstGeom>
+          <a:ln w="57150" cmpd="sng"/>
+        </p:spPr>
+        <p:style>
+          <a:lnRef idx="2">
+            <a:schemeClr val="accent1"/>
+          </a:lnRef>
+          <a:fillRef idx="0">
+            <a:schemeClr val="accent1"/>
+          </a:fillRef>
+          <a:effectRef idx="1">
+            <a:schemeClr val="accent1"/>
+          </a:effectRef>
+          <a:fontRef idx="minor">
+            <a:schemeClr val="tx1"/>
+          </a:fontRef>
+        </p:style>
+      </p:cxnSp>
+      <p:sp>
+        <p:nvSpPr>
+          <p:cNvPr id="21" name="Rectangle 20"/>
+          <p:cNvSpPr/>
+          <p:nvPr/>
+        </p:nvSpPr>
+        <p:spPr>
+          <a:xfrm>
+            <a:off x="175986" y="1896548"/>
+            <a:ext cx="2059215" cy="646331"/>
+          </a:xfrm>
+          <a:prstGeom prst="rect">
+            <a:avLst/>
+          </a:prstGeom>
+        </p:spPr>
+        <p:txBody>
+          <a:bodyPr wrap="square">
+            <a:spAutoFit/>
+          </a:bodyPr>
+          <a:lstStyle/>
+          <a:p>
+            <a:pPr algn="ctr"/>
+            <a:r>
+              <a:rPr lang="en-US" dirty="0" err="1" smtClean="0"/>
+              <a:t>dataframe</a:t>
+            </a:r>
+            <a:r>
+              <a:rPr lang="en-US" dirty="0" smtClean="0"/>
+              <a:t> with data to be plotted</a:t>
+            </a:r>
+            <a:endParaRPr lang="en-US" dirty="0"/>
+          </a:p>
+        </p:txBody>
+      </p:sp>
+      <p:cxnSp>
+        <p:nvCxnSpPr>
+          <p:cNvPr id="22" name="Straight Connector 21"/>
+          <p:cNvCxnSpPr>
+            <a:endCxn id="8" idx="0"/>
+          </p:cNvCxnSpPr>
+          <p:nvPr/>
+        </p:nvCxnSpPr>
+        <p:spPr>
+          <a:xfrm flipH="1">
+            <a:off x="4445004" y="1355424"/>
+            <a:ext cx="550329" cy="1120869"/>
+          </a:xfrm>
+          <a:prstGeom prst="line">
+            <a:avLst/>
+          </a:prstGeom>
+          <a:ln w="57150" cmpd="sng"/>
+        </p:spPr>
+        <p:style>
+          <a:lnRef idx="2">
+            <a:schemeClr val="accent1"/>
+          </a:lnRef>
+          <a:fillRef idx="0">
+            <a:schemeClr val="accent1"/>
+          </a:fillRef>
+          <a:effectRef idx="1">
+            <a:schemeClr val="accent1"/>
+          </a:effectRef>
+          <a:fontRef idx="minor">
+            <a:schemeClr val="tx1"/>
+          </a:fontRef>
+        </p:style>
+      </p:cxnSp>
+      <p:cxnSp>
+        <p:nvCxnSpPr>
+          <p:cNvPr id="24" name="Straight Connector 23"/>
+          <p:cNvCxnSpPr>
+            <a:endCxn id="26" idx="0"/>
+          </p:cNvCxnSpPr>
+          <p:nvPr/>
+        </p:nvCxnSpPr>
+        <p:spPr>
+          <a:xfrm flipH="1">
+            <a:off x="7782380" y="1355424"/>
+            <a:ext cx="294821" cy="528202"/>
+          </a:xfrm>
+          <a:prstGeom prst="line">
+            <a:avLst/>
+          </a:prstGeom>
+          <a:ln w="57150" cmpd="sng"/>
+        </p:spPr>
+        <p:style>
+          <a:lnRef idx="2">
+            <a:schemeClr val="accent1"/>
+          </a:lnRef>
+          <a:fillRef idx="0">
+            <a:schemeClr val="accent1"/>
+          </a:fillRef>
+          <a:effectRef idx="1">
+            <a:schemeClr val="accent1"/>
+          </a:effectRef>
+          <a:fontRef idx="minor">
+            <a:schemeClr val="tx1"/>
+          </a:fontRef>
+        </p:style>
+      </p:cxnSp>
+      <p:sp>
+        <p:nvSpPr>
+          <p:cNvPr id="26" name="Rectangle 25"/>
+          <p:cNvSpPr/>
+          <p:nvPr/>
+        </p:nvSpPr>
+        <p:spPr>
+          <a:xfrm>
+            <a:off x="6752772" y="1883626"/>
+            <a:ext cx="2059215" cy="923330"/>
+          </a:xfrm>
+          <a:prstGeom prst="rect">
+            <a:avLst/>
+          </a:prstGeom>
+        </p:spPr>
+        <p:txBody>
+          <a:bodyPr wrap="square">
+            <a:spAutoFit/>
+          </a:bodyPr>
+          <a:lstStyle/>
+          <a:p>
+            <a:pPr algn="ctr"/>
+            <a:r>
+              <a:rPr lang="en-US" dirty="0" smtClean="0"/>
+              <a:t>geometric objects specify how data should be plotted</a:t>
+            </a:r>
+            <a:endParaRPr lang="en-US" dirty="0"/>
+          </a:p>
+        </p:txBody>
+      </p:sp>
+      <p:pic>
+        <p:nvPicPr>
+          <p:cNvPr id="31" name="Picture 30" descr="Rplot.png"/>
+          <p:cNvPicPr>
+            <a:picLocks noChangeAspect="1"/>
+          </p:cNvPicPr>
+          <p:nvPr/>
+        </p:nvPicPr>
+        <p:blipFill>
+          <a:blip r:embed="rId2">
+            <a:extLst>
+              <a:ext uri="{28A0092B-C50C-407E-A947-70E740481C1C}">
+                <a14:useLocalDpi xmlns:a14="http://schemas.microsoft.com/office/drawing/2010/main" val="0"/>
+              </a:ext>
+            </a:extLst>
+          </a:blip>
+          <a:stretch>
+            <a:fillRect/>
+          </a:stretch>
+        </p:blipFill>
+        <p:spPr>
+          <a:xfrm>
+            <a:off x="5843249" y="3778220"/>
+            <a:ext cx="3300751" cy="3079780"/>
+          </a:xfrm>
+          <a:prstGeom prst="rect">
+            <a:avLst/>
+          </a:prstGeom>
+        </p:spPr>
+      </p:pic>
     </p:spTree>
     <p:extLst>
       <p:ext uri="{BB962C8B-B14F-4D97-AF65-F5344CB8AC3E}">
-        <p14:creationId xmlns:p14="http://schemas.microsoft.com/office/powerpoint/2010/main" val="2141840622"/>
+        <p14:creationId xmlns:p14="http://schemas.microsoft.com/office/powerpoint/2010/main" val="3655088676"/>
       </p:ext>
     </p:extLst>
   </p:cSld>
@@ -5377,7 +5992,7 @@
           <a:p>
             <a:r>
               <a:rPr lang="en-US" dirty="0" smtClean="0"/>
-              <a:t>Basic organization of a shiny application</a:t>
+              <a:t>Faceting</a:t>
             </a:r>
             <a:endParaRPr lang="en-US" dirty="0"/>
           </a:p>
@@ -5385,290 +6000,99 @@
       </p:sp>
       <p:sp>
         <p:nvSpPr>
-          <p:cNvPr id="5" name="TextBox 4"/>
-          <p:cNvSpPr txBox="1"/>
-          <p:nvPr/>
-        </p:nvSpPr>
-        <p:spPr>
-          <a:xfrm>
-            <a:off x="3945463" y="2379940"/>
-            <a:ext cx="1170362" cy="830997"/>
-          </a:xfrm>
-          <a:prstGeom prst="rect">
-            <a:avLst/>
-          </a:prstGeom>
-          <a:noFill/>
-        </p:spPr>
-        <p:txBody>
-          <a:bodyPr wrap="none" rtlCol="0">
-            <a:spAutoFit/>
-          </a:bodyPr>
-          <a:lstStyle/>
-          <a:p>
-            <a:pPr algn="ctr"/>
-            <a:r>
-              <a:rPr lang="en-US" sz="2400" dirty="0" err="1" smtClean="0"/>
-              <a:t>shinyUI</a:t>
-            </a:r>
-            <a:endParaRPr lang="en-US" sz="2400" dirty="0" smtClean="0"/>
-          </a:p>
-          <a:p>
-            <a:pPr algn="ctr"/>
-            <a:r>
-              <a:rPr lang="en-US" sz="2400" dirty="0" err="1" smtClean="0"/>
-              <a:t>ui.R</a:t>
-            </a:r>
-            <a:endParaRPr lang="en-US" sz="2400" dirty="0"/>
-          </a:p>
-        </p:txBody>
-      </p:sp>
-      <p:sp>
-        <p:nvSpPr>
-          <p:cNvPr id="6" name="TextBox 5"/>
-          <p:cNvSpPr txBox="1"/>
-          <p:nvPr/>
-        </p:nvSpPr>
-        <p:spPr>
-          <a:xfrm>
-            <a:off x="3633276" y="1032941"/>
-            <a:ext cx="1758865" cy="830997"/>
-          </a:xfrm>
-          <a:prstGeom prst="rect">
-            <a:avLst/>
-          </a:prstGeom>
-          <a:noFill/>
-        </p:spPr>
-        <p:txBody>
-          <a:bodyPr wrap="none" rtlCol="0">
-            <a:spAutoFit/>
-          </a:bodyPr>
-          <a:lstStyle/>
-          <a:p>
-            <a:pPr algn="ctr"/>
-            <a:r>
-              <a:rPr lang="en-US" sz="2400" dirty="0" err="1" smtClean="0"/>
-              <a:t>shinyServer</a:t>
-            </a:r>
-            <a:endParaRPr lang="en-US" sz="2400" dirty="0" smtClean="0"/>
-          </a:p>
-          <a:p>
-            <a:pPr algn="ctr"/>
-            <a:r>
-              <a:rPr lang="en-US" sz="2400" dirty="0" err="1" smtClean="0"/>
-              <a:t>server.R</a:t>
-            </a:r>
-            <a:endParaRPr lang="en-US" sz="2400" dirty="0"/>
-          </a:p>
-        </p:txBody>
-      </p:sp>
-      <p:sp>
-        <p:nvSpPr>
-          <p:cNvPr id="9" name="Curved Left Arrow 8"/>
-          <p:cNvSpPr/>
-          <p:nvPr/>
-        </p:nvSpPr>
-        <p:spPr>
-          <a:xfrm>
-            <a:off x="5529772" y="1337735"/>
-            <a:ext cx="853657" cy="1659469"/>
-          </a:xfrm>
-          <a:prstGeom prst="curvedLeftArrow">
-            <a:avLst/>
-          </a:prstGeom>
-        </p:spPr>
-        <p:style>
-          <a:lnRef idx="1">
-            <a:schemeClr val="dk1"/>
-          </a:lnRef>
-          <a:fillRef idx="3">
-            <a:schemeClr val="dk1"/>
-          </a:fillRef>
-          <a:effectRef idx="2">
-            <a:schemeClr val="dk1"/>
-          </a:effectRef>
-          <a:fontRef idx="minor">
-            <a:schemeClr val="lt1"/>
-          </a:fontRef>
-        </p:style>
-        <p:txBody>
-          <a:bodyPr rtlCol="0" anchor="ctr"/>
-          <a:lstStyle/>
-          <a:p>
-            <a:pPr algn="ctr"/>
-            <a:endParaRPr lang="en-US">
-              <a:solidFill>
-                <a:schemeClr val="bg1">
-                  <a:lumMod val="65000"/>
-                </a:schemeClr>
-              </a:solidFill>
-            </a:endParaRPr>
-          </a:p>
-        </p:txBody>
-      </p:sp>
-      <p:pic>
-        <p:nvPicPr>
-          <p:cNvPr id="15" name="Picture 14"/>
-          <p:cNvPicPr>
-            <a:picLocks noChangeAspect="1"/>
-          </p:cNvPicPr>
-          <p:nvPr/>
-        </p:nvPicPr>
-        <p:blipFill>
-          <a:blip r:embed="rId2"/>
-          <a:stretch>
-            <a:fillRect/>
-          </a:stretch>
-        </p:blipFill>
-        <p:spPr>
-          <a:xfrm>
-            <a:off x="643466" y="3282658"/>
-            <a:ext cx="7772400" cy="2737104"/>
-          </a:xfrm>
-          <a:prstGeom prst="rect">
-            <a:avLst/>
-          </a:prstGeom>
-        </p:spPr>
-      </p:pic>
-      <p:sp>
-        <p:nvSpPr>
-          <p:cNvPr id="16" name="Curved Left Arrow 15"/>
-          <p:cNvSpPr/>
-          <p:nvPr/>
-        </p:nvSpPr>
-        <p:spPr>
-          <a:xfrm rot="10800000">
-            <a:off x="2685031" y="1236140"/>
-            <a:ext cx="853657" cy="1659469"/>
-          </a:xfrm>
-          <a:prstGeom prst="curvedLeftArrow">
-            <a:avLst/>
-          </a:prstGeom>
-        </p:spPr>
-        <p:style>
-          <a:lnRef idx="1">
-            <a:schemeClr val="dk1"/>
-          </a:lnRef>
-          <a:fillRef idx="3">
-            <a:schemeClr val="dk1"/>
-          </a:fillRef>
-          <a:effectRef idx="2">
-            <a:schemeClr val="dk1"/>
-          </a:effectRef>
-          <a:fontRef idx="minor">
-            <a:schemeClr val="lt1"/>
-          </a:fontRef>
-        </p:style>
-        <p:txBody>
-          <a:bodyPr rtlCol="0" anchor="ctr"/>
-          <a:lstStyle/>
-          <a:p>
-            <a:pPr algn="ctr"/>
-            <a:endParaRPr lang="en-US">
-              <a:solidFill>
-                <a:schemeClr val="bg1">
-                  <a:lumMod val="65000"/>
-                </a:schemeClr>
-              </a:solidFill>
-            </a:endParaRPr>
-          </a:p>
-        </p:txBody>
-      </p:sp>
-      <p:sp>
-        <p:nvSpPr>
-          <p:cNvPr id="17" name="TextBox 16"/>
-          <p:cNvSpPr txBox="1"/>
-          <p:nvPr/>
-        </p:nvSpPr>
-        <p:spPr>
-          <a:xfrm>
-            <a:off x="1337728" y="1630070"/>
-            <a:ext cx="1117600" cy="954107"/>
-          </a:xfrm>
-          <a:prstGeom prst="rect">
-            <a:avLst/>
-          </a:prstGeom>
-          <a:noFill/>
-        </p:spPr>
-        <p:txBody>
-          <a:bodyPr wrap="square" rtlCol="0">
-            <a:spAutoFit/>
-          </a:bodyPr>
-          <a:lstStyle/>
-          <a:p>
-            <a:pPr algn="ctr"/>
-            <a:r>
-              <a:rPr lang="en-US" sz="2800" dirty="0" smtClean="0"/>
-              <a:t>User input</a:t>
-            </a:r>
-            <a:endParaRPr lang="en-US" sz="2800" dirty="0"/>
-          </a:p>
-        </p:txBody>
-      </p:sp>
-      <p:sp>
-        <p:nvSpPr>
-          <p:cNvPr id="18" name="TextBox 17"/>
-          <p:cNvSpPr txBox="1"/>
-          <p:nvPr/>
-        </p:nvSpPr>
-        <p:spPr>
-          <a:xfrm>
-            <a:off x="6570127" y="1647003"/>
-            <a:ext cx="1524008" cy="954107"/>
-          </a:xfrm>
-          <a:prstGeom prst="rect">
-            <a:avLst/>
-          </a:prstGeom>
-          <a:noFill/>
-        </p:spPr>
-        <p:txBody>
-          <a:bodyPr wrap="square" rtlCol="0">
-            <a:spAutoFit/>
-          </a:bodyPr>
-          <a:lstStyle/>
-          <a:p>
-            <a:pPr algn="ctr"/>
-            <a:r>
-              <a:rPr lang="en-US" sz="2800" dirty="0" smtClean="0"/>
-              <a:t>R output</a:t>
-            </a:r>
-            <a:endParaRPr lang="en-US" sz="2800" dirty="0"/>
-          </a:p>
-        </p:txBody>
-      </p:sp>
-      <p:sp>
-        <p:nvSpPr>
-          <p:cNvPr id="19" name="TextBox 18"/>
-          <p:cNvSpPr txBox="1"/>
-          <p:nvPr/>
-        </p:nvSpPr>
-        <p:spPr>
-          <a:xfrm>
-            <a:off x="1202962" y="6144335"/>
-            <a:ext cx="6806821" cy="523220"/>
-          </a:xfrm>
-          <a:prstGeom prst="rect">
-            <a:avLst/>
-          </a:prstGeom>
-          <a:noFill/>
-        </p:spPr>
-        <p:txBody>
-          <a:bodyPr wrap="none" rtlCol="0">
-            <a:spAutoFit/>
-          </a:bodyPr>
-          <a:lstStyle/>
-          <a:p>
-            <a:r>
-              <a:rPr lang="en-US" sz="2800" dirty="0" smtClean="0"/>
-              <a:t>Interactive User Interface (UI) = website</a:t>
-            </a:r>
-            <a:endParaRPr lang="en-US" sz="2800" dirty="0"/>
+          <p:cNvPr id="3" name="Content Placeholder 2"/>
+          <p:cNvSpPr>
+            <a:spLocks noGrp="1"/>
+          </p:cNvSpPr>
+          <p:nvPr>
+            <p:ph idx="1"/>
+          </p:nvPr>
+        </p:nvSpPr>
+        <p:spPr/>
+        <p:txBody>
+          <a:bodyPr/>
+          <a:lstStyle/>
+          <a:p>
+            <a:endParaRPr lang="en-US"/>
           </a:p>
         </p:txBody>
       </p:sp>
     </p:spTree>
     <p:extLst>
       <p:ext uri="{BB962C8B-B14F-4D97-AF65-F5344CB8AC3E}">
-        <p14:creationId xmlns:p14="http://schemas.microsoft.com/office/powerpoint/2010/main" val="2373662838"/>
+        <p14:creationId xmlns:p14="http://schemas.microsoft.com/office/powerpoint/2010/main" val="2544762656"/>
+      </p:ext>
+    </p:extLst>
+  </p:cSld>
+  <p:clrMapOvr>
+    <a:masterClrMapping/>
+  </p:clrMapOvr>
+</p:sld>
+</file>
+
+<file path=ppt/slides/slide29.xml><?xml version="1.0" encoding="utf-8"?>
+<p:sld xmlns:a="http://schemas.openxmlformats.org/drawingml/2006/main" xmlns:r="http://schemas.openxmlformats.org/officeDocument/2006/relationships" xmlns:p="http://schemas.openxmlformats.org/presentationml/2006/main">
+  <p:cSld>
+    <p:spTree>
+      <p:nvGrpSpPr>
+        <p:cNvPr id="1" name=""/>
+        <p:cNvGrpSpPr/>
+        <p:nvPr/>
+      </p:nvGrpSpPr>
+      <p:grpSpPr>
+        <a:xfrm>
+          <a:off x="0" y="0"/>
+          <a:ext cx="0" cy="0"/>
+          <a:chOff x="0" y="0"/>
+          <a:chExt cx="0" cy="0"/>
+        </a:xfrm>
+      </p:grpSpPr>
+      <p:sp>
+        <p:nvSpPr>
+          <p:cNvPr id="2" name="Title 1"/>
+          <p:cNvSpPr>
+            <a:spLocks noGrp="1"/>
+          </p:cNvSpPr>
+          <p:nvPr>
+            <p:ph type="title"/>
+          </p:nvPr>
+        </p:nvSpPr>
+        <p:spPr/>
+        <p:txBody>
+          <a:bodyPr/>
+          <a:lstStyle/>
+          <a:p>
+            <a:r>
+              <a:rPr lang="en-US" dirty="0" smtClean="0"/>
+              <a:t>Themes</a:t>
+            </a:r>
+            <a:endParaRPr lang="en-US" dirty="0"/>
+          </a:p>
+        </p:txBody>
+      </p:sp>
+      <p:sp>
+        <p:nvSpPr>
+          <p:cNvPr id="3" name="Content Placeholder 2"/>
+          <p:cNvSpPr>
+            <a:spLocks noGrp="1"/>
+          </p:cNvSpPr>
+          <p:nvPr>
+            <p:ph idx="1"/>
+          </p:nvPr>
+        </p:nvSpPr>
+        <p:spPr/>
+        <p:txBody>
+          <a:bodyPr/>
+          <a:lstStyle/>
+          <a:p>
+            <a:endParaRPr lang="en-US"/>
+          </a:p>
+        </p:txBody>
+      </p:sp>
+    </p:spTree>
+    <p:extLst>
+      <p:ext uri="{BB962C8B-B14F-4D97-AF65-F5344CB8AC3E}">
+        <p14:creationId xmlns:p14="http://schemas.microsoft.com/office/powerpoint/2010/main" val="3148104315"/>
       </p:ext>
     </p:extLst>
   </p:cSld>
@@ -5849,6 +6273,512 @@
       </p:par>
     </p:tnLst>
   </p:timing>
+</p:sld>
+</file>
+
+<file path=ppt/slides/slide30.xml><?xml version="1.0" encoding="utf-8"?>
+<p:sld xmlns:a="http://schemas.openxmlformats.org/drawingml/2006/main" xmlns:r="http://schemas.openxmlformats.org/officeDocument/2006/relationships" xmlns:p="http://schemas.openxmlformats.org/presentationml/2006/main">
+  <p:cSld>
+    <p:spTree>
+      <p:nvGrpSpPr>
+        <p:cNvPr id="1" name=""/>
+        <p:cNvGrpSpPr/>
+        <p:nvPr/>
+      </p:nvGrpSpPr>
+      <p:grpSpPr>
+        <a:xfrm>
+          <a:off x="0" y="0"/>
+          <a:ext cx="0" cy="0"/>
+          <a:chOff x="0" y="0"/>
+          <a:chExt cx="0" cy="0"/>
+        </a:xfrm>
+      </p:grpSpPr>
+      <p:sp>
+        <p:nvSpPr>
+          <p:cNvPr id="2" name="Title 1"/>
+          <p:cNvSpPr>
+            <a:spLocks noGrp="1"/>
+          </p:cNvSpPr>
+          <p:nvPr>
+            <p:ph type="title"/>
+          </p:nvPr>
+        </p:nvSpPr>
+        <p:spPr/>
+        <p:txBody>
+          <a:bodyPr/>
+          <a:lstStyle/>
+          <a:p>
+            <a:r>
+              <a:rPr lang="en-US" dirty="0" smtClean="0"/>
+              <a:t>Interactive graphics with R shiny</a:t>
+            </a:r>
+            <a:endParaRPr lang="en-US" dirty="0"/>
+          </a:p>
+        </p:txBody>
+      </p:sp>
+      <p:sp>
+        <p:nvSpPr>
+          <p:cNvPr id="3" name="Content Placeholder 2"/>
+          <p:cNvSpPr>
+            <a:spLocks noGrp="1"/>
+          </p:cNvSpPr>
+          <p:nvPr>
+            <p:ph idx="1"/>
+          </p:nvPr>
+        </p:nvSpPr>
+        <p:spPr/>
+        <p:txBody>
+          <a:bodyPr>
+            <a:normAutofit/>
+          </a:bodyPr>
+          <a:lstStyle/>
+          <a:p>
+            <a:r>
+              <a:rPr lang="en-US" sz="2800" dirty="0" smtClean="0"/>
+              <a:t>Optimizing a graphic often requires multiple iterative alterations</a:t>
+            </a:r>
+          </a:p>
+          <a:p>
+            <a:r>
+              <a:rPr lang="en-US" sz="2800" dirty="0" smtClean="0"/>
+              <a:t>Analysis and interpretation often benefits from active filtering, variable selection, and parameterization</a:t>
+            </a:r>
+          </a:p>
+          <a:p>
+            <a:r>
+              <a:rPr lang="en-US" sz="2800" dirty="0" smtClean="0"/>
+              <a:t>Interactive graphics allow end-users, especially non-experts, to more effectively explore data</a:t>
+            </a:r>
+          </a:p>
+          <a:p>
+            <a:r>
+              <a:rPr lang="en-US" sz="2800" dirty="0" smtClean="0"/>
+              <a:t>The R shiny package allows you to quickly and easily create sophisticated web-accessible interactive graphics</a:t>
+            </a:r>
+            <a:endParaRPr lang="en-US" sz="2800" dirty="0"/>
+          </a:p>
+        </p:txBody>
+      </p:sp>
+    </p:spTree>
+    <p:extLst>
+      <p:ext uri="{BB962C8B-B14F-4D97-AF65-F5344CB8AC3E}">
+        <p14:creationId xmlns:p14="http://schemas.microsoft.com/office/powerpoint/2010/main" val="2141840622"/>
+      </p:ext>
+    </p:extLst>
+  </p:cSld>
+  <p:clrMapOvr>
+    <a:masterClrMapping/>
+  </p:clrMapOvr>
+</p:sld>
+</file>
+
+<file path=ppt/slides/slide31.xml><?xml version="1.0" encoding="utf-8"?>
+<p:sld xmlns:a="http://schemas.openxmlformats.org/drawingml/2006/main" xmlns:r="http://schemas.openxmlformats.org/officeDocument/2006/relationships" xmlns:p="http://schemas.openxmlformats.org/presentationml/2006/main">
+  <p:cSld>
+    <p:spTree>
+      <p:nvGrpSpPr>
+        <p:cNvPr id="1" name=""/>
+        <p:cNvGrpSpPr/>
+        <p:nvPr/>
+      </p:nvGrpSpPr>
+      <p:grpSpPr>
+        <a:xfrm>
+          <a:off x="0" y="0"/>
+          <a:ext cx="0" cy="0"/>
+          <a:chOff x="0" y="0"/>
+          <a:chExt cx="0" cy="0"/>
+        </a:xfrm>
+      </p:grpSpPr>
+      <p:sp>
+        <p:nvSpPr>
+          <p:cNvPr id="2" name="Title 1"/>
+          <p:cNvSpPr>
+            <a:spLocks noGrp="1"/>
+          </p:cNvSpPr>
+          <p:nvPr>
+            <p:ph type="title"/>
+          </p:nvPr>
+        </p:nvSpPr>
+        <p:spPr/>
+        <p:txBody>
+          <a:bodyPr/>
+          <a:lstStyle/>
+          <a:p>
+            <a:r>
+              <a:rPr lang="en-US" dirty="0" smtClean="0"/>
+              <a:t>Basic organization of a shiny application</a:t>
+            </a:r>
+            <a:endParaRPr lang="en-US" dirty="0"/>
+          </a:p>
+        </p:txBody>
+      </p:sp>
+      <p:sp>
+        <p:nvSpPr>
+          <p:cNvPr id="5" name="TextBox 4"/>
+          <p:cNvSpPr txBox="1"/>
+          <p:nvPr/>
+        </p:nvSpPr>
+        <p:spPr>
+          <a:xfrm>
+            <a:off x="3945463" y="2379940"/>
+            <a:ext cx="1170362" cy="830997"/>
+          </a:xfrm>
+          <a:prstGeom prst="rect">
+            <a:avLst/>
+          </a:prstGeom>
+          <a:noFill/>
+        </p:spPr>
+        <p:txBody>
+          <a:bodyPr wrap="none" rtlCol="0">
+            <a:spAutoFit/>
+          </a:bodyPr>
+          <a:lstStyle/>
+          <a:p>
+            <a:pPr algn="ctr"/>
+            <a:r>
+              <a:rPr lang="en-US" sz="2400" dirty="0" err="1" smtClean="0"/>
+              <a:t>shinyUI</a:t>
+            </a:r>
+            <a:endParaRPr lang="en-US" sz="2400" dirty="0" smtClean="0"/>
+          </a:p>
+          <a:p>
+            <a:pPr algn="ctr"/>
+            <a:r>
+              <a:rPr lang="en-US" sz="2400" dirty="0" err="1" smtClean="0"/>
+              <a:t>ui.R</a:t>
+            </a:r>
+            <a:endParaRPr lang="en-US" sz="2400" dirty="0"/>
+          </a:p>
+        </p:txBody>
+      </p:sp>
+      <p:sp>
+        <p:nvSpPr>
+          <p:cNvPr id="6" name="TextBox 5"/>
+          <p:cNvSpPr txBox="1"/>
+          <p:nvPr/>
+        </p:nvSpPr>
+        <p:spPr>
+          <a:xfrm>
+            <a:off x="3633276" y="1032941"/>
+            <a:ext cx="1758865" cy="830997"/>
+          </a:xfrm>
+          <a:prstGeom prst="rect">
+            <a:avLst/>
+          </a:prstGeom>
+          <a:noFill/>
+        </p:spPr>
+        <p:txBody>
+          <a:bodyPr wrap="none" rtlCol="0">
+            <a:spAutoFit/>
+          </a:bodyPr>
+          <a:lstStyle/>
+          <a:p>
+            <a:pPr algn="ctr"/>
+            <a:r>
+              <a:rPr lang="en-US" sz="2400" dirty="0" err="1" smtClean="0"/>
+              <a:t>shinyServer</a:t>
+            </a:r>
+            <a:endParaRPr lang="en-US" sz="2400" dirty="0" smtClean="0"/>
+          </a:p>
+          <a:p>
+            <a:pPr algn="ctr"/>
+            <a:r>
+              <a:rPr lang="en-US" sz="2400" dirty="0" err="1" smtClean="0"/>
+              <a:t>server.R</a:t>
+            </a:r>
+            <a:endParaRPr lang="en-US" sz="2400" dirty="0"/>
+          </a:p>
+        </p:txBody>
+      </p:sp>
+      <p:sp>
+        <p:nvSpPr>
+          <p:cNvPr id="9" name="Curved Left Arrow 8"/>
+          <p:cNvSpPr/>
+          <p:nvPr/>
+        </p:nvSpPr>
+        <p:spPr>
+          <a:xfrm>
+            <a:off x="5529772" y="1337735"/>
+            <a:ext cx="853657" cy="1659469"/>
+          </a:xfrm>
+          <a:prstGeom prst="curvedLeftArrow">
+            <a:avLst/>
+          </a:prstGeom>
+        </p:spPr>
+        <p:style>
+          <a:lnRef idx="1">
+            <a:schemeClr val="dk1"/>
+          </a:lnRef>
+          <a:fillRef idx="3">
+            <a:schemeClr val="dk1"/>
+          </a:fillRef>
+          <a:effectRef idx="2">
+            <a:schemeClr val="dk1"/>
+          </a:effectRef>
+          <a:fontRef idx="minor">
+            <a:schemeClr val="lt1"/>
+          </a:fontRef>
+        </p:style>
+        <p:txBody>
+          <a:bodyPr rtlCol="0" anchor="ctr"/>
+          <a:lstStyle/>
+          <a:p>
+            <a:pPr algn="ctr"/>
+            <a:endParaRPr lang="en-US">
+              <a:solidFill>
+                <a:schemeClr val="bg1">
+                  <a:lumMod val="65000"/>
+                </a:schemeClr>
+              </a:solidFill>
+            </a:endParaRPr>
+          </a:p>
+        </p:txBody>
+      </p:sp>
+      <p:pic>
+        <p:nvPicPr>
+          <p:cNvPr id="15" name="Picture 14"/>
+          <p:cNvPicPr>
+            <a:picLocks noChangeAspect="1"/>
+          </p:cNvPicPr>
+          <p:nvPr/>
+        </p:nvPicPr>
+        <p:blipFill>
+          <a:blip r:embed="rId2"/>
+          <a:stretch>
+            <a:fillRect/>
+          </a:stretch>
+        </p:blipFill>
+        <p:spPr>
+          <a:xfrm>
+            <a:off x="643466" y="3282658"/>
+            <a:ext cx="7772400" cy="2737104"/>
+          </a:xfrm>
+          <a:prstGeom prst="rect">
+            <a:avLst/>
+          </a:prstGeom>
+        </p:spPr>
+      </p:pic>
+      <p:sp>
+        <p:nvSpPr>
+          <p:cNvPr id="16" name="Curved Left Arrow 15"/>
+          <p:cNvSpPr/>
+          <p:nvPr/>
+        </p:nvSpPr>
+        <p:spPr>
+          <a:xfrm rot="10800000">
+            <a:off x="2685031" y="1236140"/>
+            <a:ext cx="853657" cy="1659469"/>
+          </a:xfrm>
+          <a:prstGeom prst="curvedLeftArrow">
+            <a:avLst/>
+          </a:prstGeom>
+        </p:spPr>
+        <p:style>
+          <a:lnRef idx="1">
+            <a:schemeClr val="dk1"/>
+          </a:lnRef>
+          <a:fillRef idx="3">
+            <a:schemeClr val="dk1"/>
+          </a:fillRef>
+          <a:effectRef idx="2">
+            <a:schemeClr val="dk1"/>
+          </a:effectRef>
+          <a:fontRef idx="minor">
+            <a:schemeClr val="lt1"/>
+          </a:fontRef>
+        </p:style>
+        <p:txBody>
+          <a:bodyPr rtlCol="0" anchor="ctr"/>
+          <a:lstStyle/>
+          <a:p>
+            <a:pPr algn="ctr"/>
+            <a:endParaRPr lang="en-US">
+              <a:solidFill>
+                <a:schemeClr val="bg1">
+                  <a:lumMod val="65000"/>
+                </a:schemeClr>
+              </a:solidFill>
+            </a:endParaRPr>
+          </a:p>
+        </p:txBody>
+      </p:sp>
+      <p:sp>
+        <p:nvSpPr>
+          <p:cNvPr id="17" name="TextBox 16"/>
+          <p:cNvSpPr txBox="1"/>
+          <p:nvPr/>
+        </p:nvSpPr>
+        <p:spPr>
+          <a:xfrm>
+            <a:off x="1337728" y="1630070"/>
+            <a:ext cx="1117600" cy="954107"/>
+          </a:xfrm>
+          <a:prstGeom prst="rect">
+            <a:avLst/>
+          </a:prstGeom>
+          <a:noFill/>
+        </p:spPr>
+        <p:txBody>
+          <a:bodyPr wrap="square" rtlCol="0">
+            <a:spAutoFit/>
+          </a:bodyPr>
+          <a:lstStyle/>
+          <a:p>
+            <a:pPr algn="ctr"/>
+            <a:r>
+              <a:rPr lang="en-US" sz="2800" dirty="0" smtClean="0"/>
+              <a:t>User input</a:t>
+            </a:r>
+            <a:endParaRPr lang="en-US" sz="2800" dirty="0"/>
+          </a:p>
+        </p:txBody>
+      </p:sp>
+      <p:sp>
+        <p:nvSpPr>
+          <p:cNvPr id="18" name="TextBox 17"/>
+          <p:cNvSpPr txBox="1"/>
+          <p:nvPr/>
+        </p:nvSpPr>
+        <p:spPr>
+          <a:xfrm>
+            <a:off x="6570127" y="1647003"/>
+            <a:ext cx="1524008" cy="954107"/>
+          </a:xfrm>
+          <a:prstGeom prst="rect">
+            <a:avLst/>
+          </a:prstGeom>
+          <a:noFill/>
+        </p:spPr>
+        <p:txBody>
+          <a:bodyPr wrap="square" rtlCol="0">
+            <a:spAutoFit/>
+          </a:bodyPr>
+          <a:lstStyle/>
+          <a:p>
+            <a:pPr algn="ctr"/>
+            <a:r>
+              <a:rPr lang="en-US" sz="2800" dirty="0" smtClean="0"/>
+              <a:t>R output</a:t>
+            </a:r>
+            <a:endParaRPr lang="en-US" sz="2800" dirty="0"/>
+          </a:p>
+        </p:txBody>
+      </p:sp>
+      <p:sp>
+        <p:nvSpPr>
+          <p:cNvPr id="19" name="TextBox 18"/>
+          <p:cNvSpPr txBox="1"/>
+          <p:nvPr/>
+        </p:nvSpPr>
+        <p:spPr>
+          <a:xfrm>
+            <a:off x="1202962" y="6144335"/>
+            <a:ext cx="6806821" cy="523220"/>
+          </a:xfrm>
+          <a:prstGeom prst="rect">
+            <a:avLst/>
+          </a:prstGeom>
+          <a:noFill/>
+        </p:spPr>
+        <p:txBody>
+          <a:bodyPr wrap="none" rtlCol="0">
+            <a:spAutoFit/>
+          </a:bodyPr>
+          <a:lstStyle/>
+          <a:p>
+            <a:r>
+              <a:rPr lang="en-US" sz="2800" dirty="0" smtClean="0"/>
+              <a:t>Interactive User Interface (UI) = website</a:t>
+            </a:r>
+            <a:endParaRPr lang="en-US" sz="2800" dirty="0"/>
+          </a:p>
+        </p:txBody>
+      </p:sp>
+    </p:spTree>
+    <p:extLst>
+      <p:ext uri="{BB962C8B-B14F-4D97-AF65-F5344CB8AC3E}">
+        <p14:creationId xmlns:p14="http://schemas.microsoft.com/office/powerpoint/2010/main" val="2373662838"/>
+      </p:ext>
+    </p:extLst>
+  </p:cSld>
+  <p:clrMapOvr>
+    <a:masterClrMapping/>
+  </p:clrMapOvr>
+</p:sld>
+</file>
+
+<file path=ppt/slides/slide32.xml><?xml version="1.0" encoding="utf-8"?>
+<p:sld xmlns:a="http://schemas.openxmlformats.org/drawingml/2006/main" xmlns:r="http://schemas.openxmlformats.org/officeDocument/2006/relationships" xmlns:p="http://schemas.openxmlformats.org/presentationml/2006/main">
+  <p:cSld>
+    <p:spTree>
+      <p:nvGrpSpPr>
+        <p:cNvPr id="1" name=""/>
+        <p:cNvGrpSpPr/>
+        <p:nvPr/>
+      </p:nvGrpSpPr>
+      <p:grpSpPr>
+        <a:xfrm>
+          <a:off x="0" y="0"/>
+          <a:ext cx="0" cy="0"/>
+          <a:chOff x="0" y="0"/>
+          <a:chExt cx="0" cy="0"/>
+        </a:xfrm>
+      </p:grpSpPr>
+      <p:sp>
+        <p:nvSpPr>
+          <p:cNvPr id="2" name="Title 1"/>
+          <p:cNvSpPr>
+            <a:spLocks noGrp="1"/>
+          </p:cNvSpPr>
+          <p:nvPr>
+            <p:ph type="title"/>
+          </p:nvPr>
+        </p:nvSpPr>
+        <p:spPr/>
+        <p:txBody>
+          <a:bodyPr/>
+          <a:lstStyle/>
+          <a:p>
+            <a:r>
+              <a:rPr lang="en-US" dirty="0" err="1" smtClean="0"/>
+              <a:t>RMarkdown</a:t>
+            </a:r>
+            <a:r>
+              <a:rPr lang="en-US" dirty="0"/>
+              <a:t>?</a:t>
+            </a:r>
+          </a:p>
+        </p:txBody>
+      </p:sp>
+      <p:sp>
+        <p:nvSpPr>
+          <p:cNvPr id="3" name="Content Placeholder 2"/>
+          <p:cNvSpPr>
+            <a:spLocks noGrp="1"/>
+          </p:cNvSpPr>
+          <p:nvPr>
+            <p:ph idx="1"/>
+          </p:nvPr>
+        </p:nvSpPr>
+        <p:spPr/>
+        <p:txBody>
+          <a:bodyPr/>
+          <a:lstStyle/>
+          <a:p>
+            <a:endParaRPr lang="en-US"/>
+          </a:p>
+        </p:txBody>
+      </p:sp>
+    </p:spTree>
+    <p:extLst>
+      <p:ext uri="{BB962C8B-B14F-4D97-AF65-F5344CB8AC3E}">
+        <p14:creationId xmlns:p14="http://schemas.microsoft.com/office/powerpoint/2010/main" val="3846873359"/>
+      </p:ext>
+    </p:extLst>
+  </p:cSld>
+  <p:clrMapOvr>
+    <a:masterClrMapping/>
+  </p:clrMapOvr>
 </p:sld>
 </file>
 
@@ -6702,7 +7632,11 @@
           <a:p>
             <a:r>
               <a:rPr lang="en-US" dirty="0" smtClean="0"/>
-              <a:t>CRAN</a:t>
+              <a:t>CRAN and </a:t>
+            </a:r>
+            <a:r>
+              <a:rPr lang="en-US" dirty="0" err="1" smtClean="0"/>
+              <a:t>BioConductor</a:t>
             </a:r>
             <a:endParaRPr lang="en-US" dirty="0"/>
           </a:p>

</xml_diff>

<commit_message>
final images for ensembl data display section
</commit_message>
<xml_diff>
--- a/lectures/GenViz_Module2_Lecture.pptx
+++ b/lectures/GenViz_Module2_Lecture.pptx
@@ -5,10 +5,10 @@
     <p:sldMasterId id="2147483648" r:id="rId1"/>
   </p:sldMasterIdLst>
   <p:notesMasterIdLst>
-    <p:notesMasterId r:id="rId34"/>
+    <p:notesMasterId r:id="rId35"/>
   </p:notesMasterIdLst>
   <p:handoutMasterIdLst>
-    <p:handoutMasterId r:id="rId35"/>
+    <p:handoutMasterId r:id="rId36"/>
   </p:handoutMasterIdLst>
   <p:sldIdLst>
     <p:sldId id="256" r:id="rId2"/>
@@ -40,9 +40,10 @@
     <p:sldId id="287" r:id="rId28"/>
     <p:sldId id="288" r:id="rId29"/>
     <p:sldId id="289" r:id="rId30"/>
-    <p:sldId id="282" r:id="rId31"/>
-    <p:sldId id="283" r:id="rId32"/>
-    <p:sldId id="285" r:id="rId33"/>
+    <p:sldId id="285" r:id="rId31"/>
+    <p:sldId id="282" r:id="rId32"/>
+    <p:sldId id="283" r:id="rId33"/>
+    <p:sldId id="290" r:id="rId34"/>
   </p:sldIdLst>
   <p:sldSz cx="9144000" cy="6858000" type="screen4x3"/>
   <p:notesSz cx="6858000" cy="9144000"/>
@@ -143,7 +144,7 @@
   </p:defaultTextStyle>
   <p:extLst>
     <p:ext uri="{EFAFB233-063F-42B5-8137-9DF3F51BA10A}">
-      <p15:sldGuideLst xmlns:p15="http://schemas.microsoft.com/office/powerpoint/2012/main" xmlns="">
+      <p15:sldGuideLst xmlns="" xmlns:p15="http://schemas.microsoft.com/office/powerpoint/2012/main">
         <p15:guide id="1" orient="horz" pos="2160">
           <p15:clr>
             <a:srgbClr val="A4A3A4"/>
@@ -243,7 +244,7 @@
             <a:fld id="{03643E35-CD80-874A-A3D7-254E954BB753}" type="datetimeFigureOut">
               <a:rPr lang="en-US" smtClean="0"/>
               <a:pPr/>
-              <a:t>9/8/17</a:t>
+              <a:t>9/10/17</a:t>
             </a:fld>
             <a:endParaRPr lang="en-US"/>
           </a:p>
@@ -410,7 +411,7 @@
             <a:fld id="{5C416C15-7665-174C-99B8-5B237ACA6582}" type="datetimeFigureOut">
               <a:rPr lang="en-US" smtClean="0"/>
               <a:pPr/>
-              <a:t>9/8/17</a:t>
+              <a:t>9/10/17</a:t>
             </a:fld>
             <a:endParaRPr lang="en-US"/>
           </a:p>
@@ -6309,10 +6310,13 @@
           <a:lstStyle/>
           <a:p>
             <a:r>
-              <a:rPr lang="en-US" dirty="0" smtClean="0"/>
-              <a:t>Interactive graphics with R shiny</a:t>
-            </a:r>
-            <a:endParaRPr lang="en-US" dirty="0"/>
+              <a:rPr lang="en-US" dirty="0" err="1" smtClean="0"/>
+              <a:t>RMarkdown</a:t>
+            </a:r>
+            <a:r>
+              <a:rPr lang="en-US" dirty="0"/>
+              <a:t>?</a:t>
+            </a:r>
           </a:p>
         </p:txBody>
       </p:sp>
@@ -6328,41 +6332,17 @@
         </p:nvSpPr>
         <p:spPr/>
         <p:txBody>
-          <a:bodyPr>
-            <a:normAutofit/>
-          </a:bodyPr>
-          <a:lstStyle/>
-          <a:p>
-            <a:r>
-              <a:rPr lang="en-US" sz="2800" dirty="0" smtClean="0"/>
-              <a:t>Optimizing a graphic often requires multiple iterative alterations</a:t>
-            </a:r>
-          </a:p>
-          <a:p>
-            <a:r>
-              <a:rPr lang="en-US" sz="2800" dirty="0" smtClean="0"/>
-              <a:t>Analysis and interpretation often benefits from active filtering, variable selection, and parameterization</a:t>
-            </a:r>
-          </a:p>
-          <a:p>
-            <a:r>
-              <a:rPr lang="en-US" sz="2800" dirty="0" smtClean="0"/>
-              <a:t>Interactive graphics allow end-users, especially non-experts, to more effectively explore data</a:t>
-            </a:r>
-          </a:p>
-          <a:p>
-            <a:r>
-              <a:rPr lang="en-US" sz="2800" dirty="0" smtClean="0"/>
-              <a:t>The R shiny package allows you to quickly and easily create sophisticated web-accessible interactive graphics</a:t>
-            </a:r>
-            <a:endParaRPr lang="en-US" sz="2800" dirty="0"/>
+          <a:bodyPr/>
+          <a:lstStyle/>
+          <a:p>
+            <a:endParaRPr lang="en-US"/>
           </a:p>
         </p:txBody>
       </p:sp>
     </p:spTree>
     <p:extLst>
       <p:ext uri="{BB962C8B-B14F-4D97-AF65-F5344CB8AC3E}">
-        <p14:creationId xmlns:p14="http://schemas.microsoft.com/office/powerpoint/2010/main" val="2141840622"/>
+        <p14:creationId xmlns:p14="http://schemas.microsoft.com/office/powerpoint/2010/main" val="3846873359"/>
       </p:ext>
     </p:extLst>
   </p:cSld>
@@ -6406,7 +6386,7 @@
           <a:p>
             <a:r>
               <a:rPr lang="en-US" dirty="0" smtClean="0"/>
-              <a:t>Basic organization of a shiny application</a:t>
+              <a:t>Interactive graphics with R shiny</a:t>
             </a:r>
             <a:endParaRPr lang="en-US" dirty="0"/>
           </a:p>
@@ -6414,281 +6394,42 @@
       </p:sp>
       <p:sp>
         <p:nvSpPr>
-          <p:cNvPr id="5" name="TextBox 4"/>
-          <p:cNvSpPr txBox="1"/>
-          <p:nvPr/>
-        </p:nvSpPr>
-        <p:spPr>
-          <a:xfrm>
-            <a:off x="3945463" y="2379940"/>
-            <a:ext cx="1170362" cy="830997"/>
-          </a:xfrm>
-          <a:prstGeom prst="rect">
-            <a:avLst/>
-          </a:prstGeom>
-          <a:noFill/>
-        </p:spPr>
-        <p:txBody>
-          <a:bodyPr wrap="none" rtlCol="0">
-            <a:spAutoFit/>
+          <p:cNvPr id="3" name="Content Placeholder 2"/>
+          <p:cNvSpPr>
+            <a:spLocks noGrp="1"/>
+          </p:cNvSpPr>
+          <p:nvPr>
+            <p:ph idx="1"/>
+          </p:nvPr>
+        </p:nvSpPr>
+        <p:spPr/>
+        <p:txBody>
+          <a:bodyPr>
+            <a:normAutofit/>
           </a:bodyPr>
           <a:lstStyle/>
           <a:p>
-            <a:pPr algn="ctr"/>
-            <a:r>
-              <a:rPr lang="en-US" sz="2400" dirty="0" err="1" smtClean="0"/>
-              <a:t>shinyUI</a:t>
-            </a:r>
-            <a:endParaRPr lang="en-US" sz="2400" dirty="0" smtClean="0"/>
-          </a:p>
-          <a:p>
-            <a:pPr algn="ctr"/>
-            <a:r>
-              <a:rPr lang="en-US" sz="2400" dirty="0" err="1" smtClean="0"/>
-              <a:t>ui.R</a:t>
-            </a:r>
-            <a:endParaRPr lang="en-US" sz="2400" dirty="0"/>
-          </a:p>
-        </p:txBody>
-      </p:sp>
-      <p:sp>
-        <p:nvSpPr>
-          <p:cNvPr id="6" name="TextBox 5"/>
-          <p:cNvSpPr txBox="1"/>
-          <p:nvPr/>
-        </p:nvSpPr>
-        <p:spPr>
-          <a:xfrm>
-            <a:off x="3633276" y="1032941"/>
-            <a:ext cx="1758865" cy="830997"/>
-          </a:xfrm>
-          <a:prstGeom prst="rect">
-            <a:avLst/>
-          </a:prstGeom>
-          <a:noFill/>
-        </p:spPr>
-        <p:txBody>
-          <a:bodyPr wrap="none" rtlCol="0">
-            <a:spAutoFit/>
-          </a:bodyPr>
-          <a:lstStyle/>
-          <a:p>
-            <a:pPr algn="ctr"/>
-            <a:r>
-              <a:rPr lang="en-US" sz="2400" dirty="0" err="1" smtClean="0"/>
-              <a:t>shinyServer</a:t>
-            </a:r>
-            <a:endParaRPr lang="en-US" sz="2400" dirty="0" smtClean="0"/>
-          </a:p>
-          <a:p>
-            <a:pPr algn="ctr"/>
-            <a:r>
-              <a:rPr lang="en-US" sz="2400" dirty="0" err="1" smtClean="0"/>
-              <a:t>server.R</a:t>
-            </a:r>
-            <a:endParaRPr lang="en-US" sz="2400" dirty="0"/>
-          </a:p>
-        </p:txBody>
-      </p:sp>
-      <p:sp>
-        <p:nvSpPr>
-          <p:cNvPr id="9" name="Curved Left Arrow 8"/>
-          <p:cNvSpPr/>
-          <p:nvPr/>
-        </p:nvSpPr>
-        <p:spPr>
-          <a:xfrm>
-            <a:off x="5529772" y="1337735"/>
-            <a:ext cx="853657" cy="1659469"/>
-          </a:xfrm>
-          <a:prstGeom prst="curvedLeftArrow">
-            <a:avLst/>
-          </a:prstGeom>
-        </p:spPr>
-        <p:style>
-          <a:lnRef idx="1">
-            <a:schemeClr val="dk1"/>
-          </a:lnRef>
-          <a:fillRef idx="3">
-            <a:schemeClr val="dk1"/>
-          </a:fillRef>
-          <a:effectRef idx="2">
-            <a:schemeClr val="dk1"/>
-          </a:effectRef>
-          <a:fontRef idx="minor">
-            <a:schemeClr val="lt1"/>
-          </a:fontRef>
-        </p:style>
-        <p:txBody>
-          <a:bodyPr rtlCol="0" anchor="ctr"/>
-          <a:lstStyle/>
-          <a:p>
-            <a:pPr algn="ctr"/>
-            <a:endParaRPr lang="en-US">
-              <a:solidFill>
-                <a:schemeClr val="bg1">
-                  <a:lumMod val="65000"/>
-                </a:schemeClr>
-              </a:solidFill>
-            </a:endParaRPr>
-          </a:p>
-        </p:txBody>
-      </p:sp>
-      <p:pic>
-        <p:nvPicPr>
-          <p:cNvPr id="15" name="Picture 14"/>
-          <p:cNvPicPr>
-            <a:picLocks noChangeAspect="1"/>
-          </p:cNvPicPr>
-          <p:nvPr/>
-        </p:nvPicPr>
-        <p:blipFill>
-          <a:blip r:embed="rId2"/>
-          <a:stretch>
-            <a:fillRect/>
-          </a:stretch>
-        </p:blipFill>
-        <p:spPr>
-          <a:xfrm>
-            <a:off x="643466" y="3282658"/>
-            <a:ext cx="7772400" cy="2737104"/>
-          </a:xfrm>
-          <a:prstGeom prst="rect">
-            <a:avLst/>
-          </a:prstGeom>
-        </p:spPr>
-      </p:pic>
-      <p:sp>
-        <p:nvSpPr>
-          <p:cNvPr id="16" name="Curved Left Arrow 15"/>
-          <p:cNvSpPr/>
-          <p:nvPr/>
-        </p:nvSpPr>
-        <p:spPr>
-          <a:xfrm rot="10800000">
-            <a:off x="2685031" y="1236140"/>
-            <a:ext cx="853657" cy="1659469"/>
-          </a:xfrm>
-          <a:prstGeom prst="curvedLeftArrow">
-            <a:avLst/>
-          </a:prstGeom>
-        </p:spPr>
-        <p:style>
-          <a:lnRef idx="1">
-            <a:schemeClr val="dk1"/>
-          </a:lnRef>
-          <a:fillRef idx="3">
-            <a:schemeClr val="dk1"/>
-          </a:fillRef>
-          <a:effectRef idx="2">
-            <a:schemeClr val="dk1"/>
-          </a:effectRef>
-          <a:fontRef idx="minor">
-            <a:schemeClr val="lt1"/>
-          </a:fontRef>
-        </p:style>
-        <p:txBody>
-          <a:bodyPr rtlCol="0" anchor="ctr"/>
-          <a:lstStyle/>
-          <a:p>
-            <a:pPr algn="ctr"/>
-            <a:endParaRPr lang="en-US">
-              <a:solidFill>
-                <a:schemeClr val="bg1">
-                  <a:lumMod val="65000"/>
-                </a:schemeClr>
-              </a:solidFill>
-            </a:endParaRPr>
-          </a:p>
-        </p:txBody>
-      </p:sp>
-      <p:sp>
-        <p:nvSpPr>
-          <p:cNvPr id="17" name="TextBox 16"/>
-          <p:cNvSpPr txBox="1"/>
-          <p:nvPr/>
-        </p:nvSpPr>
-        <p:spPr>
-          <a:xfrm>
-            <a:off x="1337728" y="1630070"/>
-            <a:ext cx="1117600" cy="954107"/>
-          </a:xfrm>
-          <a:prstGeom prst="rect">
-            <a:avLst/>
-          </a:prstGeom>
-          <a:noFill/>
-        </p:spPr>
-        <p:txBody>
-          <a:bodyPr wrap="square" rtlCol="0">
-            <a:spAutoFit/>
-          </a:bodyPr>
-          <a:lstStyle/>
-          <a:p>
-            <a:pPr algn="ctr"/>
             <a:r>
               <a:rPr lang="en-US" sz="2800" dirty="0" smtClean="0"/>
-              <a:t>User input</a:t>
-            </a:r>
-            <a:endParaRPr lang="en-US" sz="2800" dirty="0"/>
-          </a:p>
-        </p:txBody>
-      </p:sp>
-      <p:sp>
-        <p:nvSpPr>
-          <p:cNvPr id="18" name="TextBox 17"/>
-          <p:cNvSpPr txBox="1"/>
-          <p:nvPr/>
-        </p:nvSpPr>
-        <p:spPr>
-          <a:xfrm>
-            <a:off x="6570127" y="1647003"/>
-            <a:ext cx="1524008" cy="954107"/>
-          </a:xfrm>
-          <a:prstGeom prst="rect">
-            <a:avLst/>
-          </a:prstGeom>
-          <a:noFill/>
-        </p:spPr>
-        <p:txBody>
-          <a:bodyPr wrap="square" rtlCol="0">
-            <a:spAutoFit/>
-          </a:bodyPr>
-          <a:lstStyle/>
-          <a:p>
-            <a:pPr algn="ctr"/>
+              <a:t>Optimizing a graphic often requires multiple iterative alterations</a:t>
+            </a:r>
+          </a:p>
+          <a:p>
             <a:r>
               <a:rPr lang="en-US" sz="2800" dirty="0" smtClean="0"/>
-              <a:t>R output</a:t>
-            </a:r>
-            <a:endParaRPr lang="en-US" sz="2800" dirty="0"/>
-          </a:p>
-        </p:txBody>
-      </p:sp>
-      <p:sp>
-        <p:nvSpPr>
-          <p:cNvPr id="19" name="TextBox 18"/>
-          <p:cNvSpPr txBox="1"/>
-          <p:nvPr/>
-        </p:nvSpPr>
-        <p:spPr>
-          <a:xfrm>
-            <a:off x="1202962" y="6144335"/>
-            <a:ext cx="6806821" cy="523220"/>
-          </a:xfrm>
-          <a:prstGeom prst="rect">
-            <a:avLst/>
-          </a:prstGeom>
-          <a:noFill/>
-        </p:spPr>
-        <p:txBody>
-          <a:bodyPr wrap="none" rtlCol="0">
-            <a:spAutoFit/>
-          </a:bodyPr>
-          <a:lstStyle/>
+              <a:t>Analysis and interpretation often benefits from active filtering, variable selection, and parameterization</a:t>
+            </a:r>
+          </a:p>
           <a:p>
             <a:r>
               <a:rPr lang="en-US" sz="2800" dirty="0" smtClean="0"/>
-              <a:t>Interactive User Interface (UI) = website</a:t>
+              <a:t>Interactive graphics allow end-users, especially non-experts, to more effectively explore data</a:t>
+            </a:r>
+          </a:p>
+          <a:p>
+            <a:r>
+              <a:rPr lang="en-US" sz="2800" dirty="0" smtClean="0"/>
+              <a:t>The R shiny package allows you to quickly and easily create sophisticated web-accessible interactive graphics</a:t>
             </a:r>
             <a:endParaRPr lang="en-US" sz="2800" dirty="0"/>
           </a:p>
@@ -6697,7 +6438,7 @@
     </p:spTree>
     <p:extLst>
       <p:ext uri="{BB962C8B-B14F-4D97-AF65-F5344CB8AC3E}">
-        <p14:creationId xmlns:p14="http://schemas.microsoft.com/office/powerpoint/2010/main" val="2373662838"/>
+        <p14:creationId xmlns:p14="http://schemas.microsoft.com/office/powerpoint/2010/main" val="2141840622"/>
       </p:ext>
     </p:extLst>
   </p:cSld>
@@ -6740,39 +6481,422 @@
           <a:lstStyle/>
           <a:p>
             <a:r>
-              <a:rPr lang="en-US" dirty="0" err="1" smtClean="0"/>
-              <a:t>RMarkdown</a:t>
-            </a:r>
-            <a:r>
-              <a:rPr lang="en-US" dirty="0"/>
-              <a:t>?</a:t>
-            </a:r>
-          </a:p>
-        </p:txBody>
-      </p:sp>
-      <p:sp>
-        <p:nvSpPr>
-          <p:cNvPr id="3" name="Content Placeholder 2"/>
-          <p:cNvSpPr>
-            <a:spLocks noGrp="1"/>
-          </p:cNvSpPr>
-          <p:nvPr>
-            <p:ph idx="1"/>
-          </p:nvPr>
-        </p:nvSpPr>
-        <p:spPr/>
-        <p:txBody>
-          <a:bodyPr/>
-          <a:lstStyle/>
-          <a:p>
-            <a:endParaRPr lang="en-US"/>
+              <a:rPr lang="en-US" dirty="0" smtClean="0"/>
+              <a:t>Basic organization of a shiny application</a:t>
+            </a:r>
+            <a:endParaRPr lang="en-US" dirty="0"/>
+          </a:p>
+        </p:txBody>
+      </p:sp>
+      <p:sp>
+        <p:nvSpPr>
+          <p:cNvPr id="5" name="TextBox 4"/>
+          <p:cNvSpPr txBox="1"/>
+          <p:nvPr/>
+        </p:nvSpPr>
+        <p:spPr>
+          <a:xfrm>
+            <a:off x="3945463" y="2379940"/>
+            <a:ext cx="1170362" cy="830997"/>
+          </a:xfrm>
+          <a:prstGeom prst="rect">
+            <a:avLst/>
+          </a:prstGeom>
+          <a:noFill/>
+        </p:spPr>
+        <p:txBody>
+          <a:bodyPr wrap="none" rtlCol="0">
+            <a:spAutoFit/>
+          </a:bodyPr>
+          <a:lstStyle/>
+          <a:p>
+            <a:pPr algn="ctr"/>
+            <a:r>
+              <a:rPr lang="en-US" sz="2400" dirty="0" err="1" smtClean="0"/>
+              <a:t>shinyUI</a:t>
+            </a:r>
+            <a:endParaRPr lang="en-US" sz="2400" dirty="0" smtClean="0"/>
+          </a:p>
+          <a:p>
+            <a:pPr algn="ctr"/>
+            <a:r>
+              <a:rPr lang="en-US" sz="2400" dirty="0" err="1" smtClean="0"/>
+              <a:t>ui.R</a:t>
+            </a:r>
+            <a:endParaRPr lang="en-US" sz="2400" dirty="0"/>
+          </a:p>
+        </p:txBody>
+      </p:sp>
+      <p:sp>
+        <p:nvSpPr>
+          <p:cNvPr id="6" name="TextBox 5"/>
+          <p:cNvSpPr txBox="1"/>
+          <p:nvPr/>
+        </p:nvSpPr>
+        <p:spPr>
+          <a:xfrm>
+            <a:off x="3633276" y="1032941"/>
+            <a:ext cx="1758865" cy="830997"/>
+          </a:xfrm>
+          <a:prstGeom prst="rect">
+            <a:avLst/>
+          </a:prstGeom>
+          <a:noFill/>
+        </p:spPr>
+        <p:txBody>
+          <a:bodyPr wrap="none" rtlCol="0">
+            <a:spAutoFit/>
+          </a:bodyPr>
+          <a:lstStyle/>
+          <a:p>
+            <a:pPr algn="ctr"/>
+            <a:r>
+              <a:rPr lang="en-US" sz="2400" dirty="0" err="1" smtClean="0"/>
+              <a:t>shinyServer</a:t>
+            </a:r>
+            <a:endParaRPr lang="en-US" sz="2400" dirty="0" smtClean="0"/>
+          </a:p>
+          <a:p>
+            <a:pPr algn="ctr"/>
+            <a:r>
+              <a:rPr lang="en-US" sz="2400" dirty="0" err="1" smtClean="0"/>
+              <a:t>server.R</a:t>
+            </a:r>
+            <a:endParaRPr lang="en-US" sz="2400" dirty="0"/>
+          </a:p>
+        </p:txBody>
+      </p:sp>
+      <p:sp>
+        <p:nvSpPr>
+          <p:cNvPr id="9" name="Curved Left Arrow 8"/>
+          <p:cNvSpPr/>
+          <p:nvPr/>
+        </p:nvSpPr>
+        <p:spPr>
+          <a:xfrm>
+            <a:off x="5529772" y="1337735"/>
+            <a:ext cx="853657" cy="1659469"/>
+          </a:xfrm>
+          <a:prstGeom prst="curvedLeftArrow">
+            <a:avLst/>
+          </a:prstGeom>
+        </p:spPr>
+        <p:style>
+          <a:lnRef idx="1">
+            <a:schemeClr val="dk1"/>
+          </a:lnRef>
+          <a:fillRef idx="3">
+            <a:schemeClr val="dk1"/>
+          </a:fillRef>
+          <a:effectRef idx="2">
+            <a:schemeClr val="dk1"/>
+          </a:effectRef>
+          <a:fontRef idx="minor">
+            <a:schemeClr val="lt1"/>
+          </a:fontRef>
+        </p:style>
+        <p:txBody>
+          <a:bodyPr rtlCol="0" anchor="ctr"/>
+          <a:lstStyle/>
+          <a:p>
+            <a:pPr algn="ctr"/>
+            <a:endParaRPr lang="en-US">
+              <a:solidFill>
+                <a:schemeClr val="bg1">
+                  <a:lumMod val="65000"/>
+                </a:schemeClr>
+              </a:solidFill>
+            </a:endParaRPr>
+          </a:p>
+        </p:txBody>
+      </p:sp>
+      <p:pic>
+        <p:nvPicPr>
+          <p:cNvPr id="15" name="Picture 14"/>
+          <p:cNvPicPr>
+            <a:picLocks noChangeAspect="1"/>
+          </p:cNvPicPr>
+          <p:nvPr/>
+        </p:nvPicPr>
+        <p:blipFill>
+          <a:blip r:embed="rId2"/>
+          <a:stretch>
+            <a:fillRect/>
+          </a:stretch>
+        </p:blipFill>
+        <p:spPr>
+          <a:xfrm>
+            <a:off x="643466" y="3282658"/>
+            <a:ext cx="7772400" cy="2737104"/>
+          </a:xfrm>
+          <a:prstGeom prst="rect">
+            <a:avLst/>
+          </a:prstGeom>
+        </p:spPr>
+      </p:pic>
+      <p:sp>
+        <p:nvSpPr>
+          <p:cNvPr id="16" name="Curved Left Arrow 15"/>
+          <p:cNvSpPr/>
+          <p:nvPr/>
+        </p:nvSpPr>
+        <p:spPr>
+          <a:xfrm rot="10800000">
+            <a:off x="2685031" y="1236140"/>
+            <a:ext cx="853657" cy="1659469"/>
+          </a:xfrm>
+          <a:prstGeom prst="curvedLeftArrow">
+            <a:avLst/>
+          </a:prstGeom>
+        </p:spPr>
+        <p:style>
+          <a:lnRef idx="1">
+            <a:schemeClr val="dk1"/>
+          </a:lnRef>
+          <a:fillRef idx="3">
+            <a:schemeClr val="dk1"/>
+          </a:fillRef>
+          <a:effectRef idx="2">
+            <a:schemeClr val="dk1"/>
+          </a:effectRef>
+          <a:fontRef idx="minor">
+            <a:schemeClr val="lt1"/>
+          </a:fontRef>
+        </p:style>
+        <p:txBody>
+          <a:bodyPr rtlCol="0" anchor="ctr"/>
+          <a:lstStyle/>
+          <a:p>
+            <a:pPr algn="ctr"/>
+            <a:endParaRPr lang="en-US">
+              <a:solidFill>
+                <a:schemeClr val="bg1">
+                  <a:lumMod val="65000"/>
+                </a:schemeClr>
+              </a:solidFill>
+            </a:endParaRPr>
+          </a:p>
+        </p:txBody>
+      </p:sp>
+      <p:sp>
+        <p:nvSpPr>
+          <p:cNvPr id="17" name="TextBox 16"/>
+          <p:cNvSpPr txBox="1"/>
+          <p:nvPr/>
+        </p:nvSpPr>
+        <p:spPr>
+          <a:xfrm>
+            <a:off x="1337728" y="1630070"/>
+            <a:ext cx="1117600" cy="954107"/>
+          </a:xfrm>
+          <a:prstGeom prst="rect">
+            <a:avLst/>
+          </a:prstGeom>
+          <a:noFill/>
+        </p:spPr>
+        <p:txBody>
+          <a:bodyPr wrap="square" rtlCol="0">
+            <a:spAutoFit/>
+          </a:bodyPr>
+          <a:lstStyle/>
+          <a:p>
+            <a:pPr algn="ctr"/>
+            <a:r>
+              <a:rPr lang="en-US" sz="2800" dirty="0" smtClean="0"/>
+              <a:t>User input</a:t>
+            </a:r>
+            <a:endParaRPr lang="en-US" sz="2800" dirty="0"/>
+          </a:p>
+        </p:txBody>
+      </p:sp>
+      <p:sp>
+        <p:nvSpPr>
+          <p:cNvPr id="18" name="TextBox 17"/>
+          <p:cNvSpPr txBox="1"/>
+          <p:nvPr/>
+        </p:nvSpPr>
+        <p:spPr>
+          <a:xfrm>
+            <a:off x="6570127" y="1647003"/>
+            <a:ext cx="1524008" cy="954107"/>
+          </a:xfrm>
+          <a:prstGeom prst="rect">
+            <a:avLst/>
+          </a:prstGeom>
+          <a:noFill/>
+        </p:spPr>
+        <p:txBody>
+          <a:bodyPr wrap="square" rtlCol="0">
+            <a:spAutoFit/>
+          </a:bodyPr>
+          <a:lstStyle/>
+          <a:p>
+            <a:pPr algn="ctr"/>
+            <a:r>
+              <a:rPr lang="en-US" sz="2800" dirty="0" smtClean="0"/>
+              <a:t>R output</a:t>
+            </a:r>
+            <a:endParaRPr lang="en-US" sz="2800" dirty="0"/>
+          </a:p>
+        </p:txBody>
+      </p:sp>
+      <p:sp>
+        <p:nvSpPr>
+          <p:cNvPr id="19" name="TextBox 18"/>
+          <p:cNvSpPr txBox="1"/>
+          <p:nvPr/>
+        </p:nvSpPr>
+        <p:spPr>
+          <a:xfrm>
+            <a:off x="1202962" y="6144335"/>
+            <a:ext cx="6806821" cy="523220"/>
+          </a:xfrm>
+          <a:prstGeom prst="rect">
+            <a:avLst/>
+          </a:prstGeom>
+          <a:noFill/>
+        </p:spPr>
+        <p:txBody>
+          <a:bodyPr wrap="none" rtlCol="0">
+            <a:spAutoFit/>
+          </a:bodyPr>
+          <a:lstStyle/>
+          <a:p>
+            <a:r>
+              <a:rPr lang="en-US" sz="2800" dirty="0" smtClean="0"/>
+              <a:t>Interactive User Interface (UI) = website</a:t>
+            </a:r>
+            <a:endParaRPr lang="en-US" sz="2800" dirty="0"/>
           </a:p>
         </p:txBody>
       </p:sp>
     </p:spTree>
     <p:extLst>
       <p:ext uri="{BB962C8B-B14F-4D97-AF65-F5344CB8AC3E}">
-        <p14:creationId xmlns:p14="http://schemas.microsoft.com/office/powerpoint/2010/main" val="3846873359"/>
+        <p14:creationId xmlns:p14="http://schemas.microsoft.com/office/powerpoint/2010/main" val="2373662838"/>
+      </p:ext>
+    </p:extLst>
+  </p:cSld>
+  <p:clrMapOvr>
+    <a:masterClrMapping/>
+  </p:clrMapOvr>
+</p:sld>
+</file>
+
+<file path=ppt/slides/slide33.xml><?xml version="1.0" encoding="utf-8"?>
+<p:sld xmlns:a="http://schemas.openxmlformats.org/drawingml/2006/main" xmlns:r="http://schemas.openxmlformats.org/officeDocument/2006/relationships" xmlns:p="http://schemas.openxmlformats.org/presentationml/2006/main">
+  <p:cSld>
+    <p:spTree>
+      <p:nvGrpSpPr>
+        <p:cNvPr id="1" name=""/>
+        <p:cNvGrpSpPr/>
+        <p:nvPr/>
+      </p:nvGrpSpPr>
+      <p:grpSpPr>
+        <a:xfrm>
+          <a:off x="0" y="0"/>
+          <a:ext cx="0" cy="0"/>
+          <a:chOff x="0" y="0"/>
+          <a:chExt cx="0" cy="0"/>
+        </a:xfrm>
+      </p:grpSpPr>
+      <p:sp>
+        <p:nvSpPr>
+          <p:cNvPr id="2" name="Title 1"/>
+          <p:cNvSpPr>
+            <a:spLocks noGrp="1"/>
+          </p:cNvSpPr>
+          <p:nvPr>
+            <p:ph type="title"/>
+          </p:nvPr>
+        </p:nvSpPr>
+        <p:spPr/>
+        <p:txBody>
+          <a:bodyPr/>
+          <a:lstStyle/>
+          <a:p>
+            <a:r>
+              <a:rPr lang="en-US" dirty="0" smtClean="0"/>
+              <a:t>Demo of shiny gallery </a:t>
+            </a:r>
+            <a:r>
+              <a:rPr lang="en-US" smtClean="0"/>
+              <a:t>genomics example</a:t>
+            </a:r>
+            <a:endParaRPr lang="en-US"/>
+          </a:p>
+        </p:txBody>
+      </p:sp>
+      <p:pic>
+        <p:nvPicPr>
+          <p:cNvPr id="5" name="Content Placeholder 4" descr="shiny_gallery_genomics_example.png"/>
+          <p:cNvPicPr>
+            <a:picLocks noGrp="1" noChangeAspect="1"/>
+          </p:cNvPicPr>
+          <p:nvPr>
+            <p:ph idx="1"/>
+          </p:nvPr>
+        </p:nvPicPr>
+        <p:blipFill>
+          <a:blip r:embed="rId2">
+            <a:extLst>
+              <a:ext uri="{28A0092B-C50C-407E-A947-70E740481C1C}">
+                <a14:useLocalDpi xmlns:a14="http://schemas.microsoft.com/office/drawing/2010/main" val="0"/>
+              </a:ext>
+            </a:extLst>
+          </a:blip>
+          <a:srcRect t="-4749" b="-4749"/>
+          <a:stretch>
+            <a:fillRect/>
+          </a:stretch>
+        </p:blipFill>
+        <p:spPr/>
+      </p:pic>
+      <p:sp>
+        <p:nvSpPr>
+          <p:cNvPr id="4" name="Rectangle 3"/>
+          <p:cNvSpPr/>
+          <p:nvPr/>
+        </p:nvSpPr>
+        <p:spPr>
+          <a:xfrm>
+            <a:off x="1959232" y="6292334"/>
+            <a:ext cx="5009304" cy="461665"/>
+          </a:xfrm>
+          <a:prstGeom prst="rect">
+            <a:avLst/>
+          </a:prstGeom>
+        </p:spPr>
+        <p:txBody>
+          <a:bodyPr wrap="none">
+            <a:spAutoFit/>
+          </a:bodyPr>
+          <a:lstStyle/>
+          <a:p>
+            <a:r>
+              <a:rPr lang="en-US" sz="2400" dirty="0">
+                <a:hlinkClick r:id="rId3"/>
+              </a:rPr>
+              <a:t>https://shiny.rstudio.com/gallery</a:t>
+            </a:r>
+            <a:r>
+              <a:rPr lang="en-US" sz="2400" dirty="0" smtClean="0">
+                <a:hlinkClick r:id="rId3"/>
+              </a:rPr>
+              <a:t>/</a:t>
+            </a:r>
+            <a:r>
+              <a:rPr lang="en-US" sz="2400" dirty="0" smtClean="0"/>
+              <a:t> </a:t>
+            </a:r>
+            <a:endParaRPr lang="en-US" sz="2400" dirty="0"/>
+          </a:p>
+        </p:txBody>
+      </p:sp>
+    </p:spTree>
+    <p:extLst>
+      <p:ext uri="{BB962C8B-B14F-4D97-AF65-F5344CB8AC3E}">
+        <p14:creationId xmlns:p14="http://schemas.microsoft.com/office/powerpoint/2010/main" val="1597040318"/>
       </p:ext>
     </p:extLst>
   </p:cSld>
@@ -6871,7 +6995,6 @@
               <a:rPr lang="en-US" dirty="0"/>
               <a:t>to create interactive graphics</a:t>
             </a:r>
-            <a:endParaRPr lang="en-US" dirty="0"/>
           </a:p>
         </p:txBody>
       </p:sp>
@@ -7935,7 +8058,7 @@
   <a:extraClrSchemeLst/>
   <a:extLst>
     <a:ext uri="{05A4C25C-085E-4340-85A3-A5531E510DB2}">
-      <thm15:themeFamily xmlns:thm15="http://schemas.microsoft.com/office/thememl/2012/main" xmlns="" name="MGI_4-3_ratio_v1a" id="{9A0171FA-20F4-F840-B1C8-29D686AB0540}" vid="{60506783-C923-7847-B1CA-7C860CC95497}"/>
+      <thm15:themeFamily xmlns="" xmlns:thm15="http://schemas.microsoft.com/office/thememl/2012/main" name="MGI_4-3_ratio_v1a" id="{9A0171FA-20F4-F840-B1C8-29D686AB0540}" vid="{60506783-C923-7847-B1CA-7C860CC95497}"/>
     </a:ext>
   </a:extLst>
 </a:theme>

</xml_diff>

<commit_message>
minor edits and added intro to CIViC section
</commit_message>
<xml_diff>
--- a/lectures/GenViz_Module2_Lecture.pptx
+++ b/lectures/GenViz_Module2_Lecture.pptx
@@ -18,32 +18,32 @@
     <p:sldId id="261" r:id="rId6"/>
     <p:sldId id="262" r:id="rId7"/>
     <p:sldId id="263" r:id="rId8"/>
-    <p:sldId id="264" r:id="rId9"/>
-    <p:sldId id="266" r:id="rId10"/>
-    <p:sldId id="267" r:id="rId11"/>
-    <p:sldId id="269" r:id="rId12"/>
-    <p:sldId id="268" r:id="rId13"/>
-    <p:sldId id="270" r:id="rId14"/>
-    <p:sldId id="273" r:id="rId15"/>
-    <p:sldId id="272" r:id="rId16"/>
-    <p:sldId id="271" r:id="rId17"/>
-    <p:sldId id="274" r:id="rId18"/>
-    <p:sldId id="275" r:id="rId19"/>
-    <p:sldId id="276" r:id="rId20"/>
-    <p:sldId id="277" r:id="rId21"/>
-    <p:sldId id="278" r:id="rId22"/>
-    <p:sldId id="279" r:id="rId23"/>
-    <p:sldId id="280" r:id="rId24"/>
-    <p:sldId id="281" r:id="rId25"/>
-    <p:sldId id="284" r:id="rId26"/>
-    <p:sldId id="286" r:id="rId27"/>
-    <p:sldId id="287" r:id="rId28"/>
-    <p:sldId id="288" r:id="rId29"/>
-    <p:sldId id="289" r:id="rId30"/>
-    <p:sldId id="285" r:id="rId31"/>
-    <p:sldId id="282" r:id="rId32"/>
-    <p:sldId id="283" r:id="rId33"/>
-    <p:sldId id="290" r:id="rId34"/>
+    <p:sldId id="266" r:id="rId9"/>
+    <p:sldId id="267" r:id="rId10"/>
+    <p:sldId id="269" r:id="rId11"/>
+    <p:sldId id="268" r:id="rId12"/>
+    <p:sldId id="270" r:id="rId13"/>
+    <p:sldId id="273" r:id="rId14"/>
+    <p:sldId id="272" r:id="rId15"/>
+    <p:sldId id="271" r:id="rId16"/>
+    <p:sldId id="274" r:id="rId17"/>
+    <p:sldId id="275" r:id="rId18"/>
+    <p:sldId id="276" r:id="rId19"/>
+    <p:sldId id="277" r:id="rId20"/>
+    <p:sldId id="278" r:id="rId21"/>
+    <p:sldId id="279" r:id="rId22"/>
+    <p:sldId id="280" r:id="rId23"/>
+    <p:sldId id="281" r:id="rId24"/>
+    <p:sldId id="284" r:id="rId25"/>
+    <p:sldId id="286" r:id="rId26"/>
+    <p:sldId id="287" r:id="rId27"/>
+    <p:sldId id="288" r:id="rId28"/>
+    <p:sldId id="289" r:id="rId29"/>
+    <p:sldId id="285" r:id="rId30"/>
+    <p:sldId id="282" r:id="rId31"/>
+    <p:sldId id="283" r:id="rId32"/>
+    <p:sldId id="290" r:id="rId33"/>
+    <p:sldId id="291" r:id="rId34"/>
   </p:sldIdLst>
   <p:sldSz cx="9144000" cy="6858000" type="screen4x3"/>
   <p:notesSz cx="6858000" cy="9144000"/>
@@ -3194,7 +3194,7 @@
           <a:p>
             <a:r>
               <a:rPr lang="en-US" dirty="0" smtClean="0"/>
-              <a:t>Getting help: ?, vignettes(), and data()</a:t>
+              <a:t>Variables and Data types</a:t>
             </a:r>
             <a:endParaRPr lang="en-US" dirty="0"/>
           </a:p>
@@ -3212,17 +3212,195 @@
         </p:nvSpPr>
         <p:spPr/>
         <p:txBody>
-          <a:bodyPr/>
-          <a:lstStyle/>
-          <a:p>
-            <a:endParaRPr lang="en-US"/>
+          <a:bodyPr>
+            <a:normAutofit fontScale="85000" lnSpcReduction="20000"/>
+          </a:bodyPr>
+          <a:lstStyle/>
+          <a:p>
+            <a:r>
+              <a:rPr lang="en-US" dirty="0" smtClean="0"/>
+              <a:t>As with any </a:t>
+            </a:r>
+            <a:r>
+              <a:rPr lang="en-US" dirty="0"/>
+              <a:t>programming language, you need to use various variables to store various information. </a:t>
+            </a:r>
+            <a:r>
+              <a:rPr lang="en-US" dirty="0" smtClean="0"/>
+              <a:t>When </a:t>
+            </a:r>
+            <a:r>
+              <a:rPr lang="en-US" dirty="0"/>
+              <a:t>you create a variable you reserve some space in </a:t>
+            </a:r>
+            <a:r>
+              <a:rPr lang="en-US" dirty="0" smtClean="0"/>
+              <a:t>memory and keep a record of its location for later retrieval and use.</a:t>
+            </a:r>
+            <a:endParaRPr lang="en-US" dirty="0"/>
+          </a:p>
+          <a:p>
+            <a:r>
+              <a:rPr lang="en-US" dirty="0" smtClean="0"/>
+              <a:t>The information you wish to store might be characters (e.g., text), integers, </a:t>
+            </a:r>
+            <a:r>
+              <a:rPr lang="en-US" dirty="0" err="1" smtClean="0"/>
+              <a:t>boolean</a:t>
+            </a:r>
+            <a:r>
+              <a:rPr lang="en-US" dirty="0" smtClean="0"/>
+              <a:t> (e.g., True/False) </a:t>
+            </a:r>
+            <a:r>
+              <a:rPr lang="en-US" dirty="0"/>
+              <a:t>etc. </a:t>
+            </a:r>
+          </a:p>
+          <a:p>
+            <a:r>
+              <a:rPr lang="en-US" dirty="0"/>
+              <a:t>In contrast to other </a:t>
+            </a:r>
+            <a:r>
+              <a:rPr lang="en-US" dirty="0" smtClean="0"/>
+              <a:t>many programming languages (e.g., C, java, </a:t>
+            </a:r>
+            <a:r>
+              <a:rPr lang="en-US" dirty="0" err="1" smtClean="0"/>
+              <a:t>etc</a:t>
+            </a:r>
+            <a:r>
+              <a:rPr lang="en-US" dirty="0" smtClean="0"/>
+              <a:t>) </a:t>
+            </a:r>
+            <a:r>
+              <a:rPr lang="en-US" dirty="0"/>
+              <a:t>in R</a:t>
+            </a:r>
+            <a:r>
+              <a:rPr lang="en-US" dirty="0" smtClean="0"/>
+              <a:t>, </a:t>
+            </a:r>
+            <a:r>
+              <a:rPr lang="en-US" dirty="0"/>
+              <a:t>variables are not declared as </a:t>
+            </a:r>
+            <a:r>
+              <a:rPr lang="en-US" dirty="0" smtClean="0"/>
+              <a:t>a specific data </a:t>
+            </a:r>
+            <a:r>
+              <a:rPr lang="en-US" dirty="0"/>
+              <a:t>type. </a:t>
+            </a:r>
+            <a:endParaRPr lang="en-US" dirty="0" smtClean="0"/>
+          </a:p>
+          <a:p>
+            <a:pPr lvl="1"/>
+            <a:r>
+              <a:rPr lang="en-US" dirty="0" smtClean="0"/>
+              <a:t>The </a:t>
+            </a:r>
+            <a:r>
+              <a:rPr lang="en-US" dirty="0"/>
+              <a:t>variables are assigned with R-Objects and the data type of the R-object becomes the data type of the variable</a:t>
+            </a:r>
+            <a:r>
+              <a:rPr lang="en-US" dirty="0" smtClean="0"/>
+              <a:t>.</a:t>
+            </a:r>
+          </a:p>
+          <a:p>
+            <a:pPr lvl="1"/>
+            <a:r>
+              <a:rPr lang="en-US" dirty="0" smtClean="0"/>
+              <a:t>Frequently </a:t>
+            </a:r>
+            <a:r>
+              <a:rPr lang="en-US" dirty="0"/>
+              <a:t>used </a:t>
+            </a:r>
+            <a:r>
+              <a:rPr lang="en-US" dirty="0" smtClean="0"/>
+              <a:t>R-Objects include: Vectors, Lists, Matrices, Arrays, Factors, Data </a:t>
+            </a:r>
+            <a:r>
+              <a:rPr lang="en-US" dirty="0"/>
+              <a:t>Frames</a:t>
+            </a:r>
+          </a:p>
+          <a:p>
+            <a:r>
+              <a:rPr lang="en-US" dirty="0"/>
+              <a:t>The simplest </a:t>
+            </a:r>
+            <a:r>
+              <a:rPr lang="en-US" dirty="0" smtClean="0"/>
+              <a:t>R-object </a:t>
+            </a:r>
+            <a:r>
+              <a:rPr lang="en-US" dirty="0"/>
+              <a:t>is the </a:t>
+            </a:r>
+            <a:r>
+              <a:rPr lang="en-US" dirty="0" smtClean="0"/>
+              <a:t>atomic vector</a:t>
+            </a:r>
+          </a:p>
+          <a:p>
+            <a:pPr lvl="1"/>
+            <a:r>
+              <a:rPr lang="en-US" dirty="0" smtClean="0"/>
+              <a:t>There </a:t>
+            </a:r>
+            <a:r>
+              <a:rPr lang="en-US" dirty="0"/>
+              <a:t>are six data types </a:t>
+            </a:r>
+            <a:r>
+              <a:rPr lang="en-US" dirty="0" smtClean="0"/>
+              <a:t>for </a:t>
+            </a:r>
+            <a:r>
+              <a:rPr lang="en-US" dirty="0"/>
+              <a:t>atomic vectors, also termed as six classes of </a:t>
+            </a:r>
+            <a:r>
+              <a:rPr lang="en-US" dirty="0" smtClean="0"/>
+              <a:t>vectors: logical, numerical, integer, complex, character, and raw</a:t>
+            </a:r>
+          </a:p>
+          <a:p>
+            <a:r>
+              <a:rPr lang="en-US" dirty="0" smtClean="0"/>
+              <a:t>The </a:t>
+            </a:r>
+            <a:r>
+              <a:rPr lang="en-US" dirty="0"/>
+              <a:t>other R-Objects are built upon </a:t>
+            </a:r>
+            <a:r>
+              <a:rPr lang="en-US" dirty="0" smtClean="0"/>
+              <a:t>atomic vectors</a:t>
+            </a:r>
+          </a:p>
+          <a:p>
+            <a:r>
+              <a:rPr lang="en-US" dirty="0" smtClean="0"/>
+              <a:t>Lists are also vectors but are not atomic vectors, meaning that they can include multiple data types and can be recursive (contain lists of lists)</a:t>
+            </a:r>
+            <a:endParaRPr lang="en-US" dirty="0"/>
+          </a:p>
+          <a:p>
+            <a:endParaRPr lang="en-US" dirty="0"/>
           </a:p>
         </p:txBody>
       </p:sp>
     </p:spTree>
     <p:extLst>
       <p:ext uri="{BB962C8B-B14F-4D97-AF65-F5344CB8AC3E}">
-        <p14:creationId xmlns:p14="http://schemas.microsoft.com/office/powerpoint/2010/main" val="2358374663"/>
+        <p14:creationId xmlns:p14="http://schemas.microsoft.com/office/powerpoint/2010/main" val="934674714"/>
       </p:ext>
     </p:extLst>
   </p:cSld>
@@ -3266,7 +3444,15 @@
           <a:p>
             <a:r>
               <a:rPr lang="en-US" dirty="0" smtClean="0"/>
-              <a:t>Variables and Data types</a:t>
+              <a:t>&lt;- </a:t>
+            </a:r>
+            <a:r>
+              <a:rPr lang="en-US" dirty="0" err="1" smtClean="0"/>
+              <a:t>vs</a:t>
+            </a:r>
+            <a:r>
+              <a:rPr lang="en-US" dirty="0" smtClean="0"/>
+              <a:t> =</a:t>
             </a:r>
             <a:endParaRPr lang="en-US" dirty="0"/>
           </a:p>
@@ -3284,195 +3470,17 @@
         </p:nvSpPr>
         <p:spPr/>
         <p:txBody>
-          <a:bodyPr>
-            <a:normAutofit fontScale="85000" lnSpcReduction="20000"/>
-          </a:bodyPr>
-          <a:lstStyle/>
-          <a:p>
-            <a:r>
-              <a:rPr lang="en-US" dirty="0" smtClean="0"/>
-              <a:t>As with any </a:t>
-            </a:r>
-            <a:r>
-              <a:rPr lang="en-US" dirty="0"/>
-              <a:t>programming language, you need to use various variables to store various information. </a:t>
-            </a:r>
-            <a:r>
-              <a:rPr lang="en-US" dirty="0" smtClean="0"/>
-              <a:t>When </a:t>
-            </a:r>
-            <a:r>
-              <a:rPr lang="en-US" dirty="0"/>
-              <a:t>you create a variable you reserve some space in </a:t>
-            </a:r>
-            <a:r>
-              <a:rPr lang="en-US" dirty="0" smtClean="0"/>
-              <a:t>memory and keep a record of its location for later retrieval and use.</a:t>
-            </a:r>
-            <a:endParaRPr lang="en-US" dirty="0"/>
-          </a:p>
-          <a:p>
-            <a:r>
-              <a:rPr lang="en-US" dirty="0" smtClean="0"/>
-              <a:t>The information you wish to store might be characters (e.g., text), integers, </a:t>
-            </a:r>
-            <a:r>
-              <a:rPr lang="en-US" dirty="0" err="1" smtClean="0"/>
-              <a:t>boolean</a:t>
-            </a:r>
-            <a:r>
-              <a:rPr lang="en-US" dirty="0" smtClean="0"/>
-              <a:t> (e.g., True/False) </a:t>
-            </a:r>
-            <a:r>
-              <a:rPr lang="en-US" dirty="0"/>
-              <a:t>etc. </a:t>
-            </a:r>
-          </a:p>
-          <a:p>
-            <a:r>
-              <a:rPr lang="en-US" dirty="0"/>
-              <a:t>In contrast to other </a:t>
-            </a:r>
-            <a:r>
-              <a:rPr lang="en-US" dirty="0" smtClean="0"/>
-              <a:t>many programming languages (e.g., C, java, </a:t>
-            </a:r>
-            <a:r>
-              <a:rPr lang="en-US" dirty="0" err="1" smtClean="0"/>
-              <a:t>etc</a:t>
-            </a:r>
-            <a:r>
-              <a:rPr lang="en-US" dirty="0" smtClean="0"/>
-              <a:t>) </a:t>
-            </a:r>
-            <a:r>
-              <a:rPr lang="en-US" dirty="0"/>
-              <a:t>in R</a:t>
-            </a:r>
-            <a:r>
-              <a:rPr lang="en-US" dirty="0" smtClean="0"/>
-              <a:t>, </a:t>
-            </a:r>
-            <a:r>
-              <a:rPr lang="en-US" dirty="0"/>
-              <a:t>variables are not declared as </a:t>
-            </a:r>
-            <a:r>
-              <a:rPr lang="en-US" dirty="0" smtClean="0"/>
-              <a:t>a specific data </a:t>
-            </a:r>
-            <a:r>
-              <a:rPr lang="en-US" dirty="0"/>
-              <a:t>type. </a:t>
-            </a:r>
-            <a:endParaRPr lang="en-US" dirty="0" smtClean="0"/>
-          </a:p>
-          <a:p>
-            <a:pPr lvl="1"/>
-            <a:r>
-              <a:rPr lang="en-US" dirty="0" smtClean="0"/>
-              <a:t>The </a:t>
-            </a:r>
-            <a:r>
-              <a:rPr lang="en-US" dirty="0"/>
-              <a:t>variables are assigned with R-Objects and the data type of the R-object becomes the data type of the variable</a:t>
-            </a:r>
-            <a:r>
-              <a:rPr lang="en-US" dirty="0" smtClean="0"/>
-              <a:t>.</a:t>
-            </a:r>
-          </a:p>
-          <a:p>
-            <a:pPr lvl="1"/>
-            <a:r>
-              <a:rPr lang="en-US" dirty="0" smtClean="0"/>
-              <a:t>Frequently </a:t>
-            </a:r>
-            <a:r>
-              <a:rPr lang="en-US" dirty="0"/>
-              <a:t>used </a:t>
-            </a:r>
-            <a:r>
-              <a:rPr lang="en-US" dirty="0" smtClean="0"/>
-              <a:t>R-Objects include: Vectors, Lists, Matrices, Arrays, Factors, Data </a:t>
-            </a:r>
-            <a:r>
-              <a:rPr lang="en-US" dirty="0"/>
-              <a:t>Frames</a:t>
-            </a:r>
-          </a:p>
-          <a:p>
-            <a:r>
-              <a:rPr lang="en-US" dirty="0"/>
-              <a:t>The simplest </a:t>
-            </a:r>
-            <a:r>
-              <a:rPr lang="en-US" dirty="0" smtClean="0"/>
-              <a:t>R-object </a:t>
-            </a:r>
-            <a:r>
-              <a:rPr lang="en-US" dirty="0"/>
-              <a:t>is the </a:t>
-            </a:r>
-            <a:r>
-              <a:rPr lang="en-US" dirty="0" smtClean="0"/>
-              <a:t>atomic vector</a:t>
-            </a:r>
-          </a:p>
-          <a:p>
-            <a:pPr lvl="1"/>
-            <a:r>
-              <a:rPr lang="en-US" dirty="0" smtClean="0"/>
-              <a:t>There </a:t>
-            </a:r>
-            <a:r>
-              <a:rPr lang="en-US" dirty="0"/>
-              <a:t>are six data types </a:t>
-            </a:r>
-            <a:r>
-              <a:rPr lang="en-US" dirty="0" smtClean="0"/>
-              <a:t>for </a:t>
-            </a:r>
-            <a:r>
-              <a:rPr lang="en-US" dirty="0"/>
-              <a:t>atomic vectors, also termed as six classes of </a:t>
-            </a:r>
-            <a:r>
-              <a:rPr lang="en-US" dirty="0" smtClean="0"/>
-              <a:t>vectors: logical, numerical, integer, complex, character, and raw</a:t>
-            </a:r>
-          </a:p>
-          <a:p>
-            <a:r>
-              <a:rPr lang="en-US" dirty="0" smtClean="0"/>
-              <a:t>The </a:t>
-            </a:r>
-            <a:r>
-              <a:rPr lang="en-US" dirty="0"/>
-              <a:t>other R-Objects are built upon </a:t>
-            </a:r>
-            <a:r>
-              <a:rPr lang="en-US" dirty="0" smtClean="0"/>
-              <a:t>atomic vectors</a:t>
-            </a:r>
-          </a:p>
-          <a:p>
-            <a:r>
-              <a:rPr lang="en-US" dirty="0" smtClean="0"/>
-              <a:t>Lists are also vectors but are not atomic vectors, meaning that they can include multiple data types and can be recursive (contain lists of lists)</a:t>
-            </a:r>
-            <a:endParaRPr lang="en-US" dirty="0"/>
-          </a:p>
-          <a:p>
-            <a:endParaRPr lang="en-US" dirty="0"/>
+          <a:bodyPr/>
+          <a:lstStyle/>
+          <a:p>
+            <a:endParaRPr lang="en-US"/>
           </a:p>
         </p:txBody>
       </p:sp>
     </p:spTree>
     <p:extLst>
       <p:ext uri="{BB962C8B-B14F-4D97-AF65-F5344CB8AC3E}">
-        <p14:creationId xmlns:p14="http://schemas.microsoft.com/office/powerpoint/2010/main" val="934674714"/>
+        <p14:creationId xmlns:p14="http://schemas.microsoft.com/office/powerpoint/2010/main" val="2193166336"/>
       </p:ext>
     </p:extLst>
   </p:cSld>
@@ -3516,86 +3524,6 @@
           <a:p>
             <a:r>
               <a:rPr lang="en-US" dirty="0" smtClean="0"/>
-              <a:t>&lt;- </a:t>
-            </a:r>
-            <a:r>
-              <a:rPr lang="en-US" dirty="0" err="1" smtClean="0"/>
-              <a:t>vs</a:t>
-            </a:r>
-            <a:r>
-              <a:rPr lang="en-US" dirty="0" smtClean="0"/>
-              <a:t> =</a:t>
-            </a:r>
-            <a:endParaRPr lang="en-US" dirty="0"/>
-          </a:p>
-        </p:txBody>
-      </p:sp>
-      <p:sp>
-        <p:nvSpPr>
-          <p:cNvPr id="3" name="Content Placeholder 2"/>
-          <p:cNvSpPr>
-            <a:spLocks noGrp="1"/>
-          </p:cNvSpPr>
-          <p:nvPr>
-            <p:ph idx="1"/>
-          </p:nvPr>
-        </p:nvSpPr>
-        <p:spPr/>
-        <p:txBody>
-          <a:bodyPr/>
-          <a:lstStyle/>
-          <a:p>
-            <a:endParaRPr lang="en-US"/>
-          </a:p>
-        </p:txBody>
-      </p:sp>
-    </p:spTree>
-    <p:extLst>
-      <p:ext uri="{BB962C8B-B14F-4D97-AF65-F5344CB8AC3E}">
-        <p14:creationId xmlns:p14="http://schemas.microsoft.com/office/powerpoint/2010/main" val="2193166336"/>
-      </p:ext>
-    </p:extLst>
-  </p:cSld>
-  <p:clrMapOvr>
-    <a:masterClrMapping/>
-  </p:clrMapOvr>
-</p:sld>
-</file>
-
-<file path=ppt/slides/slide13.xml><?xml version="1.0" encoding="utf-8"?>
-<p:sld xmlns:a="http://schemas.openxmlformats.org/drawingml/2006/main" xmlns:r="http://schemas.openxmlformats.org/officeDocument/2006/relationships" xmlns:p="http://schemas.openxmlformats.org/presentationml/2006/main">
-  <p:cSld>
-    <p:spTree>
-      <p:nvGrpSpPr>
-        <p:cNvPr id="1" name=""/>
-        <p:cNvGrpSpPr/>
-        <p:nvPr/>
-      </p:nvGrpSpPr>
-      <p:grpSpPr>
-        <a:xfrm>
-          <a:off x="0" y="0"/>
-          <a:ext cx="0" cy="0"/>
-          <a:chOff x="0" y="0"/>
-          <a:chExt cx="0" cy="0"/>
-        </a:xfrm>
-      </p:grpSpPr>
-      <p:sp>
-        <p:nvSpPr>
-          <p:cNvPr id="2" name="Title 1"/>
-          <p:cNvSpPr>
-            <a:spLocks noGrp="1"/>
-          </p:cNvSpPr>
-          <p:nvPr>
-            <p:ph type="title"/>
-          </p:nvPr>
-        </p:nvSpPr>
-        <p:spPr/>
-        <p:txBody>
-          <a:bodyPr/>
-          <a:lstStyle/>
-          <a:p>
-            <a:r>
-              <a:rPr lang="en-US" dirty="0" smtClean="0"/>
               <a:t>Data structures (R objects)</a:t>
             </a:r>
             <a:endParaRPr lang="en-US" dirty="0"/>
@@ -3636,7 +3564,7 @@
 </p:sld>
 </file>
 
-<file path=ppt/slides/slide14.xml><?xml version="1.0" encoding="utf-8"?>
+<file path=ppt/slides/slide13.xml><?xml version="1.0" encoding="utf-8"?>
 <p:sld xmlns:a="http://schemas.openxmlformats.org/drawingml/2006/main" xmlns:r="http://schemas.openxmlformats.org/officeDocument/2006/relationships" xmlns:p="http://schemas.openxmlformats.org/presentationml/2006/main">
   <p:cSld>
     <p:spTree>
@@ -4397,6 +4325,78 @@
 </p:sld>
 </file>
 
+<file path=ppt/slides/slide14.xml><?xml version="1.0" encoding="utf-8"?>
+<p:sld xmlns:a="http://schemas.openxmlformats.org/drawingml/2006/main" xmlns:r="http://schemas.openxmlformats.org/officeDocument/2006/relationships" xmlns:p="http://schemas.openxmlformats.org/presentationml/2006/main">
+  <p:cSld>
+    <p:spTree>
+      <p:nvGrpSpPr>
+        <p:cNvPr id="1" name=""/>
+        <p:cNvGrpSpPr/>
+        <p:nvPr/>
+      </p:nvGrpSpPr>
+      <p:grpSpPr>
+        <a:xfrm>
+          <a:off x="0" y="0"/>
+          <a:ext cx="0" cy="0"/>
+          <a:chOff x="0" y="0"/>
+          <a:chExt cx="0" cy="0"/>
+        </a:xfrm>
+      </p:grpSpPr>
+      <p:sp>
+        <p:nvSpPr>
+          <p:cNvPr id="2" name="Title 1"/>
+          <p:cNvSpPr>
+            <a:spLocks noGrp="1"/>
+          </p:cNvSpPr>
+          <p:nvPr>
+            <p:ph type="title"/>
+          </p:nvPr>
+        </p:nvSpPr>
+        <p:spPr/>
+        <p:txBody>
+          <a:bodyPr/>
+          <a:lstStyle/>
+          <a:p>
+            <a:r>
+              <a:rPr lang="en-US" dirty="0" smtClean="0"/>
+              <a:t>Vectors</a:t>
+            </a:r>
+            <a:endParaRPr lang="en-US" dirty="0"/>
+          </a:p>
+        </p:txBody>
+      </p:sp>
+      <p:sp>
+        <p:nvSpPr>
+          <p:cNvPr id="3" name="Content Placeholder 2"/>
+          <p:cNvSpPr>
+            <a:spLocks noGrp="1"/>
+          </p:cNvSpPr>
+          <p:nvPr>
+            <p:ph idx="1"/>
+          </p:nvPr>
+        </p:nvSpPr>
+        <p:spPr/>
+        <p:txBody>
+          <a:bodyPr/>
+          <a:lstStyle/>
+          <a:p>
+            <a:endParaRPr lang="en-US"/>
+          </a:p>
+        </p:txBody>
+      </p:sp>
+    </p:spTree>
+    <p:extLst>
+      <p:ext uri="{BB962C8B-B14F-4D97-AF65-F5344CB8AC3E}">
+        <p14:creationId xmlns:p14="http://schemas.microsoft.com/office/powerpoint/2010/main" val="818804808"/>
+      </p:ext>
+    </p:extLst>
+  </p:cSld>
+  <p:clrMapOvr>
+    <a:masterClrMapping/>
+  </p:clrMapOvr>
+</p:sld>
+</file>
+
 <file path=ppt/slides/slide15.xml><?xml version="1.0" encoding="utf-8"?>
 <p:sld xmlns:a="http://schemas.openxmlformats.org/drawingml/2006/main" xmlns:r="http://schemas.openxmlformats.org/officeDocument/2006/relationships" xmlns:p="http://schemas.openxmlformats.org/presentationml/2006/main">
   <p:cSld>
@@ -4431,7 +4431,7 @@
           <a:p>
             <a:r>
               <a:rPr lang="en-US" dirty="0" smtClean="0"/>
-              <a:t>Vectors</a:t>
+              <a:t>Factors</a:t>
             </a:r>
             <a:endParaRPr lang="en-US" dirty="0"/>
           </a:p>
@@ -4459,7 +4459,7 @@
     </p:spTree>
     <p:extLst>
       <p:ext uri="{BB962C8B-B14F-4D97-AF65-F5344CB8AC3E}">
-        <p14:creationId xmlns:p14="http://schemas.microsoft.com/office/powerpoint/2010/main" val="818804808"/>
+        <p14:creationId xmlns:p14="http://schemas.microsoft.com/office/powerpoint/2010/main" val="3172517770"/>
       </p:ext>
     </p:extLst>
   </p:cSld>
@@ -4503,7 +4503,7 @@
           <a:p>
             <a:r>
               <a:rPr lang="en-US" dirty="0" smtClean="0"/>
-              <a:t>Factors</a:t>
+              <a:t>Lists</a:t>
             </a:r>
             <a:endParaRPr lang="en-US" dirty="0"/>
           </a:p>
@@ -4531,7 +4531,7 @@
     </p:spTree>
     <p:extLst>
       <p:ext uri="{BB962C8B-B14F-4D97-AF65-F5344CB8AC3E}">
-        <p14:creationId xmlns:p14="http://schemas.microsoft.com/office/powerpoint/2010/main" val="3172517770"/>
+        <p14:creationId xmlns:p14="http://schemas.microsoft.com/office/powerpoint/2010/main" val="2876099214"/>
       </p:ext>
     </p:extLst>
   </p:cSld>
@@ -4575,7 +4575,7 @@
           <a:p>
             <a:r>
               <a:rPr lang="en-US" dirty="0" smtClean="0"/>
-              <a:t>Lists</a:t>
+              <a:t>Attributes</a:t>
             </a:r>
             <a:endParaRPr lang="en-US" dirty="0"/>
           </a:p>
@@ -4603,7 +4603,7 @@
     </p:spTree>
     <p:extLst>
       <p:ext uri="{BB962C8B-B14F-4D97-AF65-F5344CB8AC3E}">
-        <p14:creationId xmlns:p14="http://schemas.microsoft.com/office/powerpoint/2010/main" val="2876099214"/>
+        <p14:creationId xmlns:p14="http://schemas.microsoft.com/office/powerpoint/2010/main" val="593406324"/>
       </p:ext>
     </p:extLst>
   </p:cSld>
@@ -4647,7 +4647,7 @@
           <a:p>
             <a:r>
               <a:rPr lang="en-US" dirty="0" smtClean="0"/>
-              <a:t>Attributes</a:t>
+              <a:t>Importing and Exporting Data</a:t>
             </a:r>
             <a:endParaRPr lang="en-US" dirty="0"/>
           </a:p>
@@ -4675,7 +4675,7 @@
     </p:spTree>
     <p:extLst>
       <p:ext uri="{BB962C8B-B14F-4D97-AF65-F5344CB8AC3E}">
-        <p14:creationId xmlns:p14="http://schemas.microsoft.com/office/powerpoint/2010/main" val="593406324"/>
+        <p14:creationId xmlns:p14="http://schemas.microsoft.com/office/powerpoint/2010/main" val="1068452290"/>
       </p:ext>
     </p:extLst>
   </p:cSld>
@@ -4718,8 +4718,8 @@
           <a:lstStyle/>
           <a:p>
             <a:r>
-              <a:rPr lang="en-US" dirty="0" smtClean="0"/>
-              <a:t>Importing and Exporting Data</a:t>
+              <a:rPr lang="en-US" dirty="0" err="1" smtClean="0"/>
+              <a:t>Dataframes</a:t>
             </a:r>
             <a:endParaRPr lang="en-US" dirty="0"/>
           </a:p>
@@ -4747,7 +4747,7 @@
     </p:spTree>
     <p:extLst>
       <p:ext uri="{BB962C8B-B14F-4D97-AF65-F5344CB8AC3E}">
-        <p14:creationId xmlns:p14="http://schemas.microsoft.com/office/powerpoint/2010/main" val="1068452290"/>
+        <p14:creationId xmlns:p14="http://schemas.microsoft.com/office/powerpoint/2010/main" val="2590858446"/>
       </p:ext>
     </p:extLst>
   </p:cSld>
@@ -4904,8 +4904,8 @@
           <a:lstStyle/>
           <a:p>
             <a:r>
-              <a:rPr lang="en-US" dirty="0" err="1" smtClean="0"/>
-              <a:t>Dataframes</a:t>
+              <a:rPr lang="en-US" dirty="0" smtClean="0"/>
+              <a:t>Apply functions</a:t>
             </a:r>
             <a:endParaRPr lang="en-US" dirty="0"/>
           </a:p>
@@ -4933,7 +4933,7 @@
     </p:spTree>
     <p:extLst>
       <p:ext uri="{BB962C8B-B14F-4D97-AF65-F5344CB8AC3E}">
-        <p14:creationId xmlns:p14="http://schemas.microsoft.com/office/powerpoint/2010/main" val="2590858446"/>
+        <p14:creationId xmlns:p14="http://schemas.microsoft.com/office/powerpoint/2010/main" val="3251168646"/>
       </p:ext>
     </p:extLst>
   </p:cSld>
@@ -4977,7 +4977,7 @@
           <a:p>
             <a:r>
               <a:rPr lang="en-US" dirty="0" smtClean="0"/>
-              <a:t>Apply functions</a:t>
+              <a:t>Custom functions</a:t>
             </a:r>
             <a:endParaRPr lang="en-US" dirty="0"/>
           </a:p>
@@ -5005,7 +5005,7 @@
     </p:spTree>
     <p:extLst>
       <p:ext uri="{BB962C8B-B14F-4D97-AF65-F5344CB8AC3E}">
-        <p14:creationId xmlns:p14="http://schemas.microsoft.com/office/powerpoint/2010/main" val="3251168646"/>
+        <p14:creationId xmlns:p14="http://schemas.microsoft.com/office/powerpoint/2010/main" val="3492191647"/>
       </p:ext>
     </p:extLst>
   </p:cSld>
@@ -5049,78 +5049,6 @@
           <a:p>
             <a:r>
               <a:rPr lang="en-US" dirty="0" smtClean="0"/>
-              <a:t>Custom functions</a:t>
-            </a:r>
-            <a:endParaRPr lang="en-US" dirty="0"/>
-          </a:p>
-        </p:txBody>
-      </p:sp>
-      <p:sp>
-        <p:nvSpPr>
-          <p:cNvPr id="3" name="Content Placeholder 2"/>
-          <p:cNvSpPr>
-            <a:spLocks noGrp="1"/>
-          </p:cNvSpPr>
-          <p:nvPr>
-            <p:ph idx="1"/>
-          </p:nvPr>
-        </p:nvSpPr>
-        <p:spPr/>
-        <p:txBody>
-          <a:bodyPr/>
-          <a:lstStyle/>
-          <a:p>
-            <a:endParaRPr lang="en-US"/>
-          </a:p>
-        </p:txBody>
-      </p:sp>
-    </p:spTree>
-    <p:extLst>
-      <p:ext uri="{BB962C8B-B14F-4D97-AF65-F5344CB8AC3E}">
-        <p14:creationId xmlns:p14="http://schemas.microsoft.com/office/powerpoint/2010/main" val="3492191647"/>
-      </p:ext>
-    </p:extLst>
-  </p:cSld>
-  <p:clrMapOvr>
-    <a:masterClrMapping/>
-  </p:clrMapOvr>
-</p:sld>
-</file>
-
-<file path=ppt/slides/slide23.xml><?xml version="1.0" encoding="utf-8"?>
-<p:sld xmlns:a="http://schemas.openxmlformats.org/drawingml/2006/main" xmlns:r="http://schemas.openxmlformats.org/officeDocument/2006/relationships" xmlns:p="http://schemas.openxmlformats.org/presentationml/2006/main">
-  <p:cSld>
-    <p:spTree>
-      <p:nvGrpSpPr>
-        <p:cNvPr id="1" name=""/>
-        <p:cNvGrpSpPr/>
-        <p:nvPr/>
-      </p:nvGrpSpPr>
-      <p:grpSpPr>
-        <a:xfrm>
-          <a:off x="0" y="0"/>
-          <a:ext cx="0" cy="0"/>
-          <a:chOff x="0" y="0"/>
-          <a:chExt cx="0" cy="0"/>
-        </a:xfrm>
-      </p:grpSpPr>
-      <p:sp>
-        <p:nvSpPr>
-          <p:cNvPr id="2" name="Title 1"/>
-          <p:cNvSpPr>
-            <a:spLocks noGrp="1"/>
-          </p:cNvSpPr>
-          <p:nvPr>
-            <p:ph type="title"/>
-          </p:nvPr>
-        </p:nvSpPr>
-        <p:spPr/>
-        <p:txBody>
-          <a:bodyPr/>
-          <a:lstStyle/>
-          <a:p>
-            <a:r>
-              <a:rPr lang="en-US" dirty="0" smtClean="0"/>
               <a:t>Introducing ggplot2</a:t>
             </a:r>
             <a:endParaRPr lang="en-US" dirty="0"/>
@@ -5159,7 +5087,7 @@
 </p:sld>
 </file>
 
-<file path=ppt/slides/slide24.xml><?xml version="1.0" encoding="utf-8"?>
+<file path=ppt/slides/slide23.xml><?xml version="1.0" encoding="utf-8"?>
 <p:sld xmlns:a="http://schemas.openxmlformats.org/drawingml/2006/main" xmlns:r="http://schemas.openxmlformats.org/officeDocument/2006/relationships" xmlns:p="http://schemas.openxmlformats.org/presentationml/2006/main">
   <p:cSld>
     <p:spTree>
@@ -5244,6 +5172,117 @@
 </p:sld>
 </file>
 
+<file path=ppt/slides/slide24.xml><?xml version="1.0" encoding="utf-8"?>
+<p:sld xmlns:a="http://schemas.openxmlformats.org/drawingml/2006/main" xmlns:r="http://schemas.openxmlformats.org/officeDocument/2006/relationships" xmlns:p="http://schemas.openxmlformats.org/presentationml/2006/main">
+  <p:cSld>
+    <p:spTree>
+      <p:nvGrpSpPr>
+        <p:cNvPr id="1" name=""/>
+        <p:cNvGrpSpPr/>
+        <p:nvPr/>
+      </p:nvGrpSpPr>
+      <p:grpSpPr>
+        <a:xfrm>
+          <a:off x="0" y="0"/>
+          <a:ext cx="0" cy="0"/>
+          <a:chOff x="0" y="0"/>
+          <a:chExt cx="0" cy="0"/>
+        </a:xfrm>
+      </p:grpSpPr>
+      <p:sp>
+        <p:nvSpPr>
+          <p:cNvPr id="2" name="Title 1"/>
+          <p:cNvSpPr>
+            <a:spLocks noGrp="1"/>
+          </p:cNvSpPr>
+          <p:nvPr>
+            <p:ph type="title"/>
+          </p:nvPr>
+        </p:nvSpPr>
+        <p:spPr/>
+        <p:txBody>
+          <a:bodyPr/>
+          <a:lstStyle/>
+          <a:p>
+            <a:r>
+              <a:rPr lang="en-US" dirty="0" smtClean="0"/>
+              <a:t>Graphics options in R</a:t>
+            </a:r>
+            <a:endParaRPr lang="en-US" dirty="0"/>
+          </a:p>
+        </p:txBody>
+      </p:sp>
+      <p:sp>
+        <p:nvSpPr>
+          <p:cNvPr id="3" name="Content Placeholder 2"/>
+          <p:cNvSpPr>
+            <a:spLocks noGrp="1"/>
+          </p:cNvSpPr>
+          <p:nvPr>
+            <p:ph idx="1"/>
+          </p:nvPr>
+        </p:nvSpPr>
+        <p:spPr/>
+        <p:txBody>
+          <a:bodyPr/>
+          <a:lstStyle/>
+          <a:p>
+            <a:r>
+              <a:rPr lang="en-US" dirty="0" smtClean="0"/>
+              <a:t>At least 3 primary graphics options in R</a:t>
+            </a:r>
+          </a:p>
+          <a:p>
+            <a:pPr lvl="1"/>
+            <a:r>
+              <a:rPr lang="en-US" dirty="0" smtClean="0"/>
+              <a:t>base R graphics</a:t>
+            </a:r>
+          </a:p>
+          <a:p>
+            <a:pPr lvl="2"/>
+            <a:r>
+              <a:rPr lang="en-US" dirty="0" smtClean="0"/>
+              <a:t>plot(), par(), </a:t>
+            </a:r>
+            <a:r>
+              <a:rPr lang="en-US" dirty="0" err="1" smtClean="0"/>
+              <a:t>etc</a:t>
+            </a:r>
+            <a:endParaRPr lang="en-US" dirty="0" smtClean="0"/>
+          </a:p>
+          <a:p>
+            <a:pPr lvl="1"/>
+            <a:r>
+              <a:rPr lang="en-US" dirty="0" smtClean="0"/>
+              <a:t>lattice</a:t>
+            </a:r>
+          </a:p>
+          <a:p>
+            <a:pPr lvl="1"/>
+            <a:r>
+              <a:rPr lang="en-US" dirty="0" smtClean="0"/>
+              <a:t>ggplot2</a:t>
+            </a:r>
+          </a:p>
+          <a:p>
+            <a:endParaRPr lang="en-US" dirty="0" smtClean="0"/>
+          </a:p>
+        </p:txBody>
+      </p:sp>
+    </p:spTree>
+    <p:extLst>
+      <p:ext uri="{BB962C8B-B14F-4D97-AF65-F5344CB8AC3E}">
+        <p14:creationId xmlns:p14="http://schemas.microsoft.com/office/powerpoint/2010/main" val="1751816862"/>
+      </p:ext>
+    </p:extLst>
+  </p:cSld>
+  <p:clrMapOvr>
+    <a:masterClrMapping/>
+  </p:clrMapOvr>
+</p:sld>
+</file>
+
 <file path=ppt/slides/slide25.xml><?xml version="1.0" encoding="utf-8"?>
 <p:sld xmlns:a="http://schemas.openxmlformats.org/drawingml/2006/main" xmlns:r="http://schemas.openxmlformats.org/officeDocument/2006/relationships" xmlns:p="http://schemas.openxmlformats.org/presentationml/2006/main">
   <p:cSld>
@@ -5278,117 +5317,6 @@
           <a:p>
             <a:r>
               <a:rPr lang="en-US" dirty="0" smtClean="0"/>
-              <a:t>Graphics options in R</a:t>
-            </a:r>
-            <a:endParaRPr lang="en-US" dirty="0"/>
-          </a:p>
-        </p:txBody>
-      </p:sp>
-      <p:sp>
-        <p:nvSpPr>
-          <p:cNvPr id="3" name="Content Placeholder 2"/>
-          <p:cNvSpPr>
-            <a:spLocks noGrp="1"/>
-          </p:cNvSpPr>
-          <p:nvPr>
-            <p:ph idx="1"/>
-          </p:nvPr>
-        </p:nvSpPr>
-        <p:spPr/>
-        <p:txBody>
-          <a:bodyPr/>
-          <a:lstStyle/>
-          <a:p>
-            <a:r>
-              <a:rPr lang="en-US" dirty="0" smtClean="0"/>
-              <a:t>At least 3 primary graphics options in R</a:t>
-            </a:r>
-          </a:p>
-          <a:p>
-            <a:pPr lvl="1"/>
-            <a:r>
-              <a:rPr lang="en-US" dirty="0" smtClean="0"/>
-              <a:t>base R graphics</a:t>
-            </a:r>
-          </a:p>
-          <a:p>
-            <a:pPr lvl="2"/>
-            <a:r>
-              <a:rPr lang="en-US" dirty="0" smtClean="0"/>
-              <a:t>plot(), par(), </a:t>
-            </a:r>
-            <a:r>
-              <a:rPr lang="en-US" dirty="0" err="1" smtClean="0"/>
-              <a:t>etc</a:t>
-            </a:r>
-            <a:endParaRPr lang="en-US" dirty="0" smtClean="0"/>
-          </a:p>
-          <a:p>
-            <a:pPr lvl="1"/>
-            <a:r>
-              <a:rPr lang="en-US" dirty="0" smtClean="0"/>
-              <a:t>lattice</a:t>
-            </a:r>
-          </a:p>
-          <a:p>
-            <a:pPr lvl="1"/>
-            <a:r>
-              <a:rPr lang="en-US" dirty="0" smtClean="0"/>
-              <a:t>ggplot2</a:t>
-            </a:r>
-          </a:p>
-          <a:p>
-            <a:endParaRPr lang="en-US" dirty="0" smtClean="0"/>
-          </a:p>
-        </p:txBody>
-      </p:sp>
-    </p:spTree>
-    <p:extLst>
-      <p:ext uri="{BB962C8B-B14F-4D97-AF65-F5344CB8AC3E}">
-        <p14:creationId xmlns:p14="http://schemas.microsoft.com/office/powerpoint/2010/main" val="1751816862"/>
-      </p:ext>
-    </p:extLst>
-  </p:cSld>
-  <p:clrMapOvr>
-    <a:masterClrMapping/>
-  </p:clrMapOvr>
-</p:sld>
-</file>
-
-<file path=ppt/slides/slide26.xml><?xml version="1.0" encoding="utf-8"?>
-<p:sld xmlns:a="http://schemas.openxmlformats.org/drawingml/2006/main" xmlns:r="http://schemas.openxmlformats.org/officeDocument/2006/relationships" xmlns:p="http://schemas.openxmlformats.org/presentationml/2006/main">
-  <p:cSld>
-    <p:spTree>
-      <p:nvGrpSpPr>
-        <p:cNvPr id="1" name=""/>
-        <p:cNvGrpSpPr/>
-        <p:nvPr/>
-      </p:nvGrpSpPr>
-      <p:grpSpPr>
-        <a:xfrm>
-          <a:off x="0" y="0"/>
-          <a:ext cx="0" cy="0"/>
-          <a:chOff x="0" y="0"/>
-          <a:chExt cx="0" cy="0"/>
-        </a:xfrm>
-      </p:grpSpPr>
-      <p:sp>
-        <p:nvSpPr>
-          <p:cNvPr id="2" name="Title 1"/>
-          <p:cNvSpPr>
-            <a:spLocks noGrp="1"/>
-          </p:cNvSpPr>
-          <p:nvPr>
-            <p:ph type="title"/>
-          </p:nvPr>
-        </p:nvSpPr>
-        <p:spPr/>
-        <p:txBody>
-          <a:bodyPr/>
-          <a:lstStyle/>
-          <a:p>
-            <a:r>
-              <a:rPr lang="en-US" dirty="0" smtClean="0"/>
               <a:t>Why use ggplot2?</a:t>
             </a:r>
             <a:endParaRPr lang="en-US" dirty="0"/>
@@ -5506,7 +5434,7 @@
 </p:sld>
 </file>
 
-<file path=ppt/slides/slide27.xml><?xml version="1.0" encoding="utf-8"?>
+<file path=ppt/slides/slide26.xml><?xml version="1.0" encoding="utf-8"?>
 <p:sld xmlns:a="http://schemas.openxmlformats.org/drawingml/2006/main" xmlns:r="http://schemas.openxmlformats.org/officeDocument/2006/relationships" xmlns:p="http://schemas.openxmlformats.org/presentationml/2006/main">
   <p:cSld>
     <p:spTree>
@@ -5959,6 +5887,78 @@
 </p:sld>
 </file>
 
+<file path=ppt/slides/slide27.xml><?xml version="1.0" encoding="utf-8"?>
+<p:sld xmlns:a="http://schemas.openxmlformats.org/drawingml/2006/main" xmlns:r="http://schemas.openxmlformats.org/officeDocument/2006/relationships" xmlns:p="http://schemas.openxmlformats.org/presentationml/2006/main">
+  <p:cSld>
+    <p:spTree>
+      <p:nvGrpSpPr>
+        <p:cNvPr id="1" name=""/>
+        <p:cNvGrpSpPr/>
+        <p:nvPr/>
+      </p:nvGrpSpPr>
+      <p:grpSpPr>
+        <a:xfrm>
+          <a:off x="0" y="0"/>
+          <a:ext cx="0" cy="0"/>
+          <a:chOff x="0" y="0"/>
+          <a:chExt cx="0" cy="0"/>
+        </a:xfrm>
+      </p:grpSpPr>
+      <p:sp>
+        <p:nvSpPr>
+          <p:cNvPr id="2" name="Title 1"/>
+          <p:cNvSpPr>
+            <a:spLocks noGrp="1"/>
+          </p:cNvSpPr>
+          <p:nvPr>
+            <p:ph type="title"/>
+          </p:nvPr>
+        </p:nvSpPr>
+        <p:spPr/>
+        <p:txBody>
+          <a:bodyPr/>
+          <a:lstStyle/>
+          <a:p>
+            <a:r>
+              <a:rPr lang="en-US" dirty="0" smtClean="0"/>
+              <a:t>Faceting</a:t>
+            </a:r>
+            <a:endParaRPr lang="en-US" dirty="0"/>
+          </a:p>
+        </p:txBody>
+      </p:sp>
+      <p:sp>
+        <p:nvSpPr>
+          <p:cNvPr id="3" name="Content Placeholder 2"/>
+          <p:cNvSpPr>
+            <a:spLocks noGrp="1"/>
+          </p:cNvSpPr>
+          <p:nvPr>
+            <p:ph idx="1"/>
+          </p:nvPr>
+        </p:nvSpPr>
+        <p:spPr/>
+        <p:txBody>
+          <a:bodyPr/>
+          <a:lstStyle/>
+          <a:p>
+            <a:endParaRPr lang="en-US"/>
+          </a:p>
+        </p:txBody>
+      </p:sp>
+    </p:spTree>
+    <p:extLst>
+      <p:ext uri="{BB962C8B-B14F-4D97-AF65-F5344CB8AC3E}">
+        <p14:creationId xmlns:p14="http://schemas.microsoft.com/office/powerpoint/2010/main" val="2544762656"/>
+      </p:ext>
+    </p:extLst>
+  </p:cSld>
+  <p:clrMapOvr>
+    <a:masterClrMapping/>
+  </p:clrMapOvr>
+</p:sld>
+</file>
+
 <file path=ppt/slides/slide28.xml><?xml version="1.0" encoding="utf-8"?>
 <p:sld xmlns:a="http://schemas.openxmlformats.org/drawingml/2006/main" xmlns:r="http://schemas.openxmlformats.org/officeDocument/2006/relationships" xmlns:p="http://schemas.openxmlformats.org/presentationml/2006/main">
   <p:cSld>
@@ -5993,7 +5993,7 @@
           <a:p>
             <a:r>
               <a:rPr lang="en-US" dirty="0" smtClean="0"/>
-              <a:t>Faceting</a:t>
+              <a:t>Themes</a:t>
             </a:r>
             <a:endParaRPr lang="en-US" dirty="0"/>
           </a:p>
@@ -6021,7 +6021,7 @@
     </p:spTree>
     <p:extLst>
       <p:ext uri="{BB962C8B-B14F-4D97-AF65-F5344CB8AC3E}">
-        <p14:creationId xmlns:p14="http://schemas.microsoft.com/office/powerpoint/2010/main" val="2544762656"/>
+        <p14:creationId xmlns:p14="http://schemas.microsoft.com/office/powerpoint/2010/main" val="3148104315"/>
       </p:ext>
     </p:extLst>
   </p:cSld>
@@ -6064,10 +6064,13 @@
           <a:lstStyle/>
           <a:p>
             <a:r>
-              <a:rPr lang="en-US" dirty="0" smtClean="0"/>
-              <a:t>Themes</a:t>
-            </a:r>
-            <a:endParaRPr lang="en-US" dirty="0"/>
+              <a:rPr lang="en-US" dirty="0" err="1" smtClean="0"/>
+              <a:t>RMarkdown</a:t>
+            </a:r>
+            <a:r>
+              <a:rPr lang="en-US" dirty="0"/>
+              <a:t>?</a:t>
+            </a:r>
           </a:p>
         </p:txBody>
       </p:sp>
@@ -6093,7 +6096,7 @@
     </p:spTree>
     <p:extLst>
       <p:ext uri="{BB962C8B-B14F-4D97-AF65-F5344CB8AC3E}">
-        <p14:creationId xmlns:p14="http://schemas.microsoft.com/office/powerpoint/2010/main" val="3148104315"/>
+        <p14:creationId xmlns:p14="http://schemas.microsoft.com/office/powerpoint/2010/main" val="3846873359"/>
       </p:ext>
     </p:extLst>
   </p:cSld>
@@ -6310,13 +6313,10 @@
           <a:lstStyle/>
           <a:p>
             <a:r>
-              <a:rPr lang="en-US" dirty="0" err="1" smtClean="0"/>
-              <a:t>RMarkdown</a:t>
-            </a:r>
-            <a:r>
-              <a:rPr lang="en-US" dirty="0"/>
-              <a:t>?</a:t>
-            </a:r>
+              <a:rPr lang="en-US" dirty="0" smtClean="0"/>
+              <a:t>Interactive graphics with R shiny</a:t>
+            </a:r>
+            <a:endParaRPr lang="en-US" dirty="0"/>
           </a:p>
         </p:txBody>
       </p:sp>
@@ -6332,17 +6332,41 @@
         </p:nvSpPr>
         <p:spPr/>
         <p:txBody>
-          <a:bodyPr/>
-          <a:lstStyle/>
-          <a:p>
-            <a:endParaRPr lang="en-US"/>
+          <a:bodyPr>
+            <a:normAutofit/>
+          </a:bodyPr>
+          <a:lstStyle/>
+          <a:p>
+            <a:r>
+              <a:rPr lang="en-US" sz="2800" dirty="0" smtClean="0"/>
+              <a:t>Optimizing a graphic often requires multiple iterative alterations</a:t>
+            </a:r>
+          </a:p>
+          <a:p>
+            <a:r>
+              <a:rPr lang="en-US" sz="2800" dirty="0" smtClean="0"/>
+              <a:t>Analysis and interpretation often benefits from active filtering, variable selection, and parameterization</a:t>
+            </a:r>
+          </a:p>
+          <a:p>
+            <a:r>
+              <a:rPr lang="en-US" sz="2800" dirty="0" smtClean="0"/>
+              <a:t>Interactive graphics allow end-users, especially non-experts, to more effectively explore data</a:t>
+            </a:r>
+          </a:p>
+          <a:p>
+            <a:r>
+              <a:rPr lang="en-US" sz="2800" dirty="0" smtClean="0"/>
+              <a:t>The R shiny package allows you to quickly and easily create sophisticated web-accessible interactive graphics</a:t>
+            </a:r>
+            <a:endParaRPr lang="en-US" sz="2800" dirty="0"/>
           </a:p>
         </p:txBody>
       </p:sp>
     </p:spTree>
     <p:extLst>
       <p:ext uri="{BB962C8B-B14F-4D97-AF65-F5344CB8AC3E}">
-        <p14:creationId xmlns:p14="http://schemas.microsoft.com/office/powerpoint/2010/main" val="3846873359"/>
+        <p14:creationId xmlns:p14="http://schemas.microsoft.com/office/powerpoint/2010/main" val="2141840622"/>
       </p:ext>
     </p:extLst>
   </p:cSld>
@@ -6386,7 +6410,7 @@
           <a:p>
             <a:r>
               <a:rPr lang="en-US" dirty="0" smtClean="0"/>
-              <a:t>Interactive graphics with R shiny</a:t>
+              <a:t>Basic organization of a shiny application</a:t>
             </a:r>
             <a:endParaRPr lang="en-US" dirty="0"/>
           </a:p>
@@ -6394,42 +6418,281 @@
       </p:sp>
       <p:sp>
         <p:nvSpPr>
-          <p:cNvPr id="3" name="Content Placeholder 2"/>
-          <p:cNvSpPr>
-            <a:spLocks noGrp="1"/>
-          </p:cNvSpPr>
-          <p:nvPr>
-            <p:ph idx="1"/>
-          </p:nvPr>
-        </p:nvSpPr>
-        <p:spPr/>
-        <p:txBody>
-          <a:bodyPr>
-            <a:normAutofit/>
+          <p:cNvPr id="5" name="TextBox 4"/>
+          <p:cNvSpPr txBox="1"/>
+          <p:nvPr/>
+        </p:nvSpPr>
+        <p:spPr>
+          <a:xfrm>
+            <a:off x="3945463" y="2379940"/>
+            <a:ext cx="1170362" cy="830997"/>
+          </a:xfrm>
+          <a:prstGeom prst="rect">
+            <a:avLst/>
+          </a:prstGeom>
+          <a:noFill/>
+        </p:spPr>
+        <p:txBody>
+          <a:bodyPr wrap="none" rtlCol="0">
+            <a:spAutoFit/>
           </a:bodyPr>
           <a:lstStyle/>
           <a:p>
+            <a:pPr algn="ctr"/>
+            <a:r>
+              <a:rPr lang="en-US" sz="2400" dirty="0" err="1" smtClean="0"/>
+              <a:t>shinyUI</a:t>
+            </a:r>
+            <a:endParaRPr lang="en-US" sz="2400" dirty="0" smtClean="0"/>
+          </a:p>
+          <a:p>
+            <a:pPr algn="ctr"/>
+            <a:r>
+              <a:rPr lang="en-US" sz="2400" dirty="0" err="1" smtClean="0"/>
+              <a:t>ui.R</a:t>
+            </a:r>
+            <a:endParaRPr lang="en-US" sz="2400" dirty="0"/>
+          </a:p>
+        </p:txBody>
+      </p:sp>
+      <p:sp>
+        <p:nvSpPr>
+          <p:cNvPr id="6" name="TextBox 5"/>
+          <p:cNvSpPr txBox="1"/>
+          <p:nvPr/>
+        </p:nvSpPr>
+        <p:spPr>
+          <a:xfrm>
+            <a:off x="3633276" y="1032941"/>
+            <a:ext cx="1758865" cy="830997"/>
+          </a:xfrm>
+          <a:prstGeom prst="rect">
+            <a:avLst/>
+          </a:prstGeom>
+          <a:noFill/>
+        </p:spPr>
+        <p:txBody>
+          <a:bodyPr wrap="none" rtlCol="0">
+            <a:spAutoFit/>
+          </a:bodyPr>
+          <a:lstStyle/>
+          <a:p>
+            <a:pPr algn="ctr"/>
+            <a:r>
+              <a:rPr lang="en-US" sz="2400" dirty="0" err="1" smtClean="0"/>
+              <a:t>shinyServer</a:t>
+            </a:r>
+            <a:endParaRPr lang="en-US" sz="2400" dirty="0" smtClean="0"/>
+          </a:p>
+          <a:p>
+            <a:pPr algn="ctr"/>
+            <a:r>
+              <a:rPr lang="en-US" sz="2400" dirty="0" err="1" smtClean="0"/>
+              <a:t>server.R</a:t>
+            </a:r>
+            <a:endParaRPr lang="en-US" sz="2400" dirty="0"/>
+          </a:p>
+        </p:txBody>
+      </p:sp>
+      <p:sp>
+        <p:nvSpPr>
+          <p:cNvPr id="9" name="Curved Left Arrow 8"/>
+          <p:cNvSpPr/>
+          <p:nvPr/>
+        </p:nvSpPr>
+        <p:spPr>
+          <a:xfrm>
+            <a:off x="5529772" y="1337735"/>
+            <a:ext cx="853657" cy="1659469"/>
+          </a:xfrm>
+          <a:prstGeom prst="curvedLeftArrow">
+            <a:avLst/>
+          </a:prstGeom>
+        </p:spPr>
+        <p:style>
+          <a:lnRef idx="1">
+            <a:schemeClr val="dk1"/>
+          </a:lnRef>
+          <a:fillRef idx="3">
+            <a:schemeClr val="dk1"/>
+          </a:fillRef>
+          <a:effectRef idx="2">
+            <a:schemeClr val="dk1"/>
+          </a:effectRef>
+          <a:fontRef idx="minor">
+            <a:schemeClr val="lt1"/>
+          </a:fontRef>
+        </p:style>
+        <p:txBody>
+          <a:bodyPr rtlCol="0" anchor="ctr"/>
+          <a:lstStyle/>
+          <a:p>
+            <a:pPr algn="ctr"/>
+            <a:endParaRPr lang="en-US">
+              <a:solidFill>
+                <a:schemeClr val="bg1">
+                  <a:lumMod val="65000"/>
+                </a:schemeClr>
+              </a:solidFill>
+            </a:endParaRPr>
+          </a:p>
+        </p:txBody>
+      </p:sp>
+      <p:pic>
+        <p:nvPicPr>
+          <p:cNvPr id="15" name="Picture 14"/>
+          <p:cNvPicPr>
+            <a:picLocks noChangeAspect="1"/>
+          </p:cNvPicPr>
+          <p:nvPr/>
+        </p:nvPicPr>
+        <p:blipFill>
+          <a:blip r:embed="rId2"/>
+          <a:stretch>
+            <a:fillRect/>
+          </a:stretch>
+        </p:blipFill>
+        <p:spPr>
+          <a:xfrm>
+            <a:off x="643466" y="3282658"/>
+            <a:ext cx="7772400" cy="2737104"/>
+          </a:xfrm>
+          <a:prstGeom prst="rect">
+            <a:avLst/>
+          </a:prstGeom>
+        </p:spPr>
+      </p:pic>
+      <p:sp>
+        <p:nvSpPr>
+          <p:cNvPr id="16" name="Curved Left Arrow 15"/>
+          <p:cNvSpPr/>
+          <p:nvPr/>
+        </p:nvSpPr>
+        <p:spPr>
+          <a:xfrm rot="10800000">
+            <a:off x="2685031" y="1236140"/>
+            <a:ext cx="853657" cy="1659469"/>
+          </a:xfrm>
+          <a:prstGeom prst="curvedLeftArrow">
+            <a:avLst/>
+          </a:prstGeom>
+        </p:spPr>
+        <p:style>
+          <a:lnRef idx="1">
+            <a:schemeClr val="dk1"/>
+          </a:lnRef>
+          <a:fillRef idx="3">
+            <a:schemeClr val="dk1"/>
+          </a:fillRef>
+          <a:effectRef idx="2">
+            <a:schemeClr val="dk1"/>
+          </a:effectRef>
+          <a:fontRef idx="minor">
+            <a:schemeClr val="lt1"/>
+          </a:fontRef>
+        </p:style>
+        <p:txBody>
+          <a:bodyPr rtlCol="0" anchor="ctr"/>
+          <a:lstStyle/>
+          <a:p>
+            <a:pPr algn="ctr"/>
+            <a:endParaRPr lang="en-US">
+              <a:solidFill>
+                <a:schemeClr val="bg1">
+                  <a:lumMod val="65000"/>
+                </a:schemeClr>
+              </a:solidFill>
+            </a:endParaRPr>
+          </a:p>
+        </p:txBody>
+      </p:sp>
+      <p:sp>
+        <p:nvSpPr>
+          <p:cNvPr id="17" name="TextBox 16"/>
+          <p:cNvSpPr txBox="1"/>
+          <p:nvPr/>
+        </p:nvSpPr>
+        <p:spPr>
+          <a:xfrm>
+            <a:off x="1337728" y="1630070"/>
+            <a:ext cx="1117600" cy="954107"/>
+          </a:xfrm>
+          <a:prstGeom prst="rect">
+            <a:avLst/>
+          </a:prstGeom>
+          <a:noFill/>
+        </p:spPr>
+        <p:txBody>
+          <a:bodyPr wrap="square" rtlCol="0">
+            <a:spAutoFit/>
+          </a:bodyPr>
+          <a:lstStyle/>
+          <a:p>
+            <a:pPr algn="ctr"/>
             <a:r>
               <a:rPr lang="en-US" sz="2800" dirty="0" smtClean="0"/>
-              <a:t>Optimizing a graphic often requires multiple iterative alterations</a:t>
-            </a:r>
-          </a:p>
-          <a:p>
+              <a:t>User input</a:t>
+            </a:r>
+            <a:endParaRPr lang="en-US" sz="2800" dirty="0"/>
+          </a:p>
+        </p:txBody>
+      </p:sp>
+      <p:sp>
+        <p:nvSpPr>
+          <p:cNvPr id="18" name="TextBox 17"/>
+          <p:cNvSpPr txBox="1"/>
+          <p:nvPr/>
+        </p:nvSpPr>
+        <p:spPr>
+          <a:xfrm>
+            <a:off x="6570127" y="1647003"/>
+            <a:ext cx="1524008" cy="954107"/>
+          </a:xfrm>
+          <a:prstGeom prst="rect">
+            <a:avLst/>
+          </a:prstGeom>
+          <a:noFill/>
+        </p:spPr>
+        <p:txBody>
+          <a:bodyPr wrap="square" rtlCol="0">
+            <a:spAutoFit/>
+          </a:bodyPr>
+          <a:lstStyle/>
+          <a:p>
+            <a:pPr algn="ctr"/>
             <a:r>
               <a:rPr lang="en-US" sz="2800" dirty="0" smtClean="0"/>
-              <a:t>Analysis and interpretation often benefits from active filtering, variable selection, and parameterization</a:t>
-            </a:r>
-          </a:p>
+              <a:t>R output</a:t>
+            </a:r>
+            <a:endParaRPr lang="en-US" sz="2800" dirty="0"/>
+          </a:p>
+        </p:txBody>
+      </p:sp>
+      <p:sp>
+        <p:nvSpPr>
+          <p:cNvPr id="19" name="TextBox 18"/>
+          <p:cNvSpPr txBox="1"/>
+          <p:nvPr/>
+        </p:nvSpPr>
+        <p:spPr>
+          <a:xfrm>
+            <a:off x="1202962" y="6144335"/>
+            <a:ext cx="6806821" cy="523220"/>
+          </a:xfrm>
+          <a:prstGeom prst="rect">
+            <a:avLst/>
+          </a:prstGeom>
+          <a:noFill/>
+        </p:spPr>
+        <p:txBody>
+          <a:bodyPr wrap="none" rtlCol="0">
+            <a:spAutoFit/>
+          </a:bodyPr>
+          <a:lstStyle/>
           <a:p>
             <a:r>
               <a:rPr lang="en-US" sz="2800" dirty="0" smtClean="0"/>
-              <a:t>Interactive graphics allow end-users, especially non-experts, to more effectively explore data</a:t>
-            </a:r>
-          </a:p>
-          <a:p>
-            <a:r>
-              <a:rPr lang="en-US" sz="2800" dirty="0" smtClean="0"/>
-              <a:t>The R shiny package allows you to quickly and easily create sophisticated web-accessible interactive graphics</a:t>
+              <a:t>Interactive User Interface (UI) = website</a:t>
             </a:r>
             <a:endParaRPr lang="en-US" sz="2800" dirty="0"/>
           </a:p>
@@ -6438,7 +6701,7 @@
     </p:spTree>
     <p:extLst>
       <p:ext uri="{BB962C8B-B14F-4D97-AF65-F5344CB8AC3E}">
-        <p14:creationId xmlns:p14="http://schemas.microsoft.com/office/powerpoint/2010/main" val="2141840622"/>
+        <p14:creationId xmlns:p14="http://schemas.microsoft.com/office/powerpoint/2010/main" val="2373662838"/>
       </p:ext>
     </p:extLst>
   </p:cSld>
@@ -6482,298 +6745,82 @@
           <a:p>
             <a:r>
               <a:rPr lang="en-US" dirty="0" smtClean="0"/>
-              <a:t>Basic organization of a shiny application</a:t>
+              <a:t>Demo of shiny gallery genomics example</a:t>
             </a:r>
             <a:endParaRPr lang="en-US" dirty="0"/>
-          </a:p>
-        </p:txBody>
-      </p:sp>
-      <p:sp>
-        <p:nvSpPr>
-          <p:cNvPr id="5" name="TextBox 4"/>
-          <p:cNvSpPr txBox="1"/>
-          <p:nvPr/>
-        </p:nvSpPr>
-        <p:spPr>
-          <a:xfrm>
-            <a:off x="3945463" y="2379940"/>
-            <a:ext cx="1170362" cy="830997"/>
-          </a:xfrm>
-          <a:prstGeom prst="rect">
-            <a:avLst/>
-          </a:prstGeom>
-          <a:noFill/>
-        </p:spPr>
-        <p:txBody>
-          <a:bodyPr wrap="none" rtlCol="0">
-            <a:spAutoFit/>
-          </a:bodyPr>
-          <a:lstStyle/>
-          <a:p>
-            <a:pPr algn="ctr"/>
-            <a:r>
-              <a:rPr lang="en-US" sz="2400" dirty="0" err="1" smtClean="0"/>
-              <a:t>shinyUI</a:t>
-            </a:r>
-            <a:endParaRPr lang="en-US" sz="2400" dirty="0" smtClean="0"/>
-          </a:p>
-          <a:p>
-            <a:pPr algn="ctr"/>
-            <a:r>
-              <a:rPr lang="en-US" sz="2400" dirty="0" err="1" smtClean="0"/>
-              <a:t>ui.R</a:t>
-            </a:r>
-            <a:endParaRPr lang="en-US" sz="2400" dirty="0"/>
-          </a:p>
-        </p:txBody>
-      </p:sp>
-      <p:sp>
-        <p:nvSpPr>
-          <p:cNvPr id="6" name="TextBox 5"/>
-          <p:cNvSpPr txBox="1"/>
-          <p:nvPr/>
-        </p:nvSpPr>
-        <p:spPr>
-          <a:xfrm>
-            <a:off x="3633276" y="1032941"/>
-            <a:ext cx="1758865" cy="830997"/>
-          </a:xfrm>
-          <a:prstGeom prst="rect">
-            <a:avLst/>
-          </a:prstGeom>
-          <a:noFill/>
-        </p:spPr>
-        <p:txBody>
-          <a:bodyPr wrap="none" rtlCol="0">
-            <a:spAutoFit/>
-          </a:bodyPr>
-          <a:lstStyle/>
-          <a:p>
-            <a:pPr algn="ctr"/>
-            <a:r>
-              <a:rPr lang="en-US" sz="2400" dirty="0" err="1" smtClean="0"/>
-              <a:t>shinyServer</a:t>
-            </a:r>
-            <a:endParaRPr lang="en-US" sz="2400" dirty="0" smtClean="0"/>
-          </a:p>
-          <a:p>
-            <a:pPr algn="ctr"/>
-            <a:r>
-              <a:rPr lang="en-US" sz="2400" dirty="0" err="1" smtClean="0"/>
-              <a:t>server.R</a:t>
-            </a:r>
-            <a:endParaRPr lang="en-US" sz="2400" dirty="0"/>
-          </a:p>
-        </p:txBody>
-      </p:sp>
-      <p:sp>
-        <p:nvSpPr>
-          <p:cNvPr id="9" name="Curved Left Arrow 8"/>
-          <p:cNvSpPr/>
-          <p:nvPr/>
-        </p:nvSpPr>
-        <p:spPr>
-          <a:xfrm>
-            <a:off x="5529772" y="1337735"/>
-            <a:ext cx="853657" cy="1659469"/>
-          </a:xfrm>
-          <a:prstGeom prst="curvedLeftArrow">
-            <a:avLst/>
-          </a:prstGeom>
-        </p:spPr>
-        <p:style>
-          <a:lnRef idx="1">
-            <a:schemeClr val="dk1"/>
-          </a:lnRef>
-          <a:fillRef idx="3">
-            <a:schemeClr val="dk1"/>
-          </a:fillRef>
-          <a:effectRef idx="2">
-            <a:schemeClr val="dk1"/>
-          </a:effectRef>
-          <a:fontRef idx="minor">
-            <a:schemeClr val="lt1"/>
-          </a:fontRef>
-        </p:style>
-        <p:txBody>
-          <a:bodyPr rtlCol="0" anchor="ctr"/>
-          <a:lstStyle/>
-          <a:p>
-            <a:pPr algn="ctr"/>
-            <a:endParaRPr lang="en-US">
-              <a:solidFill>
-                <a:schemeClr val="bg1">
-                  <a:lumMod val="65000"/>
-                </a:schemeClr>
-              </a:solidFill>
-            </a:endParaRPr>
           </a:p>
         </p:txBody>
       </p:sp>
       <p:pic>
         <p:nvPicPr>
-          <p:cNvPr id="15" name="Picture 14"/>
+          <p:cNvPr id="5" name="Content Placeholder 4" descr="shiny_gallery_genomics_example.png"/>
           <p:cNvPicPr>
-            <a:picLocks noChangeAspect="1"/>
+            <a:picLocks noGrp="1" noChangeAspect="1"/>
           </p:cNvPicPr>
-          <p:nvPr/>
+          <p:nvPr>
+            <p:ph idx="1"/>
+          </p:nvPr>
         </p:nvPicPr>
         <p:blipFill>
-          <a:blip r:embed="rId2"/>
+          <a:blip r:embed="rId2">
+            <a:extLst>
+              <a:ext uri="{28A0092B-C50C-407E-A947-70E740481C1C}">
+                <a14:useLocalDpi xmlns:a14="http://schemas.microsoft.com/office/drawing/2010/main" val="0"/>
+              </a:ext>
+            </a:extLst>
+          </a:blip>
+          <a:srcRect t="-4749" b="-4749"/>
           <a:stretch>
             <a:fillRect/>
           </a:stretch>
         </p:blipFill>
+        <p:spPr/>
+      </p:pic>
+      <p:sp>
+        <p:nvSpPr>
+          <p:cNvPr id="4" name="Rectangle 3"/>
+          <p:cNvSpPr/>
+          <p:nvPr/>
+        </p:nvSpPr>
         <p:spPr>
           <a:xfrm>
-            <a:off x="643466" y="3282658"/>
-            <a:ext cx="7772400" cy="2737104"/>
+            <a:off x="1959232" y="6292334"/>
+            <a:ext cx="5009304" cy="461665"/>
           </a:xfrm>
           <a:prstGeom prst="rect">
             <a:avLst/>
           </a:prstGeom>
         </p:spPr>
-      </p:pic>
-      <p:sp>
-        <p:nvSpPr>
-          <p:cNvPr id="16" name="Curved Left Arrow 15"/>
-          <p:cNvSpPr/>
-          <p:nvPr/>
-        </p:nvSpPr>
-        <p:spPr>
-          <a:xfrm rot="10800000">
-            <a:off x="2685031" y="1236140"/>
-            <a:ext cx="853657" cy="1659469"/>
-          </a:xfrm>
-          <a:prstGeom prst="curvedLeftArrow">
-            <a:avLst/>
-          </a:prstGeom>
-        </p:spPr>
-        <p:style>
-          <a:lnRef idx="1">
-            <a:schemeClr val="dk1"/>
-          </a:lnRef>
-          <a:fillRef idx="3">
-            <a:schemeClr val="dk1"/>
-          </a:fillRef>
-          <a:effectRef idx="2">
-            <a:schemeClr val="dk1"/>
-          </a:effectRef>
-          <a:fontRef idx="minor">
-            <a:schemeClr val="lt1"/>
-          </a:fontRef>
-        </p:style>
-        <p:txBody>
-          <a:bodyPr rtlCol="0" anchor="ctr"/>
-          <a:lstStyle/>
-          <a:p>
-            <a:pPr algn="ctr"/>
-            <a:endParaRPr lang="en-US">
-              <a:solidFill>
-                <a:schemeClr val="bg1">
-                  <a:lumMod val="65000"/>
-                </a:schemeClr>
-              </a:solidFill>
-            </a:endParaRPr>
-          </a:p>
-        </p:txBody>
-      </p:sp>
-      <p:sp>
-        <p:nvSpPr>
-          <p:cNvPr id="17" name="TextBox 16"/>
-          <p:cNvSpPr txBox="1"/>
-          <p:nvPr/>
-        </p:nvSpPr>
-        <p:spPr>
-          <a:xfrm>
-            <a:off x="1337728" y="1630070"/>
-            <a:ext cx="1117600" cy="954107"/>
-          </a:xfrm>
-          <a:prstGeom prst="rect">
-            <a:avLst/>
-          </a:prstGeom>
-          <a:noFill/>
-        </p:spPr>
-        <p:txBody>
-          <a:bodyPr wrap="square" rtlCol="0">
+        <p:txBody>
+          <a:bodyPr wrap="none">
             <a:spAutoFit/>
           </a:bodyPr>
           <a:lstStyle/>
           <a:p>
-            <a:pPr algn="ctr"/>
-            <a:r>
-              <a:rPr lang="en-US" sz="2800" dirty="0" smtClean="0"/>
-              <a:t>User input</a:t>
-            </a:r>
-            <a:endParaRPr lang="en-US" sz="2800" dirty="0"/>
-          </a:p>
-        </p:txBody>
-      </p:sp>
-      <p:sp>
-        <p:nvSpPr>
-          <p:cNvPr id="18" name="TextBox 17"/>
-          <p:cNvSpPr txBox="1"/>
-          <p:nvPr/>
-        </p:nvSpPr>
-        <p:spPr>
-          <a:xfrm>
-            <a:off x="6570127" y="1647003"/>
-            <a:ext cx="1524008" cy="954107"/>
-          </a:xfrm>
-          <a:prstGeom prst="rect">
-            <a:avLst/>
-          </a:prstGeom>
-          <a:noFill/>
-        </p:spPr>
-        <p:txBody>
-          <a:bodyPr wrap="square" rtlCol="0">
-            <a:spAutoFit/>
-          </a:bodyPr>
-          <a:lstStyle/>
-          <a:p>
-            <a:pPr algn="ctr"/>
-            <a:r>
-              <a:rPr lang="en-US" sz="2800" dirty="0" smtClean="0"/>
-              <a:t>R output</a:t>
-            </a:r>
-            <a:endParaRPr lang="en-US" sz="2800" dirty="0"/>
-          </a:p>
-        </p:txBody>
-      </p:sp>
-      <p:sp>
-        <p:nvSpPr>
-          <p:cNvPr id="19" name="TextBox 18"/>
-          <p:cNvSpPr txBox="1"/>
-          <p:nvPr/>
-        </p:nvSpPr>
-        <p:spPr>
-          <a:xfrm>
-            <a:off x="1202962" y="6144335"/>
-            <a:ext cx="6806821" cy="523220"/>
-          </a:xfrm>
-          <a:prstGeom prst="rect">
-            <a:avLst/>
-          </a:prstGeom>
-          <a:noFill/>
-        </p:spPr>
-        <p:txBody>
-          <a:bodyPr wrap="none" rtlCol="0">
-            <a:spAutoFit/>
-          </a:bodyPr>
-          <a:lstStyle/>
-          <a:p>
-            <a:r>
-              <a:rPr lang="en-US" sz="2800" dirty="0" smtClean="0"/>
-              <a:t>Interactive User Interface (UI) = website</a:t>
-            </a:r>
-            <a:endParaRPr lang="en-US" sz="2800" dirty="0"/>
+            <a:r>
+              <a:rPr lang="en-US" sz="2400" dirty="0">
+                <a:hlinkClick r:id="rId3"/>
+              </a:rPr>
+              <a:t>https://shiny.rstudio.com/gallery</a:t>
+            </a:r>
+            <a:r>
+              <a:rPr lang="en-US" sz="2400" dirty="0" smtClean="0">
+                <a:hlinkClick r:id="rId3"/>
+              </a:rPr>
+              <a:t>/</a:t>
+            </a:r>
+            <a:r>
+              <a:rPr lang="en-US" sz="2400" dirty="0" smtClean="0"/>
+              <a:t> </a:t>
+            </a:r>
+            <a:endParaRPr lang="en-US" sz="2400" dirty="0"/>
           </a:p>
         </p:txBody>
       </p:sp>
     </p:spTree>
     <p:extLst>
       <p:ext uri="{BB962C8B-B14F-4D97-AF65-F5344CB8AC3E}">
-        <p14:creationId xmlns:p14="http://schemas.microsoft.com/office/powerpoint/2010/main" val="2373662838"/>
+        <p14:creationId xmlns:p14="http://schemas.microsoft.com/office/powerpoint/2010/main" val="1597040318"/>
       </p:ext>
     </p:extLst>
   </p:cSld>
@@ -6802,101 +6849,41 @@
       </p:grpSpPr>
       <p:sp>
         <p:nvSpPr>
-          <p:cNvPr id="2" name="Title 1"/>
-          <p:cNvSpPr>
-            <a:spLocks noGrp="1"/>
-          </p:cNvSpPr>
-          <p:nvPr>
-            <p:ph type="title"/>
-          </p:nvPr>
-        </p:nvSpPr>
-        <p:spPr/>
-        <p:txBody>
-          <a:bodyPr/>
-          <a:lstStyle/>
-          <a:p>
-            <a:r>
-              <a:rPr lang="en-US" dirty="0" smtClean="0"/>
-              <a:t>Demo of shiny gallery </a:t>
-            </a:r>
-            <a:r>
-              <a:rPr lang="en-US" smtClean="0"/>
-              <a:t>genomics example</a:t>
-            </a:r>
-            <a:endParaRPr lang="en-US"/>
-          </a:p>
-        </p:txBody>
-      </p:sp>
-      <p:pic>
-        <p:nvPicPr>
-          <p:cNvPr id="5" name="Content Placeholder 4" descr="shiny_gallery_genomics_example.png"/>
-          <p:cNvPicPr>
-            <a:picLocks noGrp="1" noChangeAspect="1"/>
-          </p:cNvPicPr>
+          <p:cNvPr id="3" name="Content Placeholder 2"/>
+          <p:cNvSpPr>
+            <a:spLocks noGrp="1"/>
+          </p:cNvSpPr>
           <p:nvPr>
             <p:ph idx="1"/>
           </p:nvPr>
-        </p:nvPicPr>
-        <p:blipFill>
-          <a:blip r:embed="rId2">
-            <a:extLst>
-              <a:ext uri="{28A0092B-C50C-407E-A947-70E740481C1C}">
-                <a14:useLocalDpi xmlns:a14="http://schemas.microsoft.com/office/drawing/2010/main" val="0"/>
-              </a:ext>
-            </a:extLst>
-          </a:blip>
-          <a:srcRect t="-4749" b="-4749"/>
-          <a:stretch>
-            <a:fillRect/>
-          </a:stretch>
-        </p:blipFill>
-        <p:spPr/>
-      </p:pic>
-      <p:sp>
-        <p:nvSpPr>
-          <p:cNvPr id="4" name="Rectangle 3"/>
-          <p:cNvSpPr/>
-          <p:nvPr/>
         </p:nvSpPr>
         <p:spPr>
           <a:xfrm>
-            <a:off x="1959232" y="6292334"/>
-            <a:ext cx="5009304" cy="461665"/>
+            <a:off x="226785" y="1778022"/>
+            <a:ext cx="8636001" cy="3173389"/>
           </a:xfrm>
-          <a:prstGeom prst="rect">
-            <a:avLst/>
-          </a:prstGeom>
         </p:spPr>
         <p:txBody>
-          <a:bodyPr wrap="none">
-            <a:spAutoFit/>
+          <a:bodyPr anchor="ctr">
+            <a:normAutofit/>
           </a:bodyPr>
           <a:lstStyle/>
           <a:p>
-            <a:r>
-              <a:rPr lang="en-US" sz="2400" dirty="0">
-                <a:hlinkClick r:id="rId3"/>
-              </a:rPr>
-              <a:t>https://shiny.rstudio.com/gallery</a:t>
-            </a:r>
-            <a:r>
-              <a:rPr lang="en-US" sz="2400" dirty="0" smtClean="0">
-                <a:hlinkClick r:id="rId3"/>
-              </a:rPr>
-              <a:t>/</a:t>
-            </a:r>
-            <a:r>
-              <a:rPr lang="en-US" sz="2400" dirty="0" smtClean="0"/>
-              <a:t> </a:t>
-            </a:r>
-            <a:endParaRPr lang="en-US" sz="2400" dirty="0"/>
+            <a:pPr marL="0" indent="0" algn="ctr">
+              <a:buNone/>
+            </a:pPr>
+            <a:r>
+              <a:rPr lang="en-US" sz="4000" dirty="0" smtClean="0"/>
+              <a:t>Questions?</a:t>
+            </a:r>
+            <a:endParaRPr lang="en-US" sz="4000" dirty="0"/>
           </a:p>
         </p:txBody>
       </p:sp>
     </p:spTree>
     <p:extLst>
       <p:ext uri="{BB962C8B-B14F-4D97-AF65-F5344CB8AC3E}">
-        <p14:creationId xmlns:p14="http://schemas.microsoft.com/office/powerpoint/2010/main" val="1597040318"/>
+        <p14:creationId xmlns:p14="http://schemas.microsoft.com/office/powerpoint/2010/main" val="2790941461"/>
       </p:ext>
     </p:extLst>
   </p:cSld>
@@ -7611,7 +7598,7 @@
           <a:p>
             <a:r>
               <a:rPr lang="en-US" dirty="0" smtClean="0"/>
-              <a:t>Installation</a:t>
+              <a:t>Installation and versions</a:t>
             </a:r>
             <a:endParaRPr lang="en-US" dirty="0"/>
           </a:p>
@@ -7632,7 +7619,50 @@
           <a:bodyPr/>
           <a:lstStyle/>
           <a:p>
-            <a:endParaRPr lang="en-US"/>
+            <a:r>
+              <a:rPr lang="en-US" dirty="0" smtClean="0"/>
+              <a:t>Shiny installation is very simple</a:t>
+            </a:r>
+          </a:p>
+          <a:p>
+            <a:r>
+              <a:rPr lang="en-US" dirty="0" smtClean="0"/>
+              <a:t>R installation generally only a little more complicated	</a:t>
+            </a:r>
+          </a:p>
+          <a:p>
+            <a:r>
+              <a:rPr lang="en-US" dirty="0" smtClean="0"/>
+              <a:t>Pre-compiled binaries exist for most operating systems</a:t>
+            </a:r>
+          </a:p>
+          <a:p>
+            <a:endParaRPr lang="en-US" dirty="0"/>
+          </a:p>
+          <a:p>
+            <a:r>
+              <a:rPr lang="en-US" dirty="0" smtClean="0"/>
+              <a:t>Be aware of R versions</a:t>
+            </a:r>
+          </a:p>
+          <a:p>
+            <a:pPr lvl="1"/>
+            <a:r>
+              <a:rPr lang="en-US" dirty="0" smtClean="0"/>
+              <a:t>Occasionally some packages may be version dependent or interdependent</a:t>
+            </a:r>
+          </a:p>
+          <a:p>
+            <a:pPr lvl="1"/>
+            <a:r>
+              <a:rPr lang="en-US" dirty="0" smtClean="0"/>
+              <a:t>Less of an </a:t>
+            </a:r>
+            <a:r>
+              <a:rPr lang="en-US" smtClean="0"/>
+              <a:t>issue these days</a:t>
+            </a:r>
+            <a:endParaRPr lang="en-US" dirty="0"/>
           </a:p>
         </p:txBody>
       </p:sp>
@@ -7683,7 +7713,11 @@
           <a:p>
             <a:r>
               <a:rPr lang="en-US" dirty="0" smtClean="0"/>
-              <a:t>Version issues?</a:t>
+              <a:t>CRAN and </a:t>
+            </a:r>
+            <a:r>
+              <a:rPr lang="en-US" dirty="0" err="1" smtClean="0"/>
+              <a:t>BioConductor</a:t>
             </a:r>
             <a:endParaRPr lang="en-US" dirty="0"/>
           </a:p>
@@ -7711,7 +7745,7 @@
     </p:spTree>
     <p:extLst>
       <p:ext uri="{BB962C8B-B14F-4D97-AF65-F5344CB8AC3E}">
-        <p14:creationId xmlns:p14="http://schemas.microsoft.com/office/powerpoint/2010/main" val="2954453610"/>
+        <p14:creationId xmlns:p14="http://schemas.microsoft.com/office/powerpoint/2010/main" val="2849299754"/>
       </p:ext>
     </p:extLst>
   </p:cSld>
@@ -7755,11 +7789,7 @@
           <a:p>
             <a:r>
               <a:rPr lang="en-US" dirty="0" smtClean="0"/>
-              <a:t>CRAN and </a:t>
-            </a:r>
-            <a:r>
-              <a:rPr lang="en-US" dirty="0" err="1" smtClean="0"/>
-              <a:t>BioConductor</a:t>
+              <a:t>Getting help: ?, vignettes(), and data()</a:t>
             </a:r>
             <a:endParaRPr lang="en-US" dirty="0"/>
           </a:p>
@@ -7787,7 +7817,7 @@
     </p:spTree>
     <p:extLst>
       <p:ext uri="{BB962C8B-B14F-4D97-AF65-F5344CB8AC3E}">
-        <p14:creationId xmlns:p14="http://schemas.microsoft.com/office/powerpoint/2010/main" val="2849299754"/>
+        <p14:creationId xmlns:p14="http://schemas.microsoft.com/office/powerpoint/2010/main" val="2358374663"/>
       </p:ext>
     </p:extLst>
   </p:cSld>

</xml_diff>